<commit_message>
Added a exhalation compartment and updated the model outline
</commit_message>
<xml_diff>
--- a/Model outline.pptx
+++ b/Model outline.pptx
@@ -104,6 +104,11 @@
       </a:defRPr>
     </a:lvl9pPr>
   </p:defaultTextStyle>
+  <p:extLst>
+    <p:ext uri="{EFAFB233-063F-42B5-8137-9DF3F51BA10A}">
+      <p15:sldGuideLst xmlns:p15="http://schemas.microsoft.com/office/powerpoint/2012/main"/>
+    </p:ext>
+  </p:extLst>
 </p:presentation>
 </file>
 
@@ -256,7 +261,7 @@
           <a:p>
             <a:fld id="{04D7B9B6-C853-4B78-84CC-EA81008DF08B}" type="datetimeFigureOut">
               <a:rPr lang="en-GB" smtClean="0"/>
-              <a:t>27/06/2022</a:t>
+              <a:t>07/07/2022</a:t>
             </a:fld>
             <a:endParaRPr lang="en-GB" dirty="0"/>
           </a:p>
@@ -456,7 +461,7 @@
           <a:p>
             <a:fld id="{04D7B9B6-C853-4B78-84CC-EA81008DF08B}" type="datetimeFigureOut">
               <a:rPr lang="en-GB" smtClean="0"/>
-              <a:t>27/06/2022</a:t>
+              <a:t>07/07/2022</a:t>
             </a:fld>
             <a:endParaRPr lang="en-GB" dirty="0"/>
           </a:p>
@@ -666,7 +671,7 @@
           <a:p>
             <a:fld id="{04D7B9B6-C853-4B78-84CC-EA81008DF08B}" type="datetimeFigureOut">
               <a:rPr lang="en-GB" smtClean="0"/>
-              <a:t>27/06/2022</a:t>
+              <a:t>07/07/2022</a:t>
             </a:fld>
             <a:endParaRPr lang="en-GB" dirty="0"/>
           </a:p>
@@ -866,7 +871,7 @@
           <a:p>
             <a:fld id="{04D7B9B6-C853-4B78-84CC-EA81008DF08B}" type="datetimeFigureOut">
               <a:rPr lang="en-GB" smtClean="0"/>
-              <a:t>27/06/2022</a:t>
+              <a:t>07/07/2022</a:t>
             </a:fld>
             <a:endParaRPr lang="en-GB" dirty="0"/>
           </a:p>
@@ -1142,7 +1147,7 @@
           <a:p>
             <a:fld id="{04D7B9B6-C853-4B78-84CC-EA81008DF08B}" type="datetimeFigureOut">
               <a:rPr lang="en-GB" smtClean="0"/>
-              <a:t>27/06/2022</a:t>
+              <a:t>07/07/2022</a:t>
             </a:fld>
             <a:endParaRPr lang="en-GB" dirty="0"/>
           </a:p>
@@ -1410,7 +1415,7 @@
           <a:p>
             <a:fld id="{04D7B9B6-C853-4B78-84CC-EA81008DF08B}" type="datetimeFigureOut">
               <a:rPr lang="en-GB" smtClean="0"/>
-              <a:t>27/06/2022</a:t>
+              <a:t>07/07/2022</a:t>
             </a:fld>
             <a:endParaRPr lang="en-GB" dirty="0"/>
           </a:p>
@@ -1825,7 +1830,7 @@
           <a:p>
             <a:fld id="{04D7B9B6-C853-4B78-84CC-EA81008DF08B}" type="datetimeFigureOut">
               <a:rPr lang="en-GB" smtClean="0"/>
-              <a:t>27/06/2022</a:t>
+              <a:t>07/07/2022</a:t>
             </a:fld>
             <a:endParaRPr lang="en-GB" dirty="0"/>
           </a:p>
@@ -1967,7 +1972,7 @@
           <a:p>
             <a:fld id="{04D7B9B6-C853-4B78-84CC-EA81008DF08B}" type="datetimeFigureOut">
               <a:rPr lang="en-GB" smtClean="0"/>
-              <a:t>27/06/2022</a:t>
+              <a:t>07/07/2022</a:t>
             </a:fld>
             <a:endParaRPr lang="en-GB" dirty="0"/>
           </a:p>
@@ -2080,7 +2085,7 @@
           <a:p>
             <a:fld id="{04D7B9B6-C853-4B78-84CC-EA81008DF08B}" type="datetimeFigureOut">
               <a:rPr lang="en-GB" smtClean="0"/>
-              <a:t>27/06/2022</a:t>
+              <a:t>07/07/2022</a:t>
             </a:fld>
             <a:endParaRPr lang="en-GB" dirty="0"/>
           </a:p>
@@ -2393,7 +2398,7 @@
           <a:p>
             <a:fld id="{04D7B9B6-C853-4B78-84CC-EA81008DF08B}" type="datetimeFigureOut">
               <a:rPr lang="en-GB" smtClean="0"/>
-              <a:t>27/06/2022</a:t>
+              <a:t>07/07/2022</a:t>
             </a:fld>
             <a:endParaRPr lang="en-GB" dirty="0"/>
           </a:p>
@@ -2682,7 +2687,7 @@
           <a:p>
             <a:fld id="{04D7B9B6-C853-4B78-84CC-EA81008DF08B}" type="datetimeFigureOut">
               <a:rPr lang="en-GB" smtClean="0"/>
-              <a:t>27/06/2022</a:t>
+              <a:t>07/07/2022</a:t>
             </a:fld>
             <a:endParaRPr lang="en-GB" dirty="0"/>
           </a:p>
@@ -2925,7 +2930,7 @@
           <a:p>
             <a:fld id="{04D7B9B6-C853-4B78-84CC-EA81008DF08B}" type="datetimeFigureOut">
               <a:rPr lang="en-GB" smtClean="0"/>
-              <a:t>27/06/2022</a:t>
+              <a:t>07/07/2022</a:t>
             </a:fld>
             <a:endParaRPr lang="en-GB" dirty="0"/>
           </a:p>
@@ -3655,8 +3660,8 @@
         </p:nvSpPr>
         <p:spPr>
           <a:xfrm>
-            <a:off x="5399641" y="218746"/>
-            <a:ext cx="1761957" cy="836542"/>
+            <a:off x="4298381" y="50736"/>
+            <a:ext cx="1771555" cy="403872"/>
           </a:xfrm>
           <a:prstGeom prst="rect">
             <a:avLst/>
@@ -3690,49 +3695,6 @@
             <a:pPr algn="ctr"/>
             <a:r>
               <a:rPr lang="nl-NL" dirty="0" err="1"/>
-              <a:t>C</a:t>
-            </a:r>
-            <a:r>
-              <a:rPr lang="nl-NL" sz="1000" dirty="0" err="1"/>
-              <a:t>_</a:t>
-            </a:r>
-            <a:r>
-              <a:rPr lang="nl-NL" dirty="0" err="1"/>
-              <a:t>inhaled</a:t>
-            </a:r>
-            <a:r>
-              <a:rPr lang="nl-NL" sz="1000" dirty="0"/>
-              <a:t> </a:t>
-            </a:r>
-          </a:p>
-          <a:p>
-            <a:pPr algn="ctr"/>
-            <a:r>
-              <a:rPr lang="nl-NL" sz="1000" b="1" dirty="0" err="1"/>
-              <a:t>Q_PV</a:t>
-            </a:r>
-            <a:r>
-              <a:rPr lang="nl-NL" sz="1000" b="1" dirty="0"/>
-              <a:t> * </a:t>
-            </a:r>
-            <a:r>
-              <a:rPr lang="nl-NL" sz="1000" b="1" dirty="0" err="1"/>
-              <a:t>C_inhaled</a:t>
-            </a:r>
-            <a:endParaRPr lang="nl-NL" sz="1000" b="1" dirty="0"/>
-          </a:p>
-          <a:p>
-            <a:pPr algn="ctr"/>
-            <a:r>
-              <a:rPr lang="nl-NL" sz="1000" dirty="0"/>
-              <a:t>  </a:t>
-            </a:r>
-            <a:endParaRPr lang="nl-NL" dirty="0"/>
-          </a:p>
-          <a:p>
-            <a:pPr algn="ctr"/>
-            <a:r>
-              <a:rPr lang="nl-NL" dirty="0" err="1"/>
               <a:t>C_alv</a:t>
             </a:r>
             <a:r>
@@ -6252,55 +6214,6 @@
       </p:sp>
       <p:cxnSp>
         <p:nvCxnSpPr>
-          <p:cNvPr id="293" name="Rechte verbindingslijn 292">
-            <a:extLst>
-              <a:ext uri="{FF2B5EF4-FFF2-40B4-BE49-F238E27FC236}">
-                <a16:creationId xmlns:a16="http://schemas.microsoft.com/office/drawing/2014/main" id="{EF4184D3-5E5B-D5C6-FEAD-03E5A3261F6C}"/>
-              </a:ext>
-            </a:extLst>
-          </p:cNvPr>
-          <p:cNvCxnSpPr>
-            <a:cxnSpLocks/>
-            <a:stCxn id="9" idx="1"/>
-            <a:endCxn id="9" idx="3"/>
-          </p:cNvCxnSpPr>
-          <p:nvPr/>
-        </p:nvCxnSpPr>
-        <p:spPr>
-          <a:xfrm>
-            <a:off x="5399641" y="637017"/>
-            <a:ext cx="1761957" cy="0"/>
-          </a:xfrm>
-          <a:prstGeom prst="line">
-            <a:avLst/>
-          </a:prstGeom>
-          <a:ln w="12700" cap="flat" cmpd="sng" algn="ctr">
-            <a:solidFill>
-              <a:schemeClr val="dk1"/>
-            </a:solidFill>
-            <a:prstDash val="dash"/>
-            <a:round/>
-            <a:headEnd type="none" w="med" len="med"/>
-            <a:tailEnd type="none" w="med" len="med"/>
-          </a:ln>
-        </p:spPr>
-        <p:style>
-          <a:lnRef idx="0">
-            <a:scrgbClr r="0" g="0" b="0"/>
-          </a:lnRef>
-          <a:fillRef idx="0">
-            <a:scrgbClr r="0" g="0" b="0"/>
-          </a:fillRef>
-          <a:effectRef idx="0">
-            <a:scrgbClr r="0" g="0" b="0"/>
-          </a:effectRef>
-          <a:fontRef idx="minor">
-            <a:schemeClr val="tx1"/>
-          </a:fontRef>
-        </p:style>
-      </p:cxnSp>
-      <p:cxnSp>
-        <p:nvCxnSpPr>
           <p:cNvPr id="297" name="Verbindingslijn: gebogen 296">
             <a:extLst>
               <a:ext uri="{FF2B5EF4-FFF2-40B4-BE49-F238E27FC236}">
@@ -6317,8 +6230,8 @@
         </p:nvCxnSpPr>
         <p:spPr>
           <a:xfrm rot="16200000" flipV="1">
-            <a:off x="7301744" y="496871"/>
-            <a:ext cx="499582" cy="779874"/>
+            <a:off x="6563741" y="-241132"/>
+            <a:ext cx="883927" cy="1871536"/>
           </a:xfrm>
           <a:prstGeom prst="bentConnector2">
             <a:avLst/>
@@ -6356,7 +6269,7 @@
         </p:nvSpPr>
         <p:spPr>
           <a:xfrm>
-            <a:off x="4395301" y="241720"/>
+            <a:off x="6046464" y="423004"/>
             <a:ext cx="1144283" cy="369332"/>
           </a:xfrm>
           <a:prstGeom prst="rect">
@@ -6499,9 +6412,9 @@
           <p:nvPr/>
         </p:nvCxnSpPr>
         <p:spPr>
-          <a:xfrm>
-            <a:off x="6280620" y="-222225"/>
-            <a:ext cx="0" cy="440971"/>
+          <a:xfrm flipH="1">
+            <a:off x="5184159" y="-771285"/>
+            <a:ext cx="4799" cy="822021"/>
           </a:xfrm>
           <a:prstGeom prst="straightConnector1">
             <a:avLst/>
@@ -6539,8 +6452,8 @@
         </p:nvSpPr>
         <p:spPr>
           <a:xfrm>
-            <a:off x="2767666" y="410755"/>
-            <a:ext cx="1584481" cy="463248"/>
+            <a:off x="4298382" y="454608"/>
+            <a:ext cx="1771554" cy="523734"/>
           </a:xfrm>
           <a:prstGeom prst="rect">
             <a:avLst/>
@@ -6606,26 +6519,26 @@
       </p:sp>
       <p:cxnSp>
         <p:nvCxnSpPr>
-          <p:cNvPr id="328" name="Rechte verbindingslijn met pijl 327">
-            <a:extLst>
-              <a:ext uri="{FF2B5EF4-FFF2-40B4-BE49-F238E27FC236}">
-                <a16:creationId xmlns:a16="http://schemas.microsoft.com/office/drawing/2014/main" id="{B02C7891-ED3A-866F-8C11-5F21F238D0D1}"/>
+          <p:cNvPr id="335" name="Verbindingslijn: gebogen 334">
+            <a:extLst>
+              <a:ext uri="{FF2B5EF4-FFF2-40B4-BE49-F238E27FC236}">
+                <a16:creationId xmlns:a16="http://schemas.microsoft.com/office/drawing/2014/main" id="{001861CE-77CD-CA6A-A342-166392B38667}"/>
               </a:ext>
             </a:extLst>
           </p:cNvPr>
           <p:cNvCxnSpPr>
             <a:cxnSpLocks/>
-            <a:stCxn id="9" idx="1"/>
-            <a:endCxn id="324" idx="3"/>
+            <a:stCxn id="324" idx="1"/>
+            <a:endCxn id="11" idx="3"/>
           </p:cNvCxnSpPr>
           <p:nvPr/>
         </p:nvCxnSpPr>
         <p:spPr>
-          <a:xfrm flipH="1">
-            <a:off x="4352147" y="637017"/>
-            <a:ext cx="1047494" cy="5362"/>
-          </a:xfrm>
-          <a:prstGeom prst="straightConnector1">
+          <a:xfrm rot="10800000" flipV="1">
+            <a:off x="2696530" y="716475"/>
+            <a:ext cx="1601853" cy="420124"/>
+          </a:xfrm>
+          <a:prstGeom prst="bentConnector2">
             <a:avLst/>
           </a:prstGeom>
           <a:ln>
@@ -6647,49 +6560,6 @@
           </a:fontRef>
         </p:style>
       </p:cxnSp>
-      <p:cxnSp>
-        <p:nvCxnSpPr>
-          <p:cNvPr id="335" name="Verbindingslijn: gebogen 334">
-            <a:extLst>
-              <a:ext uri="{FF2B5EF4-FFF2-40B4-BE49-F238E27FC236}">
-                <a16:creationId xmlns:a16="http://schemas.microsoft.com/office/drawing/2014/main" id="{001861CE-77CD-CA6A-A342-166392B38667}"/>
-              </a:ext>
-            </a:extLst>
-          </p:cNvPr>
-          <p:cNvCxnSpPr>
-            <a:cxnSpLocks/>
-            <a:stCxn id="324" idx="2"/>
-            <a:endCxn id="11" idx="3"/>
-          </p:cNvCxnSpPr>
-          <p:nvPr/>
-        </p:nvCxnSpPr>
-        <p:spPr>
-          <a:xfrm rot="5400000">
-            <a:off x="2996920" y="573612"/>
-            <a:ext cx="262596" cy="863378"/>
-          </a:xfrm>
-          <a:prstGeom prst="bentConnector3">
-            <a:avLst/>
-          </a:prstGeom>
-          <a:ln>
-            <a:tailEnd type="triangle"/>
-          </a:ln>
-        </p:spPr>
-        <p:style>
-          <a:lnRef idx="3">
-            <a:schemeClr val="dk1"/>
-          </a:lnRef>
-          <a:fillRef idx="0">
-            <a:schemeClr val="dk1"/>
-          </a:fillRef>
-          <a:effectRef idx="2">
-            <a:schemeClr val="dk1"/>
-          </a:effectRef>
-          <a:fontRef idx="minor">
-            <a:schemeClr val="tx1"/>
-          </a:fontRef>
-        </p:style>
-      </p:cxnSp>
       <p:sp>
         <p:nvSpPr>
           <p:cNvPr id="347" name="Tekstvak 346">
@@ -6704,7 +6574,7 @@
         </p:nvSpPr>
         <p:spPr>
           <a:xfrm>
-            <a:off x="3551042" y="893709"/>
+            <a:off x="2996646" y="729202"/>
             <a:ext cx="861298" cy="215444"/>
           </a:xfrm>
           <a:prstGeom prst="rect">
@@ -6731,6 +6601,73 @@
               <a:t>C_A_Pu</a:t>
             </a:r>
             <a:endParaRPr lang="en-GB" sz="800" b="1" dirty="0"/>
+          </a:p>
+        </p:txBody>
+      </p:sp>
+      <p:sp>
+        <p:nvSpPr>
+          <p:cNvPr id="37" name="Tekstvak 36">
+            <a:extLst>
+              <a:ext uri="{FF2B5EF4-FFF2-40B4-BE49-F238E27FC236}">
+                <a16:creationId xmlns:a16="http://schemas.microsoft.com/office/drawing/2014/main" id="{05820975-D349-858C-F0F7-EC1C05425EDD}"/>
+              </a:ext>
+            </a:extLst>
+          </p:cNvPr>
+          <p:cNvSpPr txBox="1"/>
+          <p:nvPr/>
+        </p:nvSpPr>
+        <p:spPr>
+          <a:xfrm>
+            <a:off x="3669325" y="-1123039"/>
+            <a:ext cx="1350264" cy="1200329"/>
+          </a:xfrm>
+          <a:prstGeom prst="rect">
+            <a:avLst/>
+          </a:prstGeom>
+          <a:noFill/>
+        </p:spPr>
+        <p:txBody>
+          <a:bodyPr wrap="square" rtlCol="0">
+            <a:spAutoFit/>
+          </a:bodyPr>
+          <a:lstStyle/>
+          <a:p>
+            <a:pPr algn="ctr"/>
+            <a:r>
+              <a:rPr lang="nl-NL" dirty="0" err="1"/>
+              <a:t>C</a:t>
+            </a:r>
+            <a:r>
+              <a:rPr lang="nl-NL" sz="1800" dirty="0" err="1"/>
+              <a:t>_</a:t>
+            </a:r>
+            <a:r>
+              <a:rPr lang="nl-NL" dirty="0" err="1"/>
+              <a:t>inhaled</a:t>
+            </a:r>
+            <a:r>
+              <a:rPr lang="nl-NL" sz="1800" dirty="0"/>
+              <a:t> </a:t>
+            </a:r>
+          </a:p>
+          <a:p>
+            <a:pPr algn="ctr"/>
+            <a:r>
+              <a:rPr lang="nl-NL" sz="1800" b="1" dirty="0" err="1"/>
+              <a:t>Q_PV</a:t>
+            </a:r>
+            <a:r>
+              <a:rPr lang="nl-NL" sz="1800" b="1" dirty="0"/>
+              <a:t> * </a:t>
+            </a:r>
+            <a:r>
+              <a:rPr lang="nl-NL" sz="1800" b="1" dirty="0" err="1"/>
+              <a:t>C_inhaled</a:t>
+            </a:r>
+            <a:endParaRPr lang="nl-NL" sz="1800" b="1" dirty="0"/>
+          </a:p>
+          <a:p>
+            <a:endParaRPr lang="en-GB" dirty="0"/>
           </a:p>
         </p:txBody>
       </p:sp>

</xml_diff>

<commit_message>
QSAR calculations now conclued.
Parameters files updated

paramters supplementary updated
</commit_message>
<xml_diff>
--- a/Model outline.pptx
+++ b/Model outline.pptx
@@ -6,6 +6,7 @@
   </p:sldMasterIdLst>
   <p:sldIdLst>
     <p:sldId id="256" r:id="rId2"/>
+    <p:sldId id="257" r:id="rId3"/>
   </p:sldIdLst>
   <p:sldSz cx="12192000" cy="6858000"/>
   <p:notesSz cx="6858000" cy="9144000"/>
@@ -261,7 +262,7 @@
           <a:p>
             <a:fld id="{04D7B9B6-C853-4B78-84CC-EA81008DF08B}" type="datetimeFigureOut">
               <a:rPr lang="en-GB" smtClean="0"/>
-              <a:t>07/07/2022</a:t>
+              <a:t>05/08/2022</a:t>
             </a:fld>
             <a:endParaRPr lang="en-GB" dirty="0"/>
           </a:p>
@@ -461,7 +462,7 @@
           <a:p>
             <a:fld id="{04D7B9B6-C853-4B78-84CC-EA81008DF08B}" type="datetimeFigureOut">
               <a:rPr lang="en-GB" smtClean="0"/>
-              <a:t>07/07/2022</a:t>
+              <a:t>05/08/2022</a:t>
             </a:fld>
             <a:endParaRPr lang="en-GB" dirty="0"/>
           </a:p>
@@ -671,7 +672,7 @@
           <a:p>
             <a:fld id="{04D7B9B6-C853-4B78-84CC-EA81008DF08B}" type="datetimeFigureOut">
               <a:rPr lang="en-GB" smtClean="0"/>
-              <a:t>07/07/2022</a:t>
+              <a:t>05/08/2022</a:t>
             </a:fld>
             <a:endParaRPr lang="en-GB" dirty="0"/>
           </a:p>
@@ -871,7 +872,7 @@
           <a:p>
             <a:fld id="{04D7B9B6-C853-4B78-84CC-EA81008DF08B}" type="datetimeFigureOut">
               <a:rPr lang="en-GB" smtClean="0"/>
-              <a:t>07/07/2022</a:t>
+              <a:t>05/08/2022</a:t>
             </a:fld>
             <a:endParaRPr lang="en-GB" dirty="0"/>
           </a:p>
@@ -1147,7 +1148,7 @@
           <a:p>
             <a:fld id="{04D7B9B6-C853-4B78-84CC-EA81008DF08B}" type="datetimeFigureOut">
               <a:rPr lang="en-GB" smtClean="0"/>
-              <a:t>07/07/2022</a:t>
+              <a:t>05/08/2022</a:t>
             </a:fld>
             <a:endParaRPr lang="en-GB" dirty="0"/>
           </a:p>
@@ -1415,7 +1416,7 @@
           <a:p>
             <a:fld id="{04D7B9B6-C853-4B78-84CC-EA81008DF08B}" type="datetimeFigureOut">
               <a:rPr lang="en-GB" smtClean="0"/>
-              <a:t>07/07/2022</a:t>
+              <a:t>05/08/2022</a:t>
             </a:fld>
             <a:endParaRPr lang="en-GB" dirty="0"/>
           </a:p>
@@ -1830,7 +1831,7 @@
           <a:p>
             <a:fld id="{04D7B9B6-C853-4B78-84CC-EA81008DF08B}" type="datetimeFigureOut">
               <a:rPr lang="en-GB" smtClean="0"/>
-              <a:t>07/07/2022</a:t>
+              <a:t>05/08/2022</a:t>
             </a:fld>
             <a:endParaRPr lang="en-GB" dirty="0"/>
           </a:p>
@@ -1972,7 +1973,7 @@
           <a:p>
             <a:fld id="{04D7B9B6-C853-4B78-84CC-EA81008DF08B}" type="datetimeFigureOut">
               <a:rPr lang="en-GB" smtClean="0"/>
-              <a:t>07/07/2022</a:t>
+              <a:t>05/08/2022</a:t>
             </a:fld>
             <a:endParaRPr lang="en-GB" dirty="0"/>
           </a:p>
@@ -2085,7 +2086,7 @@
           <a:p>
             <a:fld id="{04D7B9B6-C853-4B78-84CC-EA81008DF08B}" type="datetimeFigureOut">
               <a:rPr lang="en-GB" smtClean="0"/>
-              <a:t>07/07/2022</a:t>
+              <a:t>05/08/2022</a:t>
             </a:fld>
             <a:endParaRPr lang="en-GB" dirty="0"/>
           </a:p>
@@ -2398,7 +2399,7 @@
           <a:p>
             <a:fld id="{04D7B9B6-C853-4B78-84CC-EA81008DF08B}" type="datetimeFigureOut">
               <a:rPr lang="en-GB" smtClean="0"/>
-              <a:t>07/07/2022</a:t>
+              <a:t>05/08/2022</a:t>
             </a:fld>
             <a:endParaRPr lang="en-GB" dirty="0"/>
           </a:p>
@@ -2687,7 +2688,7 @@
           <a:p>
             <a:fld id="{04D7B9B6-C853-4B78-84CC-EA81008DF08B}" type="datetimeFigureOut">
               <a:rPr lang="en-GB" smtClean="0"/>
-              <a:t>07/07/2022</a:t>
+              <a:t>05/08/2022</a:t>
             </a:fld>
             <a:endParaRPr lang="en-GB" dirty="0"/>
           </a:p>
@@ -2930,7 +2931,7 @@
           <a:p>
             <a:fld id="{04D7B9B6-C853-4B78-84CC-EA81008DF08B}" type="datetimeFigureOut">
               <a:rPr lang="en-GB" smtClean="0"/>
-              <a:t>07/07/2022</a:t>
+              <a:t>05/08/2022</a:t>
             </a:fld>
             <a:endParaRPr lang="en-GB" dirty="0"/>
           </a:p>
@@ -6684,6 +6685,2864 @@
 </p:sld>
 </file>
 
+<file path=ppt/slides/slide2.xml><?xml version="1.0" encoding="utf-8"?>
+<p:sld xmlns:a="http://schemas.openxmlformats.org/drawingml/2006/main" xmlns:r="http://schemas.openxmlformats.org/officeDocument/2006/relationships" xmlns:p="http://schemas.openxmlformats.org/presentationml/2006/main">
+  <p:cSld>
+    <p:spTree>
+      <p:nvGrpSpPr>
+        <p:cNvPr id="1" name=""/>
+        <p:cNvGrpSpPr/>
+        <p:nvPr/>
+      </p:nvGrpSpPr>
+      <p:grpSpPr>
+        <a:xfrm>
+          <a:off x="0" y="0"/>
+          <a:ext cx="0" cy="0"/>
+          <a:chOff x="0" y="0"/>
+          <a:chExt cx="0" cy="0"/>
+        </a:xfrm>
+      </p:grpSpPr>
+      <p:sp>
+        <p:nvSpPr>
+          <p:cNvPr id="4" name="Rechthoek 3">
+            <a:extLst>
+              <a:ext uri="{FF2B5EF4-FFF2-40B4-BE49-F238E27FC236}">
+                <a16:creationId xmlns:a16="http://schemas.microsoft.com/office/drawing/2014/main" id="{FBFE7980-1EF8-A557-C4DB-7D800C992858}"/>
+              </a:ext>
+            </a:extLst>
+          </p:cNvPr>
+          <p:cNvSpPr/>
+          <p:nvPr/>
+        </p:nvSpPr>
+        <p:spPr>
+          <a:xfrm>
+            <a:off x="2004008" y="4143984"/>
+            <a:ext cx="2472612" cy="565202"/>
+          </a:xfrm>
+          <a:prstGeom prst="rect">
+            <a:avLst/>
+          </a:prstGeom>
+          <a:ln>
+            <a:solidFill>
+              <a:schemeClr val="tx1"/>
+            </a:solidFill>
+          </a:ln>
+        </p:spPr>
+        <p:style>
+          <a:lnRef idx="2">
+            <a:schemeClr val="accent5">
+              <a:shade val="50000"/>
+            </a:schemeClr>
+          </a:lnRef>
+          <a:fillRef idx="1">
+            <a:schemeClr val="accent5"/>
+          </a:fillRef>
+          <a:effectRef idx="0">
+            <a:schemeClr val="accent5"/>
+          </a:effectRef>
+          <a:fontRef idx="minor">
+            <a:schemeClr val="lt1"/>
+          </a:fontRef>
+        </p:style>
+        <p:txBody>
+          <a:bodyPr rtlCol="0" anchor="ctr"/>
+          <a:lstStyle/>
+          <a:p>
+            <a:pPr algn="ctr"/>
+            <a:r>
+              <a:rPr lang="nl-NL" dirty="0"/>
+              <a:t>Liver</a:t>
+            </a:r>
+            <a:endParaRPr lang="en-GB" sz="500" dirty="0"/>
+          </a:p>
+        </p:txBody>
+      </p:sp>
+      <p:sp>
+        <p:nvSpPr>
+          <p:cNvPr id="5" name="Rechthoek 4">
+            <a:extLst>
+              <a:ext uri="{FF2B5EF4-FFF2-40B4-BE49-F238E27FC236}">
+                <a16:creationId xmlns:a16="http://schemas.microsoft.com/office/drawing/2014/main" id="{2F174B11-DA82-F68F-3278-C4523C301BC6}"/>
+              </a:ext>
+            </a:extLst>
+          </p:cNvPr>
+          <p:cNvSpPr/>
+          <p:nvPr/>
+        </p:nvSpPr>
+        <p:spPr>
+          <a:xfrm>
+            <a:off x="1437663" y="5150187"/>
+            <a:ext cx="1596821" cy="658845"/>
+          </a:xfrm>
+          <a:prstGeom prst="rect">
+            <a:avLst/>
+          </a:prstGeom>
+          <a:ln>
+            <a:solidFill>
+              <a:schemeClr val="tx1"/>
+            </a:solidFill>
+          </a:ln>
+        </p:spPr>
+        <p:style>
+          <a:lnRef idx="2">
+            <a:schemeClr val="accent5">
+              <a:shade val="50000"/>
+            </a:schemeClr>
+          </a:lnRef>
+          <a:fillRef idx="1">
+            <a:schemeClr val="accent5"/>
+          </a:fillRef>
+          <a:effectRef idx="0">
+            <a:schemeClr val="accent5"/>
+          </a:effectRef>
+          <a:fontRef idx="minor">
+            <a:schemeClr val="lt1"/>
+          </a:fontRef>
+        </p:style>
+        <p:txBody>
+          <a:bodyPr rtlCol="0" anchor="ctr"/>
+          <a:lstStyle/>
+          <a:p>
+            <a:pPr algn="ctr"/>
+            <a:r>
+              <a:rPr lang="nl-NL" dirty="0"/>
+              <a:t>Small intestine</a:t>
+            </a:r>
+            <a:endParaRPr lang="en-GB" dirty="0"/>
+          </a:p>
+        </p:txBody>
+      </p:sp>
+      <p:sp>
+        <p:nvSpPr>
+          <p:cNvPr id="6" name="Rechthoek 5">
+            <a:extLst>
+              <a:ext uri="{FF2B5EF4-FFF2-40B4-BE49-F238E27FC236}">
+                <a16:creationId xmlns:a16="http://schemas.microsoft.com/office/drawing/2014/main" id="{8343CA6F-D6F2-3A3E-68E8-B0BE5E0CC181}"/>
+              </a:ext>
+            </a:extLst>
+          </p:cNvPr>
+          <p:cNvSpPr/>
+          <p:nvPr/>
+        </p:nvSpPr>
+        <p:spPr>
+          <a:xfrm>
+            <a:off x="2016578" y="2937249"/>
+            <a:ext cx="2472612" cy="354563"/>
+          </a:xfrm>
+          <a:prstGeom prst="rect">
+            <a:avLst/>
+          </a:prstGeom>
+          <a:ln>
+            <a:solidFill>
+              <a:schemeClr val="tx1"/>
+            </a:solidFill>
+          </a:ln>
+        </p:spPr>
+        <p:style>
+          <a:lnRef idx="2">
+            <a:schemeClr val="accent5">
+              <a:shade val="50000"/>
+            </a:schemeClr>
+          </a:lnRef>
+          <a:fillRef idx="1">
+            <a:schemeClr val="accent5"/>
+          </a:fillRef>
+          <a:effectRef idx="0">
+            <a:schemeClr val="accent5"/>
+          </a:effectRef>
+          <a:fontRef idx="minor">
+            <a:schemeClr val="lt1"/>
+          </a:fontRef>
+        </p:style>
+        <p:txBody>
+          <a:bodyPr rtlCol="0" anchor="ctr"/>
+          <a:lstStyle/>
+          <a:p>
+            <a:pPr algn="ctr"/>
+            <a:r>
+              <a:rPr lang="nl-NL" dirty="0"/>
+              <a:t>Slowly perfused tissue</a:t>
+            </a:r>
+            <a:endParaRPr lang="en-GB" dirty="0"/>
+          </a:p>
+        </p:txBody>
+      </p:sp>
+      <p:sp>
+        <p:nvSpPr>
+          <p:cNvPr id="7" name="Rechthoek 6">
+            <a:extLst>
+              <a:ext uri="{FF2B5EF4-FFF2-40B4-BE49-F238E27FC236}">
+                <a16:creationId xmlns:a16="http://schemas.microsoft.com/office/drawing/2014/main" id="{58F86158-20C6-190D-EB9C-69B1B3AD2A32}"/>
+              </a:ext>
+            </a:extLst>
+          </p:cNvPr>
+          <p:cNvSpPr/>
+          <p:nvPr/>
+        </p:nvSpPr>
+        <p:spPr>
+          <a:xfrm>
+            <a:off x="2004008" y="3512038"/>
+            <a:ext cx="2472612" cy="354563"/>
+          </a:xfrm>
+          <a:prstGeom prst="rect">
+            <a:avLst/>
+          </a:prstGeom>
+          <a:ln>
+            <a:solidFill>
+              <a:schemeClr val="tx1"/>
+            </a:solidFill>
+          </a:ln>
+        </p:spPr>
+        <p:style>
+          <a:lnRef idx="2">
+            <a:schemeClr val="accent5">
+              <a:shade val="50000"/>
+            </a:schemeClr>
+          </a:lnRef>
+          <a:fillRef idx="1">
+            <a:schemeClr val="accent5"/>
+          </a:fillRef>
+          <a:effectRef idx="0">
+            <a:schemeClr val="accent5"/>
+          </a:effectRef>
+          <a:fontRef idx="minor">
+            <a:schemeClr val="lt1"/>
+          </a:fontRef>
+        </p:style>
+        <p:txBody>
+          <a:bodyPr rtlCol="0" anchor="ctr"/>
+          <a:lstStyle/>
+          <a:p>
+            <a:pPr algn="ctr"/>
+            <a:r>
+              <a:rPr lang="nl-NL" dirty="0"/>
+              <a:t>Richly perfused tissue</a:t>
+            </a:r>
+            <a:endParaRPr lang="en-GB" dirty="0"/>
+          </a:p>
+        </p:txBody>
+      </p:sp>
+      <p:sp>
+        <p:nvSpPr>
+          <p:cNvPr id="8" name="Rechthoek 7">
+            <a:extLst>
+              <a:ext uri="{FF2B5EF4-FFF2-40B4-BE49-F238E27FC236}">
+                <a16:creationId xmlns:a16="http://schemas.microsoft.com/office/drawing/2014/main" id="{A969843B-C6C6-ED00-AD24-425C612D2A76}"/>
+              </a:ext>
+            </a:extLst>
+          </p:cNvPr>
+          <p:cNvSpPr/>
+          <p:nvPr/>
+        </p:nvSpPr>
+        <p:spPr>
+          <a:xfrm>
+            <a:off x="2004008" y="2357908"/>
+            <a:ext cx="2472612" cy="354563"/>
+          </a:xfrm>
+          <a:prstGeom prst="rect">
+            <a:avLst/>
+          </a:prstGeom>
+          <a:ln>
+            <a:solidFill>
+              <a:schemeClr val="tx1"/>
+            </a:solidFill>
+          </a:ln>
+        </p:spPr>
+        <p:style>
+          <a:lnRef idx="2">
+            <a:schemeClr val="accent5">
+              <a:shade val="50000"/>
+            </a:schemeClr>
+          </a:lnRef>
+          <a:fillRef idx="1">
+            <a:schemeClr val="accent5"/>
+          </a:fillRef>
+          <a:effectRef idx="0">
+            <a:schemeClr val="accent5"/>
+          </a:effectRef>
+          <a:fontRef idx="minor">
+            <a:schemeClr val="lt1"/>
+          </a:fontRef>
+        </p:style>
+        <p:txBody>
+          <a:bodyPr rtlCol="0" anchor="ctr"/>
+          <a:lstStyle/>
+          <a:p>
+            <a:pPr algn="ctr"/>
+            <a:r>
+              <a:rPr lang="nl-NL" dirty="0"/>
+              <a:t>Fat</a:t>
+            </a:r>
+            <a:endParaRPr lang="en-GB" sz="1000" dirty="0"/>
+          </a:p>
+        </p:txBody>
+      </p:sp>
+      <p:sp>
+        <p:nvSpPr>
+          <p:cNvPr id="9" name="Rechthoek 8">
+            <a:extLst>
+              <a:ext uri="{FF2B5EF4-FFF2-40B4-BE49-F238E27FC236}">
+                <a16:creationId xmlns:a16="http://schemas.microsoft.com/office/drawing/2014/main" id="{76817DE5-8F82-EAB6-297B-7D0B1D0413B5}"/>
+              </a:ext>
+            </a:extLst>
+          </p:cNvPr>
+          <p:cNvSpPr/>
+          <p:nvPr/>
+        </p:nvSpPr>
+        <p:spPr>
+          <a:xfrm rot="5400000">
+            <a:off x="4191639" y="3037518"/>
+            <a:ext cx="2420682" cy="861296"/>
+          </a:xfrm>
+          <a:prstGeom prst="rect">
+            <a:avLst/>
+          </a:prstGeom>
+          <a:ln>
+            <a:solidFill>
+              <a:schemeClr val="tx1"/>
+            </a:solidFill>
+          </a:ln>
+        </p:spPr>
+        <p:style>
+          <a:lnRef idx="2">
+            <a:schemeClr val="accent5">
+              <a:shade val="50000"/>
+            </a:schemeClr>
+          </a:lnRef>
+          <a:fillRef idx="1">
+            <a:schemeClr val="accent5"/>
+          </a:fillRef>
+          <a:effectRef idx="0">
+            <a:schemeClr val="accent5"/>
+          </a:effectRef>
+          <a:fontRef idx="minor">
+            <a:schemeClr val="lt1"/>
+          </a:fontRef>
+        </p:style>
+        <p:txBody>
+          <a:bodyPr rtlCol="0" anchor="ctr"/>
+          <a:lstStyle/>
+          <a:p>
+            <a:pPr algn="ctr"/>
+            <a:r>
+              <a:rPr lang="nl-NL" dirty="0"/>
+              <a:t>Venous blood</a:t>
+            </a:r>
+            <a:endParaRPr lang="en-GB" dirty="0"/>
+          </a:p>
+        </p:txBody>
+      </p:sp>
+      <p:sp>
+        <p:nvSpPr>
+          <p:cNvPr id="10" name="Rechthoek 9">
+            <a:extLst>
+              <a:ext uri="{FF2B5EF4-FFF2-40B4-BE49-F238E27FC236}">
+                <a16:creationId xmlns:a16="http://schemas.microsoft.com/office/drawing/2014/main" id="{3AB82D61-2591-B062-00E9-A6848719EABD}"/>
+              </a:ext>
+            </a:extLst>
+          </p:cNvPr>
+          <p:cNvSpPr/>
+          <p:nvPr/>
+        </p:nvSpPr>
+        <p:spPr>
+          <a:xfrm rot="16200000">
+            <a:off x="2505" y="2981307"/>
+            <a:ext cx="2420680" cy="861296"/>
+          </a:xfrm>
+          <a:prstGeom prst="rect">
+            <a:avLst/>
+          </a:prstGeom>
+          <a:ln>
+            <a:solidFill>
+              <a:schemeClr val="tx1"/>
+            </a:solidFill>
+          </a:ln>
+        </p:spPr>
+        <p:style>
+          <a:lnRef idx="2">
+            <a:schemeClr val="accent5">
+              <a:shade val="50000"/>
+            </a:schemeClr>
+          </a:lnRef>
+          <a:fillRef idx="1">
+            <a:schemeClr val="accent5"/>
+          </a:fillRef>
+          <a:effectRef idx="0">
+            <a:schemeClr val="accent5"/>
+          </a:effectRef>
+          <a:fontRef idx="minor">
+            <a:schemeClr val="lt1"/>
+          </a:fontRef>
+        </p:style>
+        <p:txBody>
+          <a:bodyPr rtlCol="0" anchor="ctr"/>
+          <a:lstStyle/>
+          <a:p>
+            <a:pPr algn="ctr"/>
+            <a:r>
+              <a:rPr lang="nl-NL" dirty="0"/>
+              <a:t>Arterial blood</a:t>
+            </a:r>
+            <a:endParaRPr lang="en-GB" dirty="0"/>
+          </a:p>
+        </p:txBody>
+      </p:sp>
+      <p:cxnSp>
+        <p:nvCxnSpPr>
+          <p:cNvPr id="17" name="Verbindingslijn: gebogen 16">
+            <a:extLst>
+              <a:ext uri="{FF2B5EF4-FFF2-40B4-BE49-F238E27FC236}">
+                <a16:creationId xmlns:a16="http://schemas.microsoft.com/office/drawing/2014/main" id="{DB221298-433D-AAD8-779F-30D58F1A9128}"/>
+              </a:ext>
+            </a:extLst>
+          </p:cNvPr>
+          <p:cNvCxnSpPr>
+            <a:cxnSpLocks/>
+            <a:stCxn id="10" idx="1"/>
+            <a:endCxn id="5" idx="1"/>
+          </p:cNvCxnSpPr>
+          <p:nvPr/>
+        </p:nvCxnSpPr>
+        <p:spPr>
+          <a:xfrm rot="16200000" flipH="1">
+            <a:off x="896597" y="4938543"/>
+            <a:ext cx="857315" cy="224818"/>
+          </a:xfrm>
+          <a:prstGeom prst="bentConnector2">
+            <a:avLst/>
+          </a:prstGeom>
+          <a:ln>
+            <a:tailEnd type="triangle"/>
+          </a:ln>
+        </p:spPr>
+        <p:style>
+          <a:lnRef idx="3">
+            <a:schemeClr val="dk1"/>
+          </a:lnRef>
+          <a:fillRef idx="0">
+            <a:schemeClr val="dk1"/>
+          </a:fillRef>
+          <a:effectRef idx="2">
+            <a:schemeClr val="dk1"/>
+          </a:effectRef>
+          <a:fontRef idx="minor">
+            <a:schemeClr val="tx1"/>
+          </a:fontRef>
+        </p:style>
+      </p:cxnSp>
+      <p:cxnSp>
+        <p:nvCxnSpPr>
+          <p:cNvPr id="18" name="Rechte verbindingslijn met pijl 17">
+            <a:extLst>
+              <a:ext uri="{FF2B5EF4-FFF2-40B4-BE49-F238E27FC236}">
+                <a16:creationId xmlns:a16="http://schemas.microsoft.com/office/drawing/2014/main" id="{43CCCA62-E183-D13C-9298-68717468DCD0}"/>
+              </a:ext>
+            </a:extLst>
+          </p:cNvPr>
+          <p:cNvCxnSpPr>
+            <a:cxnSpLocks/>
+            <a:stCxn id="5" idx="0"/>
+          </p:cNvCxnSpPr>
+          <p:nvPr/>
+        </p:nvCxnSpPr>
+        <p:spPr>
+          <a:xfrm flipV="1">
+            <a:off x="2236074" y="4707329"/>
+            <a:ext cx="0" cy="442858"/>
+          </a:xfrm>
+          <a:prstGeom prst="straightConnector1">
+            <a:avLst/>
+          </a:prstGeom>
+          <a:ln>
+            <a:tailEnd type="triangle"/>
+          </a:ln>
+        </p:spPr>
+        <p:style>
+          <a:lnRef idx="3">
+            <a:schemeClr val="dk1"/>
+          </a:lnRef>
+          <a:fillRef idx="0">
+            <a:schemeClr val="dk1"/>
+          </a:fillRef>
+          <a:effectRef idx="2">
+            <a:schemeClr val="dk1"/>
+          </a:effectRef>
+          <a:fontRef idx="minor">
+            <a:schemeClr val="tx1"/>
+          </a:fontRef>
+        </p:style>
+      </p:cxnSp>
+      <p:cxnSp>
+        <p:nvCxnSpPr>
+          <p:cNvPr id="19" name="Rechte verbindingslijn met pijl 18">
+            <a:extLst>
+              <a:ext uri="{FF2B5EF4-FFF2-40B4-BE49-F238E27FC236}">
+                <a16:creationId xmlns:a16="http://schemas.microsoft.com/office/drawing/2014/main" id="{3E8E8143-0FE0-B051-239E-A37F6D7F3DD4}"/>
+              </a:ext>
+            </a:extLst>
+          </p:cNvPr>
+          <p:cNvCxnSpPr>
+            <a:cxnSpLocks/>
+            <a:stCxn id="4" idx="3"/>
+          </p:cNvCxnSpPr>
+          <p:nvPr/>
+        </p:nvCxnSpPr>
+        <p:spPr>
+          <a:xfrm>
+            <a:off x="4476620" y="4426585"/>
+            <a:ext cx="487833" cy="0"/>
+          </a:xfrm>
+          <a:prstGeom prst="straightConnector1">
+            <a:avLst/>
+          </a:prstGeom>
+          <a:ln>
+            <a:tailEnd type="triangle"/>
+          </a:ln>
+        </p:spPr>
+        <p:style>
+          <a:lnRef idx="3">
+            <a:schemeClr val="dk1"/>
+          </a:lnRef>
+          <a:fillRef idx="0">
+            <a:schemeClr val="dk1"/>
+          </a:fillRef>
+          <a:effectRef idx="2">
+            <a:schemeClr val="dk1"/>
+          </a:effectRef>
+          <a:fontRef idx="minor">
+            <a:schemeClr val="tx1"/>
+          </a:fontRef>
+        </p:style>
+      </p:cxnSp>
+      <p:cxnSp>
+        <p:nvCxnSpPr>
+          <p:cNvPr id="20" name="Rechte verbindingslijn met pijl 19">
+            <a:extLst>
+              <a:ext uri="{FF2B5EF4-FFF2-40B4-BE49-F238E27FC236}">
+                <a16:creationId xmlns:a16="http://schemas.microsoft.com/office/drawing/2014/main" id="{8F1C093A-5CCD-5D77-3EBB-917F6C726AD1}"/>
+              </a:ext>
+            </a:extLst>
+          </p:cNvPr>
+          <p:cNvCxnSpPr>
+            <a:cxnSpLocks/>
+            <a:endCxn id="4" idx="1"/>
+          </p:cNvCxnSpPr>
+          <p:nvPr/>
+        </p:nvCxnSpPr>
+        <p:spPr>
+          <a:xfrm>
+            <a:off x="1643493" y="4426585"/>
+            <a:ext cx="360515" cy="0"/>
+          </a:xfrm>
+          <a:prstGeom prst="straightConnector1">
+            <a:avLst/>
+          </a:prstGeom>
+          <a:ln>
+            <a:tailEnd type="triangle"/>
+          </a:ln>
+        </p:spPr>
+        <p:style>
+          <a:lnRef idx="3">
+            <a:schemeClr val="dk1"/>
+          </a:lnRef>
+          <a:fillRef idx="0">
+            <a:schemeClr val="dk1"/>
+          </a:fillRef>
+          <a:effectRef idx="2">
+            <a:schemeClr val="dk1"/>
+          </a:effectRef>
+          <a:fontRef idx="minor">
+            <a:schemeClr val="tx1"/>
+          </a:fontRef>
+        </p:style>
+      </p:cxnSp>
+      <p:cxnSp>
+        <p:nvCxnSpPr>
+          <p:cNvPr id="21" name="Rechte verbindingslijn met pijl 20">
+            <a:extLst>
+              <a:ext uri="{FF2B5EF4-FFF2-40B4-BE49-F238E27FC236}">
+                <a16:creationId xmlns:a16="http://schemas.microsoft.com/office/drawing/2014/main" id="{F0793454-C559-A94F-8C0E-A75CCCB267B3}"/>
+              </a:ext>
+            </a:extLst>
+          </p:cNvPr>
+          <p:cNvCxnSpPr>
+            <a:cxnSpLocks/>
+          </p:cNvCxnSpPr>
+          <p:nvPr/>
+        </p:nvCxnSpPr>
+        <p:spPr>
+          <a:xfrm>
+            <a:off x="1643493" y="3699608"/>
+            <a:ext cx="373085" cy="0"/>
+          </a:xfrm>
+          <a:prstGeom prst="straightConnector1">
+            <a:avLst/>
+          </a:prstGeom>
+          <a:ln>
+            <a:tailEnd type="triangle"/>
+          </a:ln>
+        </p:spPr>
+        <p:style>
+          <a:lnRef idx="3">
+            <a:schemeClr val="dk1"/>
+          </a:lnRef>
+          <a:fillRef idx="0">
+            <a:schemeClr val="dk1"/>
+          </a:fillRef>
+          <a:effectRef idx="2">
+            <a:schemeClr val="dk1"/>
+          </a:effectRef>
+          <a:fontRef idx="minor">
+            <a:schemeClr val="tx1"/>
+          </a:fontRef>
+        </p:style>
+      </p:cxnSp>
+      <p:cxnSp>
+        <p:nvCxnSpPr>
+          <p:cNvPr id="22" name="Rechte verbindingslijn met pijl 21">
+            <a:extLst>
+              <a:ext uri="{FF2B5EF4-FFF2-40B4-BE49-F238E27FC236}">
+                <a16:creationId xmlns:a16="http://schemas.microsoft.com/office/drawing/2014/main" id="{E54CFBAA-9F79-958D-4D43-A8A574837B7F}"/>
+              </a:ext>
+            </a:extLst>
+          </p:cNvPr>
+          <p:cNvCxnSpPr>
+            <a:cxnSpLocks/>
+          </p:cNvCxnSpPr>
+          <p:nvPr/>
+        </p:nvCxnSpPr>
+        <p:spPr>
+          <a:xfrm>
+            <a:off x="1643493" y="3122166"/>
+            <a:ext cx="373085" cy="0"/>
+          </a:xfrm>
+          <a:prstGeom prst="straightConnector1">
+            <a:avLst/>
+          </a:prstGeom>
+          <a:ln>
+            <a:tailEnd type="triangle"/>
+          </a:ln>
+        </p:spPr>
+        <p:style>
+          <a:lnRef idx="3">
+            <a:schemeClr val="dk1"/>
+          </a:lnRef>
+          <a:fillRef idx="0">
+            <a:schemeClr val="dk1"/>
+          </a:fillRef>
+          <a:effectRef idx="2">
+            <a:schemeClr val="dk1"/>
+          </a:effectRef>
+          <a:fontRef idx="minor">
+            <a:schemeClr val="tx1"/>
+          </a:fontRef>
+        </p:style>
+      </p:cxnSp>
+      <p:cxnSp>
+        <p:nvCxnSpPr>
+          <p:cNvPr id="23" name="Rechte verbindingslijn met pijl 22">
+            <a:extLst>
+              <a:ext uri="{FF2B5EF4-FFF2-40B4-BE49-F238E27FC236}">
+                <a16:creationId xmlns:a16="http://schemas.microsoft.com/office/drawing/2014/main" id="{386287C0-699C-E26B-69DF-6E4A37F9A6E4}"/>
+              </a:ext>
+            </a:extLst>
+          </p:cNvPr>
+          <p:cNvCxnSpPr>
+            <a:cxnSpLocks/>
+          </p:cNvCxnSpPr>
+          <p:nvPr/>
+        </p:nvCxnSpPr>
+        <p:spPr>
+          <a:xfrm>
+            <a:off x="1643493" y="2543325"/>
+            <a:ext cx="373085" cy="0"/>
+          </a:xfrm>
+          <a:prstGeom prst="straightConnector1">
+            <a:avLst/>
+          </a:prstGeom>
+          <a:ln>
+            <a:tailEnd type="triangle"/>
+          </a:ln>
+        </p:spPr>
+        <p:style>
+          <a:lnRef idx="3">
+            <a:schemeClr val="dk1"/>
+          </a:lnRef>
+          <a:fillRef idx="0">
+            <a:schemeClr val="dk1"/>
+          </a:fillRef>
+          <a:effectRef idx="2">
+            <a:schemeClr val="dk1"/>
+          </a:effectRef>
+          <a:fontRef idx="minor">
+            <a:schemeClr val="tx1"/>
+          </a:fontRef>
+        </p:style>
+      </p:cxnSp>
+      <p:cxnSp>
+        <p:nvCxnSpPr>
+          <p:cNvPr id="24" name="Rechte verbindingslijn met pijl 23">
+            <a:extLst>
+              <a:ext uri="{FF2B5EF4-FFF2-40B4-BE49-F238E27FC236}">
+                <a16:creationId xmlns:a16="http://schemas.microsoft.com/office/drawing/2014/main" id="{12576A79-0D4D-2725-EBAC-D6FCF2E70345}"/>
+              </a:ext>
+            </a:extLst>
+          </p:cNvPr>
+          <p:cNvCxnSpPr>
+            <a:cxnSpLocks/>
+          </p:cNvCxnSpPr>
+          <p:nvPr/>
+        </p:nvCxnSpPr>
+        <p:spPr>
+          <a:xfrm>
+            <a:off x="4476620" y="2528148"/>
+            <a:ext cx="494712" cy="0"/>
+          </a:xfrm>
+          <a:prstGeom prst="straightConnector1">
+            <a:avLst/>
+          </a:prstGeom>
+          <a:ln>
+            <a:tailEnd type="triangle"/>
+          </a:ln>
+        </p:spPr>
+        <p:style>
+          <a:lnRef idx="3">
+            <a:schemeClr val="dk1"/>
+          </a:lnRef>
+          <a:fillRef idx="0">
+            <a:schemeClr val="dk1"/>
+          </a:fillRef>
+          <a:effectRef idx="2">
+            <a:schemeClr val="dk1"/>
+          </a:effectRef>
+          <a:fontRef idx="minor">
+            <a:schemeClr val="tx1"/>
+          </a:fontRef>
+        </p:style>
+      </p:cxnSp>
+      <p:cxnSp>
+        <p:nvCxnSpPr>
+          <p:cNvPr id="25" name="Rechte verbindingslijn met pijl 24">
+            <a:extLst>
+              <a:ext uri="{FF2B5EF4-FFF2-40B4-BE49-F238E27FC236}">
+                <a16:creationId xmlns:a16="http://schemas.microsoft.com/office/drawing/2014/main" id="{128344CC-A2CB-8186-B224-C1D60CA08778}"/>
+              </a:ext>
+            </a:extLst>
+          </p:cNvPr>
+          <p:cNvCxnSpPr>
+            <a:cxnSpLocks/>
+            <a:stCxn id="6" idx="3"/>
+          </p:cNvCxnSpPr>
+          <p:nvPr/>
+        </p:nvCxnSpPr>
+        <p:spPr>
+          <a:xfrm flipV="1">
+            <a:off x="4489190" y="3114530"/>
+            <a:ext cx="475263" cy="1"/>
+          </a:xfrm>
+          <a:prstGeom prst="straightConnector1">
+            <a:avLst/>
+          </a:prstGeom>
+          <a:ln>
+            <a:tailEnd type="triangle"/>
+          </a:ln>
+        </p:spPr>
+        <p:style>
+          <a:lnRef idx="3">
+            <a:schemeClr val="dk1"/>
+          </a:lnRef>
+          <a:fillRef idx="0">
+            <a:schemeClr val="dk1"/>
+          </a:fillRef>
+          <a:effectRef idx="2">
+            <a:schemeClr val="dk1"/>
+          </a:effectRef>
+          <a:fontRef idx="minor">
+            <a:schemeClr val="tx1"/>
+          </a:fontRef>
+        </p:style>
+      </p:cxnSp>
+      <p:cxnSp>
+        <p:nvCxnSpPr>
+          <p:cNvPr id="26" name="Rechte verbindingslijn met pijl 25">
+            <a:extLst>
+              <a:ext uri="{FF2B5EF4-FFF2-40B4-BE49-F238E27FC236}">
+                <a16:creationId xmlns:a16="http://schemas.microsoft.com/office/drawing/2014/main" id="{09953E3C-B99A-2496-66F7-253F8BB5AD98}"/>
+              </a:ext>
+            </a:extLst>
+          </p:cNvPr>
+          <p:cNvCxnSpPr>
+            <a:cxnSpLocks/>
+          </p:cNvCxnSpPr>
+          <p:nvPr/>
+        </p:nvCxnSpPr>
+        <p:spPr>
+          <a:xfrm>
+            <a:off x="4476620" y="3709598"/>
+            <a:ext cx="494712" cy="0"/>
+          </a:xfrm>
+          <a:prstGeom prst="straightConnector1">
+            <a:avLst/>
+          </a:prstGeom>
+          <a:ln>
+            <a:tailEnd type="triangle"/>
+          </a:ln>
+        </p:spPr>
+        <p:style>
+          <a:lnRef idx="3">
+            <a:schemeClr val="dk1"/>
+          </a:lnRef>
+          <a:fillRef idx="0">
+            <a:schemeClr val="dk1"/>
+          </a:fillRef>
+          <a:effectRef idx="2">
+            <a:schemeClr val="dk1"/>
+          </a:effectRef>
+          <a:fontRef idx="minor">
+            <a:schemeClr val="tx1"/>
+          </a:fontRef>
+        </p:style>
+      </p:cxnSp>
+      <p:cxnSp>
+        <p:nvCxnSpPr>
+          <p:cNvPr id="39" name="Verbindingslijn: gebogen 38">
+            <a:extLst>
+              <a:ext uri="{FF2B5EF4-FFF2-40B4-BE49-F238E27FC236}">
+                <a16:creationId xmlns:a16="http://schemas.microsoft.com/office/drawing/2014/main" id="{000A8081-5A43-4473-939C-4ABD66910A14}"/>
+              </a:ext>
+            </a:extLst>
+          </p:cNvPr>
+          <p:cNvCxnSpPr>
+            <a:cxnSpLocks/>
+            <a:stCxn id="73" idx="3"/>
+            <a:endCxn id="5" idx="1"/>
+          </p:cNvCxnSpPr>
+          <p:nvPr/>
+        </p:nvCxnSpPr>
+        <p:spPr>
+          <a:xfrm flipV="1">
+            <a:off x="1024709" y="5479610"/>
+            <a:ext cx="412954" cy="573860"/>
+          </a:xfrm>
+          <a:prstGeom prst="bentConnector3">
+            <a:avLst>
+              <a:gd name="adj1" fmla="val 50000"/>
+            </a:avLst>
+          </a:prstGeom>
+          <a:ln>
+            <a:tailEnd type="triangle"/>
+          </a:ln>
+        </p:spPr>
+        <p:style>
+          <a:lnRef idx="3">
+            <a:schemeClr val="accent6"/>
+          </a:lnRef>
+          <a:fillRef idx="0">
+            <a:schemeClr val="accent6"/>
+          </a:fillRef>
+          <a:effectRef idx="2">
+            <a:schemeClr val="accent6"/>
+          </a:effectRef>
+          <a:fontRef idx="minor">
+            <a:schemeClr val="tx1"/>
+          </a:fontRef>
+        </p:style>
+      </p:cxnSp>
+      <p:sp>
+        <p:nvSpPr>
+          <p:cNvPr id="41" name="Rechthoek 40">
+            <a:extLst>
+              <a:ext uri="{FF2B5EF4-FFF2-40B4-BE49-F238E27FC236}">
+                <a16:creationId xmlns:a16="http://schemas.microsoft.com/office/drawing/2014/main" id="{5D944DA9-1767-9422-B960-781643B88F41}"/>
+              </a:ext>
+            </a:extLst>
+          </p:cNvPr>
+          <p:cNvSpPr/>
+          <p:nvPr/>
+        </p:nvSpPr>
+        <p:spPr>
+          <a:xfrm>
+            <a:off x="3175163" y="5158412"/>
+            <a:ext cx="739141" cy="634886"/>
+          </a:xfrm>
+          <a:prstGeom prst="rect">
+            <a:avLst/>
+          </a:prstGeom>
+          <a:solidFill>
+            <a:schemeClr val="accent2"/>
+          </a:solidFill>
+          <a:ln>
+            <a:solidFill>
+              <a:schemeClr val="tx1"/>
+            </a:solidFill>
+          </a:ln>
+        </p:spPr>
+        <p:style>
+          <a:lnRef idx="2">
+            <a:schemeClr val="accent5">
+              <a:shade val="50000"/>
+            </a:schemeClr>
+          </a:lnRef>
+          <a:fillRef idx="1">
+            <a:schemeClr val="accent5"/>
+          </a:fillRef>
+          <a:effectRef idx="0">
+            <a:schemeClr val="accent5"/>
+          </a:effectRef>
+          <a:fontRef idx="minor">
+            <a:schemeClr val="lt1"/>
+          </a:fontRef>
+        </p:style>
+        <p:txBody>
+          <a:bodyPr rtlCol="0" anchor="ctr"/>
+          <a:lstStyle/>
+          <a:p>
+            <a:pPr algn="ctr"/>
+            <a:r>
+              <a:rPr lang="en-US" sz="1200" dirty="0"/>
+              <a:t>Protein </a:t>
+            </a:r>
+            <a:r>
+              <a:rPr lang="nl-NL" sz="1200" dirty="0"/>
+              <a:t>binding</a:t>
+            </a:r>
+          </a:p>
+        </p:txBody>
+      </p:sp>
+      <p:sp>
+        <p:nvSpPr>
+          <p:cNvPr id="44" name="Rechthoek 43">
+            <a:extLst>
+              <a:ext uri="{FF2B5EF4-FFF2-40B4-BE49-F238E27FC236}">
+                <a16:creationId xmlns:a16="http://schemas.microsoft.com/office/drawing/2014/main" id="{20DB3A2D-3AA6-47C8-44FA-1E88BAC09845}"/>
+              </a:ext>
+            </a:extLst>
+          </p:cNvPr>
+          <p:cNvSpPr/>
+          <p:nvPr/>
+        </p:nvSpPr>
+        <p:spPr>
+          <a:xfrm>
+            <a:off x="2164170" y="5179187"/>
+            <a:ext cx="827770" cy="174104"/>
+          </a:xfrm>
+          <a:prstGeom prst="rect">
+            <a:avLst/>
+          </a:prstGeom>
+        </p:spPr>
+        <p:style>
+          <a:lnRef idx="2">
+            <a:schemeClr val="accent1">
+              <a:shade val="50000"/>
+            </a:schemeClr>
+          </a:lnRef>
+          <a:fillRef idx="1">
+            <a:schemeClr val="accent1"/>
+          </a:fillRef>
+          <a:effectRef idx="0">
+            <a:schemeClr val="accent1"/>
+          </a:effectRef>
+          <a:fontRef idx="minor">
+            <a:schemeClr val="lt1"/>
+          </a:fontRef>
+        </p:style>
+        <p:txBody>
+          <a:bodyPr rtlCol="0" anchor="ctr"/>
+          <a:lstStyle/>
+          <a:p>
+            <a:pPr algn="ctr"/>
+            <a:r>
+              <a:rPr lang="nl-NL" sz="900" dirty="0"/>
+              <a:t> Cystolic GSH</a:t>
+            </a:r>
+            <a:endParaRPr lang="en-GB" sz="900" dirty="0"/>
+          </a:p>
+        </p:txBody>
+      </p:sp>
+      <p:sp>
+        <p:nvSpPr>
+          <p:cNvPr id="45" name="Rechthoek 44">
+            <a:extLst>
+              <a:ext uri="{FF2B5EF4-FFF2-40B4-BE49-F238E27FC236}">
+                <a16:creationId xmlns:a16="http://schemas.microsoft.com/office/drawing/2014/main" id="{C12F5C9A-4F3C-C127-879C-78366153F9E0}"/>
+              </a:ext>
+            </a:extLst>
+          </p:cNvPr>
+          <p:cNvSpPr/>
+          <p:nvPr/>
+        </p:nvSpPr>
+        <p:spPr>
+          <a:xfrm>
+            <a:off x="3485451" y="4184844"/>
+            <a:ext cx="827770" cy="174104"/>
+          </a:xfrm>
+          <a:prstGeom prst="rect">
+            <a:avLst/>
+          </a:prstGeom>
+        </p:spPr>
+        <p:style>
+          <a:lnRef idx="2">
+            <a:schemeClr val="accent1">
+              <a:shade val="50000"/>
+            </a:schemeClr>
+          </a:lnRef>
+          <a:fillRef idx="1">
+            <a:schemeClr val="accent1"/>
+          </a:fillRef>
+          <a:effectRef idx="0">
+            <a:schemeClr val="accent1"/>
+          </a:effectRef>
+          <a:fontRef idx="minor">
+            <a:schemeClr val="lt1"/>
+          </a:fontRef>
+        </p:style>
+        <p:txBody>
+          <a:bodyPr rtlCol="0" anchor="ctr"/>
+          <a:lstStyle/>
+          <a:p>
+            <a:pPr algn="ctr"/>
+            <a:r>
+              <a:rPr lang="nl-NL" sz="900" dirty="0"/>
+              <a:t> Cystolic GSH</a:t>
+            </a:r>
+            <a:endParaRPr lang="en-GB" sz="900" dirty="0"/>
+          </a:p>
+        </p:txBody>
+      </p:sp>
+      <p:cxnSp>
+        <p:nvCxnSpPr>
+          <p:cNvPr id="46" name="Rechte verbindingslijn met pijl 45">
+            <a:extLst>
+              <a:ext uri="{FF2B5EF4-FFF2-40B4-BE49-F238E27FC236}">
+                <a16:creationId xmlns:a16="http://schemas.microsoft.com/office/drawing/2014/main" id="{01CFDA9B-3A11-D996-36F2-12EECEC5CAD0}"/>
+              </a:ext>
+            </a:extLst>
+          </p:cNvPr>
+          <p:cNvCxnSpPr>
+            <a:cxnSpLocks/>
+          </p:cNvCxnSpPr>
+          <p:nvPr/>
+        </p:nvCxnSpPr>
+        <p:spPr>
+          <a:xfrm flipV="1">
+            <a:off x="2945321" y="4928758"/>
+            <a:ext cx="0" cy="237131"/>
+          </a:xfrm>
+          <a:prstGeom prst="straightConnector1">
+            <a:avLst/>
+          </a:prstGeom>
+          <a:ln>
+            <a:prstDash val="dash"/>
+            <a:tailEnd type="triangle"/>
+          </a:ln>
+        </p:spPr>
+        <p:style>
+          <a:lnRef idx="3">
+            <a:schemeClr val="dk1"/>
+          </a:lnRef>
+          <a:fillRef idx="0">
+            <a:schemeClr val="dk1"/>
+          </a:fillRef>
+          <a:effectRef idx="2">
+            <a:schemeClr val="dk1"/>
+          </a:effectRef>
+          <a:fontRef idx="minor">
+            <a:schemeClr val="tx1"/>
+          </a:fontRef>
+        </p:style>
+      </p:cxnSp>
+      <p:cxnSp>
+        <p:nvCxnSpPr>
+          <p:cNvPr id="47" name="Rechte verbindingslijn met pijl 46">
+            <a:extLst>
+              <a:ext uri="{FF2B5EF4-FFF2-40B4-BE49-F238E27FC236}">
+                <a16:creationId xmlns:a16="http://schemas.microsoft.com/office/drawing/2014/main" id="{FF327ACF-8F04-4232-FCA8-DC5DB3A31993}"/>
+              </a:ext>
+            </a:extLst>
+          </p:cNvPr>
+          <p:cNvCxnSpPr>
+            <a:cxnSpLocks/>
+            <a:endCxn id="44" idx="0"/>
+          </p:cNvCxnSpPr>
+          <p:nvPr/>
+        </p:nvCxnSpPr>
+        <p:spPr>
+          <a:xfrm>
+            <a:off x="2578055" y="4928758"/>
+            <a:ext cx="0" cy="250429"/>
+          </a:xfrm>
+          <a:prstGeom prst="straightConnector1">
+            <a:avLst/>
+          </a:prstGeom>
+          <a:ln>
+            <a:prstDash val="dash"/>
+            <a:tailEnd type="triangle"/>
+          </a:ln>
+        </p:spPr>
+        <p:style>
+          <a:lnRef idx="3">
+            <a:schemeClr val="dk1"/>
+          </a:lnRef>
+          <a:fillRef idx="0">
+            <a:schemeClr val="dk1"/>
+          </a:fillRef>
+          <a:effectRef idx="2">
+            <a:schemeClr val="dk1"/>
+          </a:effectRef>
+          <a:fontRef idx="minor">
+            <a:schemeClr val="tx1"/>
+          </a:fontRef>
+        </p:style>
+      </p:cxnSp>
+      <p:cxnSp>
+        <p:nvCxnSpPr>
+          <p:cNvPr id="48" name="Rechte verbindingslijn met pijl 47">
+            <a:extLst>
+              <a:ext uri="{FF2B5EF4-FFF2-40B4-BE49-F238E27FC236}">
+                <a16:creationId xmlns:a16="http://schemas.microsoft.com/office/drawing/2014/main" id="{B28E13A3-FD73-AD9B-207F-9170C6808515}"/>
+              </a:ext>
+            </a:extLst>
+          </p:cNvPr>
+          <p:cNvCxnSpPr>
+            <a:cxnSpLocks/>
+          </p:cNvCxnSpPr>
+          <p:nvPr/>
+        </p:nvCxnSpPr>
+        <p:spPr>
+          <a:xfrm flipV="1">
+            <a:off x="4224782" y="3962400"/>
+            <a:ext cx="0" cy="231400"/>
+          </a:xfrm>
+          <a:prstGeom prst="straightConnector1">
+            <a:avLst/>
+          </a:prstGeom>
+          <a:ln>
+            <a:prstDash val="dash"/>
+            <a:tailEnd type="triangle"/>
+          </a:ln>
+        </p:spPr>
+        <p:style>
+          <a:lnRef idx="3">
+            <a:schemeClr val="dk1"/>
+          </a:lnRef>
+          <a:fillRef idx="0">
+            <a:schemeClr val="dk1"/>
+          </a:fillRef>
+          <a:effectRef idx="2">
+            <a:schemeClr val="dk1"/>
+          </a:effectRef>
+          <a:fontRef idx="minor">
+            <a:schemeClr val="tx1"/>
+          </a:fontRef>
+        </p:style>
+      </p:cxnSp>
+      <p:cxnSp>
+        <p:nvCxnSpPr>
+          <p:cNvPr id="49" name="Rechte verbindingslijn met pijl 48">
+            <a:extLst>
+              <a:ext uri="{FF2B5EF4-FFF2-40B4-BE49-F238E27FC236}">
+                <a16:creationId xmlns:a16="http://schemas.microsoft.com/office/drawing/2014/main" id="{9A64AE99-2EA4-D6B6-38EB-BBC56A2CE68C}"/>
+              </a:ext>
+            </a:extLst>
+          </p:cNvPr>
+          <p:cNvCxnSpPr>
+            <a:cxnSpLocks/>
+            <a:endCxn id="45" idx="0"/>
+          </p:cNvCxnSpPr>
+          <p:nvPr/>
+        </p:nvCxnSpPr>
+        <p:spPr>
+          <a:xfrm>
+            <a:off x="3899336" y="4019663"/>
+            <a:ext cx="0" cy="165181"/>
+          </a:xfrm>
+          <a:prstGeom prst="straightConnector1">
+            <a:avLst/>
+          </a:prstGeom>
+          <a:ln>
+            <a:prstDash val="dash"/>
+            <a:tailEnd type="triangle"/>
+          </a:ln>
+        </p:spPr>
+        <p:style>
+          <a:lnRef idx="3">
+            <a:schemeClr val="dk1"/>
+          </a:lnRef>
+          <a:fillRef idx="0">
+            <a:schemeClr val="dk1"/>
+          </a:fillRef>
+          <a:effectRef idx="2">
+            <a:schemeClr val="dk1"/>
+          </a:effectRef>
+          <a:fontRef idx="minor">
+            <a:schemeClr val="tx1"/>
+          </a:fontRef>
+        </p:style>
+      </p:cxnSp>
+      <p:cxnSp>
+        <p:nvCxnSpPr>
+          <p:cNvPr id="56" name="Verbindingslijn: gebogen 55">
+            <a:extLst>
+              <a:ext uri="{FF2B5EF4-FFF2-40B4-BE49-F238E27FC236}">
+                <a16:creationId xmlns:a16="http://schemas.microsoft.com/office/drawing/2014/main" id="{6DAEFE4D-49AD-EC4F-AB1F-A256E554100F}"/>
+              </a:ext>
+            </a:extLst>
+          </p:cNvPr>
+          <p:cNvCxnSpPr>
+            <a:cxnSpLocks/>
+            <a:stCxn id="9" idx="1"/>
+            <a:endCxn id="59" idx="3"/>
+          </p:cNvCxnSpPr>
+          <p:nvPr/>
+        </p:nvCxnSpPr>
+        <p:spPr>
+          <a:xfrm rot="16200000" flipV="1">
+            <a:off x="4464903" y="1320748"/>
+            <a:ext cx="459310" cy="1414844"/>
+          </a:xfrm>
+          <a:prstGeom prst="bentConnector2">
+            <a:avLst/>
+          </a:prstGeom>
+          <a:ln>
+            <a:tailEnd type="triangle"/>
+          </a:ln>
+        </p:spPr>
+        <p:style>
+          <a:lnRef idx="3">
+            <a:schemeClr val="dk1"/>
+          </a:lnRef>
+          <a:fillRef idx="0">
+            <a:schemeClr val="dk1"/>
+          </a:fillRef>
+          <a:effectRef idx="2">
+            <a:schemeClr val="dk1"/>
+          </a:effectRef>
+          <a:fontRef idx="minor">
+            <a:schemeClr val="tx1"/>
+          </a:fontRef>
+        </p:style>
+      </p:cxnSp>
+      <p:sp>
+        <p:nvSpPr>
+          <p:cNvPr id="59" name="Rechthoek 58">
+            <a:extLst>
+              <a:ext uri="{FF2B5EF4-FFF2-40B4-BE49-F238E27FC236}">
+                <a16:creationId xmlns:a16="http://schemas.microsoft.com/office/drawing/2014/main" id="{510327F0-09C6-715C-9C86-CB793F4D137A}"/>
+              </a:ext>
+            </a:extLst>
+          </p:cNvPr>
+          <p:cNvSpPr/>
+          <p:nvPr/>
+        </p:nvSpPr>
+        <p:spPr>
+          <a:xfrm>
+            <a:off x="2215582" y="1536648"/>
+            <a:ext cx="1771554" cy="523734"/>
+          </a:xfrm>
+          <a:prstGeom prst="rect">
+            <a:avLst/>
+          </a:prstGeom>
+          <a:ln>
+            <a:solidFill>
+              <a:schemeClr val="tx1"/>
+            </a:solidFill>
+          </a:ln>
+        </p:spPr>
+        <p:style>
+          <a:lnRef idx="2">
+            <a:schemeClr val="accent5">
+              <a:shade val="50000"/>
+            </a:schemeClr>
+          </a:lnRef>
+          <a:fillRef idx="1">
+            <a:schemeClr val="accent5"/>
+          </a:fillRef>
+          <a:effectRef idx="0">
+            <a:schemeClr val="accent5"/>
+          </a:effectRef>
+          <a:fontRef idx="minor">
+            <a:schemeClr val="lt1"/>
+          </a:fontRef>
+        </p:style>
+        <p:txBody>
+          <a:bodyPr rtlCol="0" anchor="ctr"/>
+          <a:lstStyle/>
+          <a:p>
+            <a:pPr algn="ctr"/>
+            <a:r>
+              <a:rPr lang="en-US" dirty="0"/>
+              <a:t>Lung</a:t>
+            </a:r>
+          </a:p>
+        </p:txBody>
+      </p:sp>
+      <p:cxnSp>
+        <p:nvCxnSpPr>
+          <p:cNvPr id="60" name="Verbindingslijn: gebogen 59">
+            <a:extLst>
+              <a:ext uri="{FF2B5EF4-FFF2-40B4-BE49-F238E27FC236}">
+                <a16:creationId xmlns:a16="http://schemas.microsoft.com/office/drawing/2014/main" id="{ACCA8DB0-2E63-4B78-09C8-678AF12B89F9}"/>
+              </a:ext>
+            </a:extLst>
+          </p:cNvPr>
+          <p:cNvCxnSpPr>
+            <a:cxnSpLocks/>
+            <a:stCxn id="59" idx="1"/>
+            <a:endCxn id="10" idx="3"/>
+          </p:cNvCxnSpPr>
+          <p:nvPr/>
+        </p:nvCxnSpPr>
+        <p:spPr>
+          <a:xfrm rot="10800000" flipV="1">
+            <a:off x="1212846" y="1798515"/>
+            <a:ext cx="1002737" cy="403100"/>
+          </a:xfrm>
+          <a:prstGeom prst="bentConnector2">
+            <a:avLst/>
+          </a:prstGeom>
+          <a:ln>
+            <a:tailEnd type="triangle"/>
+          </a:ln>
+        </p:spPr>
+        <p:style>
+          <a:lnRef idx="3">
+            <a:schemeClr val="dk1"/>
+          </a:lnRef>
+          <a:fillRef idx="0">
+            <a:schemeClr val="dk1"/>
+          </a:fillRef>
+          <a:effectRef idx="2">
+            <a:schemeClr val="dk1"/>
+          </a:effectRef>
+          <a:fontRef idx="minor">
+            <a:schemeClr val="tx1"/>
+          </a:fontRef>
+        </p:style>
+      </p:cxnSp>
+      <p:cxnSp>
+        <p:nvCxnSpPr>
+          <p:cNvPr id="67" name="Rechte verbindingslijn met pijl 66">
+            <a:extLst>
+              <a:ext uri="{FF2B5EF4-FFF2-40B4-BE49-F238E27FC236}">
+                <a16:creationId xmlns:a16="http://schemas.microsoft.com/office/drawing/2014/main" id="{AFA23721-7A38-47DB-3CB3-DC49BF4871AD}"/>
+              </a:ext>
+            </a:extLst>
+          </p:cNvPr>
+          <p:cNvCxnSpPr>
+            <a:cxnSpLocks/>
+            <a:stCxn id="4" idx="2"/>
+            <a:endCxn id="41" idx="0"/>
+          </p:cNvCxnSpPr>
+          <p:nvPr/>
+        </p:nvCxnSpPr>
+        <p:spPr>
+          <a:xfrm>
+            <a:off x="3240314" y="4709186"/>
+            <a:ext cx="304420" cy="449226"/>
+          </a:xfrm>
+          <a:prstGeom prst="straightConnector1">
+            <a:avLst/>
+          </a:prstGeom>
+          <a:ln>
+            <a:tailEnd type="triangle"/>
+          </a:ln>
+        </p:spPr>
+        <p:style>
+          <a:lnRef idx="3">
+            <a:schemeClr val="dk1"/>
+          </a:lnRef>
+          <a:fillRef idx="0">
+            <a:schemeClr val="dk1"/>
+          </a:fillRef>
+          <a:effectRef idx="2">
+            <a:schemeClr val="dk1"/>
+          </a:effectRef>
+          <a:fontRef idx="minor">
+            <a:schemeClr val="tx1"/>
+          </a:fontRef>
+        </p:style>
+      </p:cxnSp>
+      <p:sp>
+        <p:nvSpPr>
+          <p:cNvPr id="69" name="Rechthoek 68">
+            <a:extLst>
+              <a:ext uri="{FF2B5EF4-FFF2-40B4-BE49-F238E27FC236}">
+                <a16:creationId xmlns:a16="http://schemas.microsoft.com/office/drawing/2014/main" id="{A3C8443D-BEFA-2B7C-518F-0E9A4946A7BA}"/>
+              </a:ext>
+            </a:extLst>
+          </p:cNvPr>
+          <p:cNvSpPr/>
+          <p:nvPr/>
+        </p:nvSpPr>
+        <p:spPr>
+          <a:xfrm>
+            <a:off x="2215580" y="1146154"/>
+            <a:ext cx="1771555" cy="403872"/>
+          </a:xfrm>
+          <a:prstGeom prst="rect">
+            <a:avLst/>
+          </a:prstGeom>
+          <a:ln>
+            <a:solidFill>
+              <a:schemeClr val="tx1"/>
+            </a:solidFill>
+          </a:ln>
+        </p:spPr>
+        <p:style>
+          <a:lnRef idx="2">
+            <a:schemeClr val="accent5">
+              <a:shade val="50000"/>
+            </a:schemeClr>
+          </a:lnRef>
+          <a:fillRef idx="1">
+            <a:schemeClr val="accent5"/>
+          </a:fillRef>
+          <a:effectRef idx="0">
+            <a:schemeClr val="accent5"/>
+          </a:effectRef>
+          <a:fontRef idx="minor">
+            <a:schemeClr val="lt1"/>
+          </a:fontRef>
+        </p:style>
+        <p:txBody>
+          <a:bodyPr rtlCol="0" anchor="ctr"/>
+          <a:lstStyle/>
+          <a:p>
+            <a:pPr algn="ctr"/>
+            <a:r>
+              <a:rPr lang="en-US" dirty="0"/>
+              <a:t>Alveolar air</a:t>
+            </a:r>
+          </a:p>
+        </p:txBody>
+      </p:sp>
+      <p:cxnSp>
+        <p:nvCxnSpPr>
+          <p:cNvPr id="70" name="Rechte verbindingslijn met pijl 69">
+            <a:extLst>
+              <a:ext uri="{FF2B5EF4-FFF2-40B4-BE49-F238E27FC236}">
+                <a16:creationId xmlns:a16="http://schemas.microsoft.com/office/drawing/2014/main" id="{714AAF61-0471-7A36-B17E-8981BA995D28}"/>
+              </a:ext>
+            </a:extLst>
+          </p:cNvPr>
+          <p:cNvCxnSpPr>
+            <a:cxnSpLocks/>
+            <a:stCxn id="77" idx="3"/>
+            <a:endCxn id="69" idx="1"/>
+          </p:cNvCxnSpPr>
+          <p:nvPr/>
+        </p:nvCxnSpPr>
+        <p:spPr>
+          <a:xfrm>
+            <a:off x="1325254" y="1344300"/>
+            <a:ext cx="890326" cy="3790"/>
+          </a:xfrm>
+          <a:prstGeom prst="straightConnector1">
+            <a:avLst/>
+          </a:prstGeom>
+          <a:ln>
+            <a:tailEnd type="triangle"/>
+          </a:ln>
+        </p:spPr>
+        <p:style>
+          <a:lnRef idx="3">
+            <a:schemeClr val="accent6"/>
+          </a:lnRef>
+          <a:fillRef idx="0">
+            <a:schemeClr val="accent6"/>
+          </a:fillRef>
+          <a:effectRef idx="2">
+            <a:schemeClr val="accent6"/>
+          </a:effectRef>
+          <a:fontRef idx="minor">
+            <a:schemeClr val="tx1"/>
+          </a:fontRef>
+        </p:style>
+      </p:cxnSp>
+      <p:sp>
+        <p:nvSpPr>
+          <p:cNvPr id="73" name="Rechthoek 72">
+            <a:extLst>
+              <a:ext uri="{FF2B5EF4-FFF2-40B4-BE49-F238E27FC236}">
+                <a16:creationId xmlns:a16="http://schemas.microsoft.com/office/drawing/2014/main" id="{6576AAD3-3666-0C5D-500B-E3504B90427E}"/>
+              </a:ext>
+            </a:extLst>
+          </p:cNvPr>
+          <p:cNvSpPr/>
+          <p:nvPr/>
+        </p:nvSpPr>
+        <p:spPr>
+          <a:xfrm>
+            <a:off x="163411" y="5661055"/>
+            <a:ext cx="861298" cy="784829"/>
+          </a:xfrm>
+          <a:prstGeom prst="rect">
+            <a:avLst/>
+          </a:prstGeom>
+          <a:solidFill>
+            <a:srgbClr val="00B050"/>
+          </a:solidFill>
+          <a:ln>
+            <a:solidFill>
+              <a:schemeClr val="tx1"/>
+            </a:solidFill>
+          </a:ln>
+        </p:spPr>
+        <p:style>
+          <a:lnRef idx="2">
+            <a:schemeClr val="accent5">
+              <a:shade val="50000"/>
+            </a:schemeClr>
+          </a:lnRef>
+          <a:fillRef idx="1">
+            <a:schemeClr val="accent5"/>
+          </a:fillRef>
+          <a:effectRef idx="0">
+            <a:schemeClr val="accent5"/>
+          </a:effectRef>
+          <a:fontRef idx="minor">
+            <a:schemeClr val="lt1"/>
+          </a:fontRef>
+        </p:style>
+        <p:txBody>
+          <a:bodyPr rtlCol="0" anchor="ctr"/>
+          <a:lstStyle/>
+          <a:p>
+            <a:pPr algn="ctr"/>
+            <a:r>
+              <a:rPr lang="nl-NL" sz="1200" dirty="0"/>
+              <a:t>Oral exposure</a:t>
+            </a:r>
+            <a:endParaRPr lang="en-GB" sz="1200" dirty="0"/>
+          </a:p>
+        </p:txBody>
+      </p:sp>
+      <p:sp>
+        <p:nvSpPr>
+          <p:cNvPr id="77" name="Rechthoek 76">
+            <a:extLst>
+              <a:ext uri="{FF2B5EF4-FFF2-40B4-BE49-F238E27FC236}">
+                <a16:creationId xmlns:a16="http://schemas.microsoft.com/office/drawing/2014/main" id="{0D42A1AA-5290-C765-9524-3F9E9EBBAEEF}"/>
+              </a:ext>
+            </a:extLst>
+          </p:cNvPr>
+          <p:cNvSpPr/>
+          <p:nvPr/>
+        </p:nvSpPr>
+        <p:spPr>
+          <a:xfrm>
+            <a:off x="463956" y="1076629"/>
+            <a:ext cx="861298" cy="535342"/>
+          </a:xfrm>
+          <a:prstGeom prst="rect">
+            <a:avLst/>
+          </a:prstGeom>
+          <a:solidFill>
+            <a:srgbClr val="00B050"/>
+          </a:solidFill>
+          <a:ln>
+            <a:solidFill>
+              <a:schemeClr val="tx1"/>
+            </a:solidFill>
+          </a:ln>
+        </p:spPr>
+        <p:style>
+          <a:lnRef idx="2">
+            <a:schemeClr val="accent5">
+              <a:shade val="50000"/>
+            </a:schemeClr>
+          </a:lnRef>
+          <a:fillRef idx="1">
+            <a:schemeClr val="accent5"/>
+          </a:fillRef>
+          <a:effectRef idx="0">
+            <a:schemeClr val="accent5"/>
+          </a:effectRef>
+          <a:fontRef idx="minor">
+            <a:schemeClr val="lt1"/>
+          </a:fontRef>
+        </p:style>
+        <p:txBody>
+          <a:bodyPr rtlCol="0" anchor="ctr"/>
+          <a:lstStyle/>
+          <a:p>
+            <a:pPr algn="ctr"/>
+            <a:r>
+              <a:rPr lang="en-US" sz="1200" dirty="0"/>
+              <a:t>Inhalation</a:t>
+            </a:r>
+          </a:p>
+        </p:txBody>
+      </p:sp>
+      <p:sp>
+        <p:nvSpPr>
+          <p:cNvPr id="83" name="Rechthoek 82">
+            <a:extLst>
+              <a:ext uri="{FF2B5EF4-FFF2-40B4-BE49-F238E27FC236}">
+                <a16:creationId xmlns:a16="http://schemas.microsoft.com/office/drawing/2014/main" id="{B78EFE11-1B44-E782-48B0-240AA5A11081}"/>
+              </a:ext>
+            </a:extLst>
+          </p:cNvPr>
+          <p:cNvSpPr/>
+          <p:nvPr/>
+        </p:nvSpPr>
+        <p:spPr>
+          <a:xfrm>
+            <a:off x="8275271" y="4043901"/>
+            <a:ext cx="2472612" cy="565202"/>
+          </a:xfrm>
+          <a:prstGeom prst="rect">
+            <a:avLst/>
+          </a:prstGeom>
+          <a:ln>
+            <a:solidFill>
+              <a:schemeClr val="tx1"/>
+            </a:solidFill>
+          </a:ln>
+        </p:spPr>
+        <p:style>
+          <a:lnRef idx="2">
+            <a:schemeClr val="accent5">
+              <a:shade val="50000"/>
+            </a:schemeClr>
+          </a:lnRef>
+          <a:fillRef idx="1">
+            <a:schemeClr val="accent5"/>
+          </a:fillRef>
+          <a:effectRef idx="0">
+            <a:schemeClr val="accent5"/>
+          </a:effectRef>
+          <a:fontRef idx="minor">
+            <a:schemeClr val="lt1"/>
+          </a:fontRef>
+        </p:style>
+        <p:txBody>
+          <a:bodyPr rtlCol="0" anchor="ctr"/>
+          <a:lstStyle/>
+          <a:p>
+            <a:pPr algn="ctr"/>
+            <a:r>
+              <a:rPr lang="nl-NL" dirty="0"/>
+              <a:t>Liver</a:t>
+            </a:r>
+            <a:endParaRPr lang="en-GB" sz="500" dirty="0"/>
+          </a:p>
+        </p:txBody>
+      </p:sp>
+      <p:sp>
+        <p:nvSpPr>
+          <p:cNvPr id="84" name="Rechthoek 83">
+            <a:extLst>
+              <a:ext uri="{FF2B5EF4-FFF2-40B4-BE49-F238E27FC236}">
+                <a16:creationId xmlns:a16="http://schemas.microsoft.com/office/drawing/2014/main" id="{6DB123AE-EE90-B7CA-5B1E-3D5D67AB75B8}"/>
+              </a:ext>
+            </a:extLst>
+          </p:cNvPr>
+          <p:cNvSpPr/>
+          <p:nvPr/>
+        </p:nvSpPr>
+        <p:spPr>
+          <a:xfrm>
+            <a:off x="7708926" y="5050104"/>
+            <a:ext cx="1596821" cy="658845"/>
+          </a:xfrm>
+          <a:prstGeom prst="rect">
+            <a:avLst/>
+          </a:prstGeom>
+          <a:ln>
+            <a:solidFill>
+              <a:schemeClr val="tx1"/>
+            </a:solidFill>
+          </a:ln>
+        </p:spPr>
+        <p:style>
+          <a:lnRef idx="2">
+            <a:schemeClr val="accent5">
+              <a:shade val="50000"/>
+            </a:schemeClr>
+          </a:lnRef>
+          <a:fillRef idx="1">
+            <a:schemeClr val="accent5"/>
+          </a:fillRef>
+          <a:effectRef idx="0">
+            <a:schemeClr val="accent5"/>
+          </a:effectRef>
+          <a:fontRef idx="minor">
+            <a:schemeClr val="lt1"/>
+          </a:fontRef>
+        </p:style>
+        <p:txBody>
+          <a:bodyPr rtlCol="0" anchor="ctr"/>
+          <a:lstStyle/>
+          <a:p>
+            <a:pPr algn="ctr"/>
+            <a:r>
+              <a:rPr lang="nl-NL" dirty="0"/>
+              <a:t>Small intestine</a:t>
+            </a:r>
+            <a:endParaRPr lang="en-GB" dirty="0"/>
+          </a:p>
+        </p:txBody>
+      </p:sp>
+      <p:sp>
+        <p:nvSpPr>
+          <p:cNvPr id="85" name="Rechthoek 84">
+            <a:extLst>
+              <a:ext uri="{FF2B5EF4-FFF2-40B4-BE49-F238E27FC236}">
+                <a16:creationId xmlns:a16="http://schemas.microsoft.com/office/drawing/2014/main" id="{F728872E-E442-C695-692B-0AAE387C7F65}"/>
+              </a:ext>
+            </a:extLst>
+          </p:cNvPr>
+          <p:cNvSpPr/>
+          <p:nvPr/>
+        </p:nvSpPr>
+        <p:spPr>
+          <a:xfrm>
+            <a:off x="8287841" y="2837166"/>
+            <a:ext cx="2472612" cy="354563"/>
+          </a:xfrm>
+          <a:prstGeom prst="rect">
+            <a:avLst/>
+          </a:prstGeom>
+          <a:ln>
+            <a:solidFill>
+              <a:schemeClr val="tx1"/>
+            </a:solidFill>
+          </a:ln>
+        </p:spPr>
+        <p:style>
+          <a:lnRef idx="2">
+            <a:schemeClr val="accent5">
+              <a:shade val="50000"/>
+            </a:schemeClr>
+          </a:lnRef>
+          <a:fillRef idx="1">
+            <a:schemeClr val="accent5"/>
+          </a:fillRef>
+          <a:effectRef idx="0">
+            <a:schemeClr val="accent5"/>
+          </a:effectRef>
+          <a:fontRef idx="minor">
+            <a:schemeClr val="lt1"/>
+          </a:fontRef>
+        </p:style>
+        <p:txBody>
+          <a:bodyPr rtlCol="0" anchor="ctr"/>
+          <a:lstStyle/>
+          <a:p>
+            <a:pPr algn="ctr"/>
+            <a:r>
+              <a:rPr lang="nl-NL" dirty="0"/>
+              <a:t>Slowly perfused tissue</a:t>
+            </a:r>
+            <a:endParaRPr lang="en-GB" dirty="0"/>
+          </a:p>
+        </p:txBody>
+      </p:sp>
+      <p:sp>
+        <p:nvSpPr>
+          <p:cNvPr id="86" name="Rechthoek 85">
+            <a:extLst>
+              <a:ext uri="{FF2B5EF4-FFF2-40B4-BE49-F238E27FC236}">
+                <a16:creationId xmlns:a16="http://schemas.microsoft.com/office/drawing/2014/main" id="{F888A603-A3BC-F1D2-1F69-267AF6233D91}"/>
+              </a:ext>
+            </a:extLst>
+          </p:cNvPr>
+          <p:cNvSpPr/>
+          <p:nvPr/>
+        </p:nvSpPr>
+        <p:spPr>
+          <a:xfrm>
+            <a:off x="8275271" y="3411955"/>
+            <a:ext cx="2472612" cy="354563"/>
+          </a:xfrm>
+          <a:prstGeom prst="rect">
+            <a:avLst/>
+          </a:prstGeom>
+          <a:ln>
+            <a:solidFill>
+              <a:schemeClr val="tx1"/>
+            </a:solidFill>
+          </a:ln>
+        </p:spPr>
+        <p:style>
+          <a:lnRef idx="2">
+            <a:schemeClr val="accent5">
+              <a:shade val="50000"/>
+            </a:schemeClr>
+          </a:lnRef>
+          <a:fillRef idx="1">
+            <a:schemeClr val="accent5"/>
+          </a:fillRef>
+          <a:effectRef idx="0">
+            <a:schemeClr val="accent5"/>
+          </a:effectRef>
+          <a:fontRef idx="minor">
+            <a:schemeClr val="lt1"/>
+          </a:fontRef>
+        </p:style>
+        <p:txBody>
+          <a:bodyPr rtlCol="0" anchor="ctr"/>
+          <a:lstStyle/>
+          <a:p>
+            <a:pPr algn="ctr"/>
+            <a:r>
+              <a:rPr lang="nl-NL" dirty="0"/>
+              <a:t>Richly perfused tissue</a:t>
+            </a:r>
+            <a:endParaRPr lang="en-GB" dirty="0"/>
+          </a:p>
+        </p:txBody>
+      </p:sp>
+      <p:sp>
+        <p:nvSpPr>
+          <p:cNvPr id="87" name="Rechthoek 86">
+            <a:extLst>
+              <a:ext uri="{FF2B5EF4-FFF2-40B4-BE49-F238E27FC236}">
+                <a16:creationId xmlns:a16="http://schemas.microsoft.com/office/drawing/2014/main" id="{0B307C00-E38B-1808-DEA2-0D4C8888D4E7}"/>
+              </a:ext>
+            </a:extLst>
+          </p:cNvPr>
+          <p:cNvSpPr/>
+          <p:nvPr/>
+        </p:nvSpPr>
+        <p:spPr>
+          <a:xfrm>
+            <a:off x="8275271" y="2257825"/>
+            <a:ext cx="2472612" cy="354563"/>
+          </a:xfrm>
+          <a:prstGeom prst="rect">
+            <a:avLst/>
+          </a:prstGeom>
+          <a:ln>
+            <a:solidFill>
+              <a:schemeClr val="tx1"/>
+            </a:solidFill>
+          </a:ln>
+        </p:spPr>
+        <p:style>
+          <a:lnRef idx="2">
+            <a:schemeClr val="accent5">
+              <a:shade val="50000"/>
+            </a:schemeClr>
+          </a:lnRef>
+          <a:fillRef idx="1">
+            <a:schemeClr val="accent5"/>
+          </a:fillRef>
+          <a:effectRef idx="0">
+            <a:schemeClr val="accent5"/>
+          </a:effectRef>
+          <a:fontRef idx="minor">
+            <a:schemeClr val="lt1"/>
+          </a:fontRef>
+        </p:style>
+        <p:txBody>
+          <a:bodyPr rtlCol="0" anchor="ctr"/>
+          <a:lstStyle/>
+          <a:p>
+            <a:pPr algn="ctr"/>
+            <a:r>
+              <a:rPr lang="nl-NL" dirty="0"/>
+              <a:t>Fat</a:t>
+            </a:r>
+            <a:endParaRPr lang="en-GB" sz="1000" dirty="0"/>
+          </a:p>
+        </p:txBody>
+      </p:sp>
+      <p:sp>
+        <p:nvSpPr>
+          <p:cNvPr id="88" name="Rechthoek 87">
+            <a:extLst>
+              <a:ext uri="{FF2B5EF4-FFF2-40B4-BE49-F238E27FC236}">
+                <a16:creationId xmlns:a16="http://schemas.microsoft.com/office/drawing/2014/main" id="{972398AF-0939-B9F6-C35A-8F1BCF52DB51}"/>
+              </a:ext>
+            </a:extLst>
+          </p:cNvPr>
+          <p:cNvSpPr/>
+          <p:nvPr/>
+        </p:nvSpPr>
+        <p:spPr>
+          <a:xfrm rot="5400000">
+            <a:off x="10449048" y="2936565"/>
+            <a:ext cx="2420682" cy="861296"/>
+          </a:xfrm>
+          <a:prstGeom prst="rect">
+            <a:avLst/>
+          </a:prstGeom>
+          <a:ln>
+            <a:solidFill>
+              <a:schemeClr val="tx1"/>
+            </a:solidFill>
+          </a:ln>
+        </p:spPr>
+        <p:style>
+          <a:lnRef idx="2">
+            <a:schemeClr val="accent5">
+              <a:shade val="50000"/>
+            </a:schemeClr>
+          </a:lnRef>
+          <a:fillRef idx="1">
+            <a:schemeClr val="accent5"/>
+          </a:fillRef>
+          <a:effectRef idx="0">
+            <a:schemeClr val="accent5"/>
+          </a:effectRef>
+          <a:fontRef idx="minor">
+            <a:schemeClr val="lt1"/>
+          </a:fontRef>
+        </p:style>
+        <p:txBody>
+          <a:bodyPr rtlCol="0" anchor="ctr"/>
+          <a:lstStyle/>
+          <a:p>
+            <a:pPr algn="ctr"/>
+            <a:r>
+              <a:rPr lang="nl-NL" dirty="0"/>
+              <a:t>Venous blood</a:t>
+            </a:r>
+            <a:endParaRPr lang="en-GB" dirty="0"/>
+          </a:p>
+        </p:txBody>
+      </p:sp>
+      <p:sp>
+        <p:nvSpPr>
+          <p:cNvPr id="89" name="Rechthoek 88">
+            <a:extLst>
+              <a:ext uri="{FF2B5EF4-FFF2-40B4-BE49-F238E27FC236}">
+                <a16:creationId xmlns:a16="http://schemas.microsoft.com/office/drawing/2014/main" id="{BC67523A-C506-900E-8A63-3D26A48C82CB}"/>
+              </a:ext>
+            </a:extLst>
+          </p:cNvPr>
+          <p:cNvSpPr/>
+          <p:nvPr/>
+        </p:nvSpPr>
+        <p:spPr>
+          <a:xfrm rot="16200000">
+            <a:off x="6162115" y="2882770"/>
+            <a:ext cx="2420680" cy="861296"/>
+          </a:xfrm>
+          <a:prstGeom prst="rect">
+            <a:avLst/>
+          </a:prstGeom>
+          <a:ln>
+            <a:solidFill>
+              <a:schemeClr val="tx1"/>
+            </a:solidFill>
+          </a:ln>
+        </p:spPr>
+        <p:style>
+          <a:lnRef idx="2">
+            <a:schemeClr val="accent5">
+              <a:shade val="50000"/>
+            </a:schemeClr>
+          </a:lnRef>
+          <a:fillRef idx="1">
+            <a:schemeClr val="accent5"/>
+          </a:fillRef>
+          <a:effectRef idx="0">
+            <a:schemeClr val="accent5"/>
+          </a:effectRef>
+          <a:fontRef idx="minor">
+            <a:schemeClr val="lt1"/>
+          </a:fontRef>
+        </p:style>
+        <p:txBody>
+          <a:bodyPr rtlCol="0" anchor="ctr"/>
+          <a:lstStyle/>
+          <a:p>
+            <a:pPr algn="ctr"/>
+            <a:r>
+              <a:rPr lang="nl-NL" dirty="0"/>
+              <a:t>Arterial blood</a:t>
+            </a:r>
+            <a:endParaRPr lang="en-GB" dirty="0"/>
+          </a:p>
+        </p:txBody>
+      </p:sp>
+      <p:cxnSp>
+        <p:nvCxnSpPr>
+          <p:cNvPr id="90" name="Verbindingslijn: gebogen 89">
+            <a:extLst>
+              <a:ext uri="{FF2B5EF4-FFF2-40B4-BE49-F238E27FC236}">
+                <a16:creationId xmlns:a16="http://schemas.microsoft.com/office/drawing/2014/main" id="{6E2939F7-AED7-1216-7B97-DD11597D979A}"/>
+              </a:ext>
+            </a:extLst>
+          </p:cNvPr>
+          <p:cNvCxnSpPr>
+            <a:cxnSpLocks/>
+            <a:stCxn id="89" idx="1"/>
+            <a:endCxn id="84" idx="1"/>
+          </p:cNvCxnSpPr>
+          <p:nvPr/>
+        </p:nvCxnSpPr>
+        <p:spPr>
+          <a:xfrm rot="16200000" flipH="1">
+            <a:off x="7112806" y="4783406"/>
+            <a:ext cx="855769" cy="336471"/>
+          </a:xfrm>
+          <a:prstGeom prst="bentConnector2">
+            <a:avLst/>
+          </a:prstGeom>
+          <a:ln>
+            <a:tailEnd type="triangle"/>
+          </a:ln>
+        </p:spPr>
+        <p:style>
+          <a:lnRef idx="3">
+            <a:schemeClr val="dk1"/>
+          </a:lnRef>
+          <a:fillRef idx="0">
+            <a:schemeClr val="dk1"/>
+          </a:fillRef>
+          <a:effectRef idx="2">
+            <a:schemeClr val="dk1"/>
+          </a:effectRef>
+          <a:fontRef idx="minor">
+            <a:schemeClr val="tx1"/>
+          </a:fontRef>
+        </p:style>
+      </p:cxnSp>
+      <p:cxnSp>
+        <p:nvCxnSpPr>
+          <p:cNvPr id="91" name="Rechte verbindingslijn met pijl 90">
+            <a:extLst>
+              <a:ext uri="{FF2B5EF4-FFF2-40B4-BE49-F238E27FC236}">
+                <a16:creationId xmlns:a16="http://schemas.microsoft.com/office/drawing/2014/main" id="{DEB36DED-83E3-FED0-0C9D-531CEF9892A0}"/>
+              </a:ext>
+            </a:extLst>
+          </p:cNvPr>
+          <p:cNvCxnSpPr>
+            <a:cxnSpLocks/>
+            <a:stCxn id="84" idx="0"/>
+          </p:cNvCxnSpPr>
+          <p:nvPr/>
+        </p:nvCxnSpPr>
+        <p:spPr>
+          <a:xfrm flipV="1">
+            <a:off x="8507337" y="4607246"/>
+            <a:ext cx="0" cy="442858"/>
+          </a:xfrm>
+          <a:prstGeom prst="straightConnector1">
+            <a:avLst/>
+          </a:prstGeom>
+          <a:ln>
+            <a:tailEnd type="triangle"/>
+          </a:ln>
+        </p:spPr>
+        <p:style>
+          <a:lnRef idx="3">
+            <a:schemeClr val="dk1"/>
+          </a:lnRef>
+          <a:fillRef idx="0">
+            <a:schemeClr val="dk1"/>
+          </a:fillRef>
+          <a:effectRef idx="2">
+            <a:schemeClr val="dk1"/>
+          </a:effectRef>
+          <a:fontRef idx="minor">
+            <a:schemeClr val="tx1"/>
+          </a:fontRef>
+        </p:style>
+      </p:cxnSp>
+      <p:cxnSp>
+        <p:nvCxnSpPr>
+          <p:cNvPr id="92" name="Rechte verbindingslijn met pijl 91">
+            <a:extLst>
+              <a:ext uri="{FF2B5EF4-FFF2-40B4-BE49-F238E27FC236}">
+                <a16:creationId xmlns:a16="http://schemas.microsoft.com/office/drawing/2014/main" id="{E002A867-B348-D543-2054-50DC18165167}"/>
+              </a:ext>
+            </a:extLst>
+          </p:cNvPr>
+          <p:cNvCxnSpPr>
+            <a:cxnSpLocks/>
+            <a:stCxn id="83" idx="3"/>
+          </p:cNvCxnSpPr>
+          <p:nvPr/>
+        </p:nvCxnSpPr>
+        <p:spPr>
+          <a:xfrm>
+            <a:off x="10747883" y="4326502"/>
+            <a:ext cx="480858" cy="0"/>
+          </a:xfrm>
+          <a:prstGeom prst="straightConnector1">
+            <a:avLst/>
+          </a:prstGeom>
+          <a:ln>
+            <a:tailEnd type="triangle"/>
+          </a:ln>
+        </p:spPr>
+        <p:style>
+          <a:lnRef idx="3">
+            <a:schemeClr val="dk1"/>
+          </a:lnRef>
+          <a:fillRef idx="0">
+            <a:schemeClr val="dk1"/>
+          </a:fillRef>
+          <a:effectRef idx="2">
+            <a:schemeClr val="dk1"/>
+          </a:effectRef>
+          <a:fontRef idx="minor">
+            <a:schemeClr val="tx1"/>
+          </a:fontRef>
+        </p:style>
+      </p:cxnSp>
+      <p:cxnSp>
+        <p:nvCxnSpPr>
+          <p:cNvPr id="93" name="Rechte verbindingslijn met pijl 92">
+            <a:extLst>
+              <a:ext uri="{FF2B5EF4-FFF2-40B4-BE49-F238E27FC236}">
+                <a16:creationId xmlns:a16="http://schemas.microsoft.com/office/drawing/2014/main" id="{C2E904AC-1CB1-4F73-E869-DA6C2BAC995C}"/>
+              </a:ext>
+            </a:extLst>
+          </p:cNvPr>
+          <p:cNvCxnSpPr>
+            <a:cxnSpLocks/>
+            <a:endCxn id="83" idx="1"/>
+          </p:cNvCxnSpPr>
+          <p:nvPr/>
+        </p:nvCxnSpPr>
+        <p:spPr>
+          <a:xfrm>
+            <a:off x="7803103" y="4317079"/>
+            <a:ext cx="472168" cy="9423"/>
+          </a:xfrm>
+          <a:prstGeom prst="straightConnector1">
+            <a:avLst/>
+          </a:prstGeom>
+          <a:ln>
+            <a:tailEnd type="triangle"/>
+          </a:ln>
+        </p:spPr>
+        <p:style>
+          <a:lnRef idx="3">
+            <a:schemeClr val="dk1"/>
+          </a:lnRef>
+          <a:fillRef idx="0">
+            <a:schemeClr val="dk1"/>
+          </a:fillRef>
+          <a:effectRef idx="2">
+            <a:schemeClr val="dk1"/>
+          </a:effectRef>
+          <a:fontRef idx="minor">
+            <a:schemeClr val="tx1"/>
+          </a:fontRef>
+        </p:style>
+      </p:cxnSp>
+      <p:cxnSp>
+        <p:nvCxnSpPr>
+          <p:cNvPr id="94" name="Rechte verbindingslijn met pijl 93">
+            <a:extLst>
+              <a:ext uri="{FF2B5EF4-FFF2-40B4-BE49-F238E27FC236}">
+                <a16:creationId xmlns:a16="http://schemas.microsoft.com/office/drawing/2014/main" id="{53675EAB-C730-7002-B9A4-F9D564C1B212}"/>
+              </a:ext>
+            </a:extLst>
+          </p:cNvPr>
+          <p:cNvCxnSpPr>
+            <a:cxnSpLocks/>
+          </p:cNvCxnSpPr>
+          <p:nvPr/>
+        </p:nvCxnSpPr>
+        <p:spPr>
+          <a:xfrm>
+            <a:off x="7803103" y="3599525"/>
+            <a:ext cx="484738" cy="0"/>
+          </a:xfrm>
+          <a:prstGeom prst="straightConnector1">
+            <a:avLst/>
+          </a:prstGeom>
+          <a:ln>
+            <a:tailEnd type="triangle"/>
+          </a:ln>
+        </p:spPr>
+        <p:style>
+          <a:lnRef idx="3">
+            <a:schemeClr val="dk1"/>
+          </a:lnRef>
+          <a:fillRef idx="0">
+            <a:schemeClr val="dk1"/>
+          </a:fillRef>
+          <a:effectRef idx="2">
+            <a:schemeClr val="dk1"/>
+          </a:effectRef>
+          <a:fontRef idx="minor">
+            <a:schemeClr val="tx1"/>
+          </a:fontRef>
+        </p:style>
+      </p:cxnSp>
+      <p:cxnSp>
+        <p:nvCxnSpPr>
+          <p:cNvPr id="95" name="Rechte verbindingslijn met pijl 94">
+            <a:extLst>
+              <a:ext uri="{FF2B5EF4-FFF2-40B4-BE49-F238E27FC236}">
+                <a16:creationId xmlns:a16="http://schemas.microsoft.com/office/drawing/2014/main" id="{BB3BCF2C-5A51-5E3A-40D3-B6DD8C6E3670}"/>
+              </a:ext>
+            </a:extLst>
+          </p:cNvPr>
+          <p:cNvCxnSpPr>
+            <a:cxnSpLocks/>
+          </p:cNvCxnSpPr>
+          <p:nvPr/>
+        </p:nvCxnSpPr>
+        <p:spPr>
+          <a:xfrm>
+            <a:off x="7803103" y="3022083"/>
+            <a:ext cx="484738" cy="0"/>
+          </a:xfrm>
+          <a:prstGeom prst="straightConnector1">
+            <a:avLst/>
+          </a:prstGeom>
+          <a:ln>
+            <a:tailEnd type="triangle"/>
+          </a:ln>
+        </p:spPr>
+        <p:style>
+          <a:lnRef idx="3">
+            <a:schemeClr val="dk1"/>
+          </a:lnRef>
+          <a:fillRef idx="0">
+            <a:schemeClr val="dk1"/>
+          </a:fillRef>
+          <a:effectRef idx="2">
+            <a:schemeClr val="dk1"/>
+          </a:effectRef>
+          <a:fontRef idx="minor">
+            <a:schemeClr val="tx1"/>
+          </a:fontRef>
+        </p:style>
+      </p:cxnSp>
+      <p:cxnSp>
+        <p:nvCxnSpPr>
+          <p:cNvPr id="96" name="Rechte verbindingslijn met pijl 95">
+            <a:extLst>
+              <a:ext uri="{FF2B5EF4-FFF2-40B4-BE49-F238E27FC236}">
+                <a16:creationId xmlns:a16="http://schemas.microsoft.com/office/drawing/2014/main" id="{20876972-5883-2013-CCA7-9A30F525834B}"/>
+              </a:ext>
+            </a:extLst>
+          </p:cNvPr>
+          <p:cNvCxnSpPr>
+            <a:cxnSpLocks/>
+          </p:cNvCxnSpPr>
+          <p:nvPr/>
+        </p:nvCxnSpPr>
+        <p:spPr>
+          <a:xfrm>
+            <a:off x="7803103" y="2443242"/>
+            <a:ext cx="484738" cy="0"/>
+          </a:xfrm>
+          <a:prstGeom prst="straightConnector1">
+            <a:avLst/>
+          </a:prstGeom>
+          <a:ln>
+            <a:tailEnd type="triangle"/>
+          </a:ln>
+        </p:spPr>
+        <p:style>
+          <a:lnRef idx="3">
+            <a:schemeClr val="dk1"/>
+          </a:lnRef>
+          <a:fillRef idx="0">
+            <a:schemeClr val="dk1"/>
+          </a:fillRef>
+          <a:effectRef idx="2">
+            <a:schemeClr val="dk1"/>
+          </a:effectRef>
+          <a:fontRef idx="minor">
+            <a:schemeClr val="tx1"/>
+          </a:fontRef>
+        </p:style>
+      </p:cxnSp>
+      <p:cxnSp>
+        <p:nvCxnSpPr>
+          <p:cNvPr id="97" name="Rechte verbindingslijn met pijl 96">
+            <a:extLst>
+              <a:ext uri="{FF2B5EF4-FFF2-40B4-BE49-F238E27FC236}">
+                <a16:creationId xmlns:a16="http://schemas.microsoft.com/office/drawing/2014/main" id="{3DCC97E6-A46D-5E47-922B-31EB835403B7}"/>
+              </a:ext>
+            </a:extLst>
+          </p:cNvPr>
+          <p:cNvCxnSpPr>
+            <a:cxnSpLocks/>
+          </p:cNvCxnSpPr>
+          <p:nvPr/>
+        </p:nvCxnSpPr>
+        <p:spPr>
+          <a:xfrm>
+            <a:off x="10747883" y="2428065"/>
+            <a:ext cx="480858" cy="0"/>
+          </a:xfrm>
+          <a:prstGeom prst="straightConnector1">
+            <a:avLst/>
+          </a:prstGeom>
+          <a:ln>
+            <a:tailEnd type="triangle"/>
+          </a:ln>
+        </p:spPr>
+        <p:style>
+          <a:lnRef idx="3">
+            <a:schemeClr val="dk1"/>
+          </a:lnRef>
+          <a:fillRef idx="0">
+            <a:schemeClr val="dk1"/>
+          </a:fillRef>
+          <a:effectRef idx="2">
+            <a:schemeClr val="dk1"/>
+          </a:effectRef>
+          <a:fontRef idx="minor">
+            <a:schemeClr val="tx1"/>
+          </a:fontRef>
+        </p:style>
+      </p:cxnSp>
+      <p:cxnSp>
+        <p:nvCxnSpPr>
+          <p:cNvPr id="98" name="Rechte verbindingslijn met pijl 97">
+            <a:extLst>
+              <a:ext uri="{FF2B5EF4-FFF2-40B4-BE49-F238E27FC236}">
+                <a16:creationId xmlns:a16="http://schemas.microsoft.com/office/drawing/2014/main" id="{58BF6C9A-8781-B6B4-5713-F418877F23EC}"/>
+              </a:ext>
+            </a:extLst>
+          </p:cNvPr>
+          <p:cNvCxnSpPr>
+            <a:cxnSpLocks/>
+          </p:cNvCxnSpPr>
+          <p:nvPr/>
+        </p:nvCxnSpPr>
+        <p:spPr>
+          <a:xfrm flipV="1">
+            <a:off x="10747883" y="3014447"/>
+            <a:ext cx="480858" cy="7636"/>
+          </a:xfrm>
+          <a:prstGeom prst="straightConnector1">
+            <a:avLst/>
+          </a:prstGeom>
+          <a:ln>
+            <a:tailEnd type="triangle"/>
+          </a:ln>
+        </p:spPr>
+        <p:style>
+          <a:lnRef idx="3">
+            <a:schemeClr val="dk1"/>
+          </a:lnRef>
+          <a:fillRef idx="0">
+            <a:schemeClr val="dk1"/>
+          </a:fillRef>
+          <a:effectRef idx="2">
+            <a:schemeClr val="dk1"/>
+          </a:effectRef>
+          <a:fontRef idx="minor">
+            <a:schemeClr val="tx1"/>
+          </a:fontRef>
+        </p:style>
+      </p:cxnSp>
+      <p:cxnSp>
+        <p:nvCxnSpPr>
+          <p:cNvPr id="99" name="Rechte verbindingslijn met pijl 98">
+            <a:extLst>
+              <a:ext uri="{FF2B5EF4-FFF2-40B4-BE49-F238E27FC236}">
+                <a16:creationId xmlns:a16="http://schemas.microsoft.com/office/drawing/2014/main" id="{4995DEAD-F74F-BEFF-D4AA-83F0F0B4BCBA}"/>
+              </a:ext>
+            </a:extLst>
+          </p:cNvPr>
+          <p:cNvCxnSpPr>
+            <a:cxnSpLocks/>
+          </p:cNvCxnSpPr>
+          <p:nvPr/>
+        </p:nvCxnSpPr>
+        <p:spPr>
+          <a:xfrm>
+            <a:off x="10747883" y="3609515"/>
+            <a:ext cx="480858" cy="0"/>
+          </a:xfrm>
+          <a:prstGeom prst="straightConnector1">
+            <a:avLst/>
+          </a:prstGeom>
+          <a:ln>
+            <a:tailEnd type="triangle"/>
+          </a:ln>
+        </p:spPr>
+        <p:style>
+          <a:lnRef idx="3">
+            <a:schemeClr val="dk1"/>
+          </a:lnRef>
+          <a:fillRef idx="0">
+            <a:schemeClr val="dk1"/>
+          </a:fillRef>
+          <a:effectRef idx="2">
+            <a:schemeClr val="dk1"/>
+          </a:effectRef>
+          <a:fontRef idx="minor">
+            <a:schemeClr val="tx1"/>
+          </a:fontRef>
+        </p:style>
+      </p:cxnSp>
+      <p:cxnSp>
+        <p:nvCxnSpPr>
+          <p:cNvPr id="107" name="Verbindingslijn: gebogen 106">
+            <a:extLst>
+              <a:ext uri="{FF2B5EF4-FFF2-40B4-BE49-F238E27FC236}">
+                <a16:creationId xmlns:a16="http://schemas.microsoft.com/office/drawing/2014/main" id="{809134CE-2076-ABCB-8C6F-34E18D963896}"/>
+              </a:ext>
+            </a:extLst>
+          </p:cNvPr>
+          <p:cNvCxnSpPr>
+            <a:cxnSpLocks/>
+            <a:stCxn id="88" idx="1"/>
+            <a:endCxn id="108" idx="3"/>
+          </p:cNvCxnSpPr>
+          <p:nvPr/>
+        </p:nvCxnSpPr>
+        <p:spPr>
+          <a:xfrm rot="16200000" flipV="1">
+            <a:off x="10729674" y="1227157"/>
+            <a:ext cx="458440" cy="1400990"/>
+          </a:xfrm>
+          <a:prstGeom prst="bentConnector2">
+            <a:avLst/>
+          </a:prstGeom>
+          <a:ln>
+            <a:tailEnd type="triangle"/>
+          </a:ln>
+        </p:spPr>
+        <p:style>
+          <a:lnRef idx="3">
+            <a:schemeClr val="dk1"/>
+          </a:lnRef>
+          <a:fillRef idx="0">
+            <a:schemeClr val="dk1"/>
+          </a:fillRef>
+          <a:effectRef idx="2">
+            <a:schemeClr val="dk1"/>
+          </a:effectRef>
+          <a:fontRef idx="minor">
+            <a:schemeClr val="tx1"/>
+          </a:fontRef>
+        </p:style>
+      </p:cxnSp>
+      <p:sp>
+        <p:nvSpPr>
+          <p:cNvPr id="108" name="Rechthoek 107">
+            <a:extLst>
+              <a:ext uri="{FF2B5EF4-FFF2-40B4-BE49-F238E27FC236}">
+                <a16:creationId xmlns:a16="http://schemas.microsoft.com/office/drawing/2014/main" id="{B3829003-F04A-DC86-2524-790E21533352}"/>
+              </a:ext>
+            </a:extLst>
+          </p:cNvPr>
+          <p:cNvSpPr/>
+          <p:nvPr/>
+        </p:nvSpPr>
+        <p:spPr>
+          <a:xfrm>
+            <a:off x="8486845" y="1436565"/>
+            <a:ext cx="1771554" cy="523734"/>
+          </a:xfrm>
+          <a:prstGeom prst="rect">
+            <a:avLst/>
+          </a:prstGeom>
+          <a:ln>
+            <a:solidFill>
+              <a:schemeClr val="tx1"/>
+            </a:solidFill>
+          </a:ln>
+        </p:spPr>
+        <p:style>
+          <a:lnRef idx="2">
+            <a:schemeClr val="accent5">
+              <a:shade val="50000"/>
+            </a:schemeClr>
+          </a:lnRef>
+          <a:fillRef idx="1">
+            <a:schemeClr val="accent5"/>
+          </a:fillRef>
+          <a:effectRef idx="0">
+            <a:schemeClr val="accent5"/>
+          </a:effectRef>
+          <a:fontRef idx="minor">
+            <a:schemeClr val="lt1"/>
+          </a:fontRef>
+        </p:style>
+        <p:txBody>
+          <a:bodyPr rtlCol="0" anchor="ctr"/>
+          <a:lstStyle/>
+          <a:p>
+            <a:pPr algn="ctr"/>
+            <a:r>
+              <a:rPr lang="en-US" dirty="0"/>
+              <a:t>Lung</a:t>
+            </a:r>
+          </a:p>
+        </p:txBody>
+      </p:sp>
+      <p:cxnSp>
+        <p:nvCxnSpPr>
+          <p:cNvPr id="109" name="Verbindingslijn: gebogen 108">
+            <a:extLst>
+              <a:ext uri="{FF2B5EF4-FFF2-40B4-BE49-F238E27FC236}">
+                <a16:creationId xmlns:a16="http://schemas.microsoft.com/office/drawing/2014/main" id="{F973194D-CD04-1F1B-0002-DCE6B56D5447}"/>
+              </a:ext>
+            </a:extLst>
+          </p:cNvPr>
+          <p:cNvCxnSpPr>
+            <a:cxnSpLocks/>
+            <a:stCxn id="108" idx="1"/>
+            <a:endCxn id="89" idx="3"/>
+          </p:cNvCxnSpPr>
+          <p:nvPr/>
+        </p:nvCxnSpPr>
+        <p:spPr>
+          <a:xfrm rot="10800000" flipV="1">
+            <a:off x="7372455" y="1698432"/>
+            <a:ext cx="1114390" cy="404646"/>
+          </a:xfrm>
+          <a:prstGeom prst="bentConnector2">
+            <a:avLst/>
+          </a:prstGeom>
+          <a:ln>
+            <a:tailEnd type="triangle"/>
+          </a:ln>
+        </p:spPr>
+        <p:style>
+          <a:lnRef idx="3">
+            <a:schemeClr val="dk1"/>
+          </a:lnRef>
+          <a:fillRef idx="0">
+            <a:schemeClr val="dk1"/>
+          </a:fillRef>
+          <a:effectRef idx="2">
+            <a:schemeClr val="dk1"/>
+          </a:effectRef>
+          <a:fontRef idx="minor">
+            <a:schemeClr val="tx1"/>
+          </a:fontRef>
+        </p:style>
+      </p:cxnSp>
+      <p:sp>
+        <p:nvSpPr>
+          <p:cNvPr id="153" name="Tekstvak 152">
+            <a:extLst>
+              <a:ext uri="{FF2B5EF4-FFF2-40B4-BE49-F238E27FC236}">
+                <a16:creationId xmlns:a16="http://schemas.microsoft.com/office/drawing/2014/main" id="{71BA18AC-2188-A26B-B5AE-C7F90140F76D}"/>
+              </a:ext>
+            </a:extLst>
+          </p:cNvPr>
+          <p:cNvSpPr txBox="1"/>
+          <p:nvPr/>
+        </p:nvSpPr>
+        <p:spPr>
+          <a:xfrm>
+            <a:off x="1325254" y="261257"/>
+            <a:ext cx="3618626" cy="369332"/>
+          </a:xfrm>
+          <a:prstGeom prst="rect">
+            <a:avLst/>
+          </a:prstGeom>
+          <a:noFill/>
+          <a:ln>
+            <a:solidFill>
+              <a:schemeClr val="tx1"/>
+            </a:solidFill>
+          </a:ln>
+        </p:spPr>
+        <p:txBody>
+          <a:bodyPr wrap="square" rtlCol="0">
+            <a:spAutoFit/>
+          </a:bodyPr>
+          <a:lstStyle/>
+          <a:p>
+            <a:pPr algn="ctr"/>
+            <a:r>
+              <a:rPr lang="nl-NL" dirty="0"/>
+              <a:t>Cinnamaldehyde </a:t>
+            </a:r>
+            <a:endParaRPr lang="en-GB" dirty="0"/>
+          </a:p>
+        </p:txBody>
+      </p:sp>
+      <p:sp>
+        <p:nvSpPr>
+          <p:cNvPr id="154" name="Tekstvak 153">
+            <a:extLst>
+              <a:ext uri="{FF2B5EF4-FFF2-40B4-BE49-F238E27FC236}">
+                <a16:creationId xmlns:a16="http://schemas.microsoft.com/office/drawing/2014/main" id="{C8718792-0A31-270A-C500-3FAEBB191252}"/>
+              </a:ext>
+            </a:extLst>
+          </p:cNvPr>
+          <p:cNvSpPr txBox="1"/>
+          <p:nvPr/>
+        </p:nvSpPr>
+        <p:spPr>
+          <a:xfrm>
+            <a:off x="7496434" y="300638"/>
+            <a:ext cx="3618626" cy="369332"/>
+          </a:xfrm>
+          <a:prstGeom prst="rect">
+            <a:avLst/>
+          </a:prstGeom>
+          <a:noFill/>
+          <a:ln>
+            <a:solidFill>
+              <a:schemeClr val="tx1"/>
+            </a:solidFill>
+          </a:ln>
+        </p:spPr>
+        <p:txBody>
+          <a:bodyPr wrap="square" rtlCol="0">
+            <a:spAutoFit/>
+          </a:bodyPr>
+          <a:lstStyle/>
+          <a:p>
+            <a:pPr algn="ctr"/>
+            <a:r>
+              <a:rPr lang="nl-NL" dirty="0"/>
+              <a:t>Cinnamyl Alcohol </a:t>
+            </a:r>
+            <a:endParaRPr lang="en-GB" dirty="0"/>
+          </a:p>
+        </p:txBody>
+      </p:sp>
+      <p:sp>
+        <p:nvSpPr>
+          <p:cNvPr id="158" name="Tekstvak 157">
+            <a:extLst>
+              <a:ext uri="{FF2B5EF4-FFF2-40B4-BE49-F238E27FC236}">
+                <a16:creationId xmlns:a16="http://schemas.microsoft.com/office/drawing/2014/main" id="{843B195E-3AA0-A1F9-79BE-23ABBF4471E8}"/>
+              </a:ext>
+            </a:extLst>
+          </p:cNvPr>
+          <p:cNvSpPr txBox="1"/>
+          <p:nvPr/>
+        </p:nvSpPr>
+        <p:spPr>
+          <a:xfrm>
+            <a:off x="1818173" y="6167647"/>
+            <a:ext cx="1667278" cy="338554"/>
+          </a:xfrm>
+          <a:prstGeom prst="rect">
+            <a:avLst/>
+          </a:prstGeom>
+          <a:noFill/>
+        </p:spPr>
+        <p:txBody>
+          <a:bodyPr wrap="square">
+            <a:spAutoFit/>
+          </a:bodyPr>
+          <a:lstStyle/>
+          <a:p>
+            <a:pPr algn="ctr"/>
+            <a:r>
+              <a:rPr lang="en-GB" sz="800" dirty="0"/>
+              <a:t>Cinnamaldehyde reduced to cinnamyl alcohol</a:t>
+            </a:r>
+          </a:p>
+        </p:txBody>
+      </p:sp>
+      <p:sp>
+        <p:nvSpPr>
+          <p:cNvPr id="159" name="Tekstvak 158">
+            <a:extLst>
+              <a:ext uri="{FF2B5EF4-FFF2-40B4-BE49-F238E27FC236}">
+                <a16:creationId xmlns:a16="http://schemas.microsoft.com/office/drawing/2014/main" id="{8653A535-5B6A-0054-AFD1-A31A35E74B19}"/>
+              </a:ext>
+            </a:extLst>
+          </p:cNvPr>
+          <p:cNvSpPr txBox="1"/>
+          <p:nvPr/>
+        </p:nvSpPr>
+        <p:spPr>
+          <a:xfrm>
+            <a:off x="3914304" y="4974295"/>
+            <a:ext cx="1717581" cy="338554"/>
+          </a:xfrm>
+          <a:prstGeom prst="rect">
+            <a:avLst/>
+          </a:prstGeom>
+          <a:noFill/>
+        </p:spPr>
+        <p:txBody>
+          <a:bodyPr wrap="square">
+            <a:spAutoFit/>
+          </a:bodyPr>
+          <a:lstStyle/>
+          <a:p>
+            <a:pPr algn="ctr"/>
+            <a:r>
+              <a:rPr lang="en-GB" sz="800" dirty="0"/>
+              <a:t>Cinnamaldehyde reduced to cinnamyl alcohol</a:t>
+            </a:r>
+          </a:p>
+        </p:txBody>
+      </p:sp>
+      <p:sp>
+        <p:nvSpPr>
+          <p:cNvPr id="161" name="Tekstvak 160">
+            <a:extLst>
+              <a:ext uri="{FF2B5EF4-FFF2-40B4-BE49-F238E27FC236}">
+                <a16:creationId xmlns:a16="http://schemas.microsoft.com/office/drawing/2014/main" id="{0902F9EB-031D-A1CD-FE9D-31213E451473}"/>
+              </a:ext>
+            </a:extLst>
+          </p:cNvPr>
+          <p:cNvSpPr txBox="1"/>
+          <p:nvPr/>
+        </p:nvSpPr>
+        <p:spPr>
+          <a:xfrm>
+            <a:off x="9585080" y="4996612"/>
+            <a:ext cx="1629754" cy="338554"/>
+          </a:xfrm>
+          <a:prstGeom prst="rect">
+            <a:avLst/>
+          </a:prstGeom>
+          <a:noFill/>
+        </p:spPr>
+        <p:txBody>
+          <a:bodyPr wrap="square">
+            <a:spAutoFit/>
+          </a:bodyPr>
+          <a:lstStyle/>
+          <a:p>
+            <a:r>
+              <a:rPr lang="en-GB" sz="800" dirty="0"/>
+              <a:t>Cinnamyl alcohol enzymatically oxidized to Cinnamaldehyde</a:t>
+            </a:r>
+          </a:p>
+        </p:txBody>
+      </p:sp>
+      <p:sp>
+        <p:nvSpPr>
+          <p:cNvPr id="162" name="Tekstvak 161">
+            <a:extLst>
+              <a:ext uri="{FF2B5EF4-FFF2-40B4-BE49-F238E27FC236}">
+                <a16:creationId xmlns:a16="http://schemas.microsoft.com/office/drawing/2014/main" id="{A8A84AE4-5E4E-B39B-EEB4-CD4DC9B3EE85}"/>
+              </a:ext>
+            </a:extLst>
+          </p:cNvPr>
+          <p:cNvSpPr txBox="1"/>
+          <p:nvPr/>
+        </p:nvSpPr>
+        <p:spPr>
+          <a:xfrm>
+            <a:off x="7803103" y="6183682"/>
+            <a:ext cx="1629754" cy="338554"/>
+          </a:xfrm>
+          <a:prstGeom prst="rect">
+            <a:avLst/>
+          </a:prstGeom>
+          <a:noFill/>
+        </p:spPr>
+        <p:txBody>
+          <a:bodyPr wrap="square">
+            <a:spAutoFit/>
+          </a:bodyPr>
+          <a:lstStyle/>
+          <a:p>
+            <a:r>
+              <a:rPr lang="en-GB" sz="800" dirty="0"/>
+              <a:t>Cinnamyl alcohol enzymatically oxidized to Cinnamaldehyde</a:t>
+            </a:r>
+          </a:p>
+        </p:txBody>
+      </p:sp>
+      <p:cxnSp>
+        <p:nvCxnSpPr>
+          <p:cNvPr id="167" name="Verbindingslijn: gebogen 166">
+            <a:extLst>
+              <a:ext uri="{FF2B5EF4-FFF2-40B4-BE49-F238E27FC236}">
+                <a16:creationId xmlns:a16="http://schemas.microsoft.com/office/drawing/2014/main" id="{2A267020-08E1-78B5-7454-2326FAFD9B27}"/>
+              </a:ext>
+            </a:extLst>
+          </p:cNvPr>
+          <p:cNvCxnSpPr>
+            <a:cxnSpLocks/>
+          </p:cNvCxnSpPr>
+          <p:nvPr/>
+        </p:nvCxnSpPr>
+        <p:spPr>
+          <a:xfrm rot="5400000" flipH="1" flipV="1">
+            <a:off x="7072725" y="1504613"/>
+            <a:ext cx="100083" cy="6271263"/>
+          </a:xfrm>
+          <a:prstGeom prst="bentConnector3">
+            <a:avLst>
+              <a:gd name="adj1" fmla="val -228410"/>
+            </a:avLst>
+          </a:prstGeom>
+          <a:ln>
+            <a:headEnd type="triangle"/>
+            <a:tailEnd type="triangle"/>
+          </a:ln>
+        </p:spPr>
+        <p:style>
+          <a:lnRef idx="3">
+            <a:schemeClr val="accent2"/>
+          </a:lnRef>
+          <a:fillRef idx="0">
+            <a:schemeClr val="accent2"/>
+          </a:fillRef>
+          <a:effectRef idx="2">
+            <a:schemeClr val="accent2"/>
+          </a:effectRef>
+          <a:fontRef idx="minor">
+            <a:schemeClr val="tx1"/>
+          </a:fontRef>
+        </p:style>
+      </p:cxnSp>
+      <p:cxnSp>
+        <p:nvCxnSpPr>
+          <p:cNvPr id="171" name="Verbindingslijn: gebogen 170">
+            <a:extLst>
+              <a:ext uri="{FF2B5EF4-FFF2-40B4-BE49-F238E27FC236}">
+                <a16:creationId xmlns:a16="http://schemas.microsoft.com/office/drawing/2014/main" id="{182AD6E7-23B1-CCA4-4879-8C226F240F2D}"/>
+              </a:ext>
+            </a:extLst>
+          </p:cNvPr>
+          <p:cNvCxnSpPr>
+            <a:cxnSpLocks/>
+            <a:stCxn id="5" idx="2"/>
+            <a:endCxn id="84" idx="2"/>
+          </p:cNvCxnSpPr>
+          <p:nvPr/>
+        </p:nvCxnSpPr>
+        <p:spPr>
+          <a:xfrm rot="5400000" flipH="1" flipV="1">
+            <a:off x="5321663" y="2623359"/>
+            <a:ext cx="100083" cy="6271263"/>
+          </a:xfrm>
+          <a:prstGeom prst="bentConnector3">
+            <a:avLst>
+              <a:gd name="adj1" fmla="val -228410"/>
+            </a:avLst>
+          </a:prstGeom>
+          <a:ln>
+            <a:headEnd type="triangle"/>
+            <a:tailEnd type="triangle"/>
+          </a:ln>
+        </p:spPr>
+        <p:style>
+          <a:lnRef idx="3">
+            <a:schemeClr val="accent2"/>
+          </a:lnRef>
+          <a:fillRef idx="0">
+            <a:schemeClr val="accent2"/>
+          </a:fillRef>
+          <a:effectRef idx="2">
+            <a:schemeClr val="accent2"/>
+          </a:effectRef>
+          <a:fontRef idx="minor">
+            <a:schemeClr val="tx1"/>
+          </a:fontRef>
+        </p:style>
+      </p:cxnSp>
+    </p:spTree>
+    <p:extLst>
+      <p:ext uri="{BB962C8B-B14F-4D97-AF65-F5344CB8AC3E}">
+        <p14:creationId xmlns:p14="http://schemas.microsoft.com/office/powerpoint/2010/main" val="253295831"/>
+      </p:ext>
+    </p:extLst>
+  </p:cSld>
+  <p:clrMapOvr>
+    <a:masterClrMapping/>
+  </p:clrMapOvr>
+</p:sld>
+</file>
+
 <file path=ppt/theme/theme1.xml><?xml version="1.0" encoding="utf-8"?>
 <a:theme xmlns:a="http://schemas.openxmlformats.org/drawingml/2006/main" name="Kantoorthema">
   <a:themeElements>

</xml_diff>

<commit_message>
A number of corrections to the rat model and comparisons to in vivo data
</commit_message>
<xml_diff>
--- a/Model outline.pptx
+++ b/Model outline.pptx
@@ -262,7 +262,7 @@
           <a:p>
             <a:fld id="{04D7B9B6-C853-4B78-84CC-EA81008DF08B}" type="datetimeFigureOut">
               <a:rPr lang="en-GB" smtClean="0"/>
-              <a:t>05/08/2022</a:t>
+              <a:t>09/09/2022</a:t>
             </a:fld>
             <a:endParaRPr lang="en-GB" dirty="0"/>
           </a:p>
@@ -462,7 +462,7 @@
           <a:p>
             <a:fld id="{04D7B9B6-C853-4B78-84CC-EA81008DF08B}" type="datetimeFigureOut">
               <a:rPr lang="en-GB" smtClean="0"/>
-              <a:t>05/08/2022</a:t>
+              <a:t>09/09/2022</a:t>
             </a:fld>
             <a:endParaRPr lang="en-GB" dirty="0"/>
           </a:p>
@@ -672,7 +672,7 @@
           <a:p>
             <a:fld id="{04D7B9B6-C853-4B78-84CC-EA81008DF08B}" type="datetimeFigureOut">
               <a:rPr lang="en-GB" smtClean="0"/>
-              <a:t>05/08/2022</a:t>
+              <a:t>09/09/2022</a:t>
             </a:fld>
             <a:endParaRPr lang="en-GB" dirty="0"/>
           </a:p>
@@ -872,7 +872,7 @@
           <a:p>
             <a:fld id="{04D7B9B6-C853-4B78-84CC-EA81008DF08B}" type="datetimeFigureOut">
               <a:rPr lang="en-GB" smtClean="0"/>
-              <a:t>05/08/2022</a:t>
+              <a:t>09/09/2022</a:t>
             </a:fld>
             <a:endParaRPr lang="en-GB" dirty="0"/>
           </a:p>
@@ -1148,7 +1148,7 @@
           <a:p>
             <a:fld id="{04D7B9B6-C853-4B78-84CC-EA81008DF08B}" type="datetimeFigureOut">
               <a:rPr lang="en-GB" smtClean="0"/>
-              <a:t>05/08/2022</a:t>
+              <a:t>09/09/2022</a:t>
             </a:fld>
             <a:endParaRPr lang="en-GB" dirty="0"/>
           </a:p>
@@ -1416,7 +1416,7 @@
           <a:p>
             <a:fld id="{04D7B9B6-C853-4B78-84CC-EA81008DF08B}" type="datetimeFigureOut">
               <a:rPr lang="en-GB" smtClean="0"/>
-              <a:t>05/08/2022</a:t>
+              <a:t>09/09/2022</a:t>
             </a:fld>
             <a:endParaRPr lang="en-GB" dirty="0"/>
           </a:p>
@@ -1831,7 +1831,7 @@
           <a:p>
             <a:fld id="{04D7B9B6-C853-4B78-84CC-EA81008DF08B}" type="datetimeFigureOut">
               <a:rPr lang="en-GB" smtClean="0"/>
-              <a:t>05/08/2022</a:t>
+              <a:t>09/09/2022</a:t>
             </a:fld>
             <a:endParaRPr lang="en-GB" dirty="0"/>
           </a:p>
@@ -1973,7 +1973,7 @@
           <a:p>
             <a:fld id="{04D7B9B6-C853-4B78-84CC-EA81008DF08B}" type="datetimeFigureOut">
               <a:rPr lang="en-GB" smtClean="0"/>
-              <a:t>05/08/2022</a:t>
+              <a:t>09/09/2022</a:t>
             </a:fld>
             <a:endParaRPr lang="en-GB" dirty="0"/>
           </a:p>
@@ -2086,7 +2086,7 @@
           <a:p>
             <a:fld id="{04D7B9B6-C853-4B78-84CC-EA81008DF08B}" type="datetimeFigureOut">
               <a:rPr lang="en-GB" smtClean="0"/>
-              <a:t>05/08/2022</a:t>
+              <a:t>09/09/2022</a:t>
             </a:fld>
             <a:endParaRPr lang="en-GB" dirty="0"/>
           </a:p>
@@ -2399,7 +2399,7 @@
           <a:p>
             <a:fld id="{04D7B9B6-C853-4B78-84CC-EA81008DF08B}" type="datetimeFigureOut">
               <a:rPr lang="en-GB" smtClean="0"/>
-              <a:t>05/08/2022</a:t>
+              <a:t>09/09/2022</a:t>
             </a:fld>
             <a:endParaRPr lang="en-GB" dirty="0"/>
           </a:p>
@@ -2688,7 +2688,7 @@
           <a:p>
             <a:fld id="{04D7B9B6-C853-4B78-84CC-EA81008DF08B}" type="datetimeFigureOut">
               <a:rPr lang="en-GB" smtClean="0"/>
-              <a:t>05/08/2022</a:t>
+              <a:t>09/09/2022</a:t>
             </a:fld>
             <a:endParaRPr lang="en-GB" dirty="0"/>
           </a:p>
@@ -2931,7 +2931,7 @@
           <a:p>
             <a:fld id="{04D7B9B6-C853-4B78-84CC-EA81008DF08B}" type="datetimeFigureOut">
               <a:rPr lang="en-GB" smtClean="0"/>
-              <a:t>05/08/2022</a:t>
+              <a:t>09/09/2022</a:t>
             </a:fld>
             <a:endParaRPr lang="en-GB" dirty="0"/>
           </a:p>
@@ -7056,6 +7056,7 @@
             <a:solidFill>
               <a:schemeClr val="tx1"/>
             </a:solidFill>
+            <a:prstDash val="solid"/>
           </a:ln>
         </p:spPr>
         <p:style>
@@ -7514,20 +7515,16 @@
           </p:cNvPr>
           <p:cNvCxnSpPr>
             <a:cxnSpLocks/>
-            <a:stCxn id="73" idx="3"/>
-            <a:endCxn id="5" idx="1"/>
           </p:cNvCxnSpPr>
           <p:nvPr/>
         </p:nvCxnSpPr>
         <p:spPr>
           <a:xfrm flipV="1">
-            <a:off x="1024709" y="5479610"/>
-            <a:ext cx="412954" cy="573860"/>
-          </a:xfrm>
-          <a:prstGeom prst="bentConnector3">
-            <a:avLst>
-              <a:gd name="adj1" fmla="val 50000"/>
-            </a:avLst>
+            <a:off x="831980" y="5809032"/>
+            <a:ext cx="1211365" cy="244438"/>
+          </a:xfrm>
+          <a:prstGeom prst="bentConnector2">
+            <a:avLst/>
           </a:prstGeom>
           <a:ln>
             <a:tailEnd type="triangle"/>
@@ -7563,7 +7560,7 @@
         <p:spPr>
           <a:xfrm>
             <a:off x="3175163" y="5158412"/>
-            <a:ext cx="739141" cy="634886"/>
+            <a:ext cx="1158334" cy="634886"/>
           </a:xfrm>
           <a:prstGeom prst="rect">
             <a:avLst/>
@@ -7599,13 +7596,28 @@
           <a:p>
             <a:pPr algn="ctr"/>
             <a:r>
+              <a:rPr lang="en-US" sz="1200" dirty="0" err="1"/>
+              <a:t>GSH</a:t>
+            </a:r>
+            <a:r>
               <a:rPr lang="en-US" sz="1200" dirty="0"/>
-              <a:t>Protein </a:t>
-            </a:r>
-            <a:r>
-              <a:rPr lang="nl-NL" sz="1200" dirty="0"/>
-              <a:t>binding</a:t>
-            </a:r>
+              <a:t> conjugates</a:t>
+            </a:r>
+          </a:p>
+          <a:p>
+            <a:pPr algn="ctr"/>
+            <a:r>
+              <a:rPr lang="en-US" sz="1200" dirty="0"/>
+              <a:t>Carboxylic acid</a:t>
+            </a:r>
+          </a:p>
+          <a:p>
+            <a:pPr algn="ctr"/>
+            <a:r>
+              <a:rPr lang="en-US" sz="1200" dirty="0"/>
+              <a:t>DNA adducts </a:t>
+            </a:r>
+            <a:endParaRPr lang="nl-NL" sz="1200" dirty="0"/>
           </a:p>
         </p:txBody>
       </p:sp>
@@ -7904,6 +7916,7 @@
             <a:avLst/>
           </a:prstGeom>
           <a:ln>
+            <a:prstDash val="dash"/>
             <a:tailEnd type="triangle"/>
           </a:ln>
         </p:spPr>
@@ -7946,6 +7959,7 @@
             <a:solidFill>
               <a:schemeClr val="tx1"/>
             </a:solidFill>
+            <a:prstDash val="dash"/>
           </a:ln>
         </p:spPr>
         <p:style>
@@ -8001,6 +8015,7 @@
             <a:avLst/>
           </a:prstGeom>
           <a:ln>
+            <a:prstDash val="dash"/>
             <a:tailEnd type="triangle"/>
           </a:ln>
         </p:spPr>
@@ -8038,7 +8053,7 @@
         <p:spPr>
           <a:xfrm>
             <a:off x="3240314" y="4709186"/>
-            <a:ext cx="304420" cy="449226"/>
+            <a:ext cx="514016" cy="449226"/>
           </a:xfrm>
           <a:prstGeom prst="straightConnector1">
             <a:avLst/>
@@ -8086,6 +8101,7 @@
             <a:solidFill>
               <a:schemeClr val="tx1"/>
             </a:solidFill>
+            <a:prstDash val="dash"/>
           </a:ln>
         </p:spPr>
         <p:style>
@@ -8244,6 +8260,7 @@
             <a:solidFill>
               <a:schemeClr val="tx1"/>
             </a:solidFill>
+            <a:prstDash val="dash"/>
           </a:ln>
         </p:spPr>
         <p:style>
@@ -8628,6 +8645,7 @@
             <a:solidFill>
               <a:schemeClr val="tx1"/>
             </a:solidFill>
+            <a:prstDash val="solid"/>
           </a:ln>
         </p:spPr>
         <p:style>
@@ -9099,6 +9117,7 @@
             <a:avLst/>
           </a:prstGeom>
           <a:ln>
+            <a:prstDash val="dash"/>
             <a:tailEnd type="triangle"/>
           </a:ln>
         </p:spPr>
@@ -9141,6 +9160,7 @@
             <a:solidFill>
               <a:schemeClr val="tx1"/>
             </a:solidFill>
+            <a:prstDash val="dash"/>
           </a:ln>
         </p:spPr>
         <p:style>
@@ -9196,6 +9216,7 @@
             <a:avLst/>
           </a:prstGeom>
           <a:ln>
+            <a:prstDash val="dash"/>
             <a:tailEnd type="triangle"/>
           </a:ln>
         </p:spPr>
@@ -9348,7 +9369,7 @@
         </p:nvSpPr>
         <p:spPr>
           <a:xfrm>
-            <a:off x="3914304" y="4974295"/>
+            <a:off x="5224226" y="4909762"/>
             <a:ext cx="1717581" cy="338554"/>
           </a:xfrm>
           <a:prstGeom prst="rect">

</xml_diff>

<commit_message>
removed AM_SI_GST in humans as this was zero.
Fixed outcomes of the population model to more acurately correspond to in vivo data
</commit_message>
<xml_diff>
--- a/Model outline.pptx
+++ b/Model outline.pptx
@@ -262,7 +262,7 @@
           <a:p>
             <a:fld id="{04D7B9B6-C853-4B78-84CC-EA81008DF08B}" type="datetimeFigureOut">
               <a:rPr lang="en-GB" smtClean="0"/>
-              <a:t>09/09/2022</a:t>
+              <a:t>16/11/2022</a:t>
             </a:fld>
             <a:endParaRPr lang="en-GB" dirty="0"/>
           </a:p>
@@ -462,7 +462,7 @@
           <a:p>
             <a:fld id="{04D7B9B6-C853-4B78-84CC-EA81008DF08B}" type="datetimeFigureOut">
               <a:rPr lang="en-GB" smtClean="0"/>
-              <a:t>09/09/2022</a:t>
+              <a:t>16/11/2022</a:t>
             </a:fld>
             <a:endParaRPr lang="en-GB" dirty="0"/>
           </a:p>
@@ -672,7 +672,7 @@
           <a:p>
             <a:fld id="{04D7B9B6-C853-4B78-84CC-EA81008DF08B}" type="datetimeFigureOut">
               <a:rPr lang="en-GB" smtClean="0"/>
-              <a:t>09/09/2022</a:t>
+              <a:t>16/11/2022</a:t>
             </a:fld>
             <a:endParaRPr lang="en-GB" dirty="0"/>
           </a:p>
@@ -872,7 +872,7 @@
           <a:p>
             <a:fld id="{04D7B9B6-C853-4B78-84CC-EA81008DF08B}" type="datetimeFigureOut">
               <a:rPr lang="en-GB" smtClean="0"/>
-              <a:t>09/09/2022</a:t>
+              <a:t>16/11/2022</a:t>
             </a:fld>
             <a:endParaRPr lang="en-GB" dirty="0"/>
           </a:p>
@@ -1148,7 +1148,7 @@
           <a:p>
             <a:fld id="{04D7B9B6-C853-4B78-84CC-EA81008DF08B}" type="datetimeFigureOut">
               <a:rPr lang="en-GB" smtClean="0"/>
-              <a:t>09/09/2022</a:t>
+              <a:t>16/11/2022</a:t>
             </a:fld>
             <a:endParaRPr lang="en-GB" dirty="0"/>
           </a:p>
@@ -1416,7 +1416,7 @@
           <a:p>
             <a:fld id="{04D7B9B6-C853-4B78-84CC-EA81008DF08B}" type="datetimeFigureOut">
               <a:rPr lang="en-GB" smtClean="0"/>
-              <a:t>09/09/2022</a:t>
+              <a:t>16/11/2022</a:t>
             </a:fld>
             <a:endParaRPr lang="en-GB" dirty="0"/>
           </a:p>
@@ -1831,7 +1831,7 @@
           <a:p>
             <a:fld id="{04D7B9B6-C853-4B78-84CC-EA81008DF08B}" type="datetimeFigureOut">
               <a:rPr lang="en-GB" smtClean="0"/>
-              <a:t>09/09/2022</a:t>
+              <a:t>16/11/2022</a:t>
             </a:fld>
             <a:endParaRPr lang="en-GB" dirty="0"/>
           </a:p>
@@ -1973,7 +1973,7 @@
           <a:p>
             <a:fld id="{04D7B9B6-C853-4B78-84CC-EA81008DF08B}" type="datetimeFigureOut">
               <a:rPr lang="en-GB" smtClean="0"/>
-              <a:t>09/09/2022</a:t>
+              <a:t>16/11/2022</a:t>
             </a:fld>
             <a:endParaRPr lang="en-GB" dirty="0"/>
           </a:p>
@@ -2086,7 +2086,7 @@
           <a:p>
             <a:fld id="{04D7B9B6-C853-4B78-84CC-EA81008DF08B}" type="datetimeFigureOut">
               <a:rPr lang="en-GB" smtClean="0"/>
-              <a:t>09/09/2022</a:t>
+              <a:t>16/11/2022</a:t>
             </a:fld>
             <a:endParaRPr lang="en-GB" dirty="0"/>
           </a:p>
@@ -2399,7 +2399,7 @@
           <a:p>
             <a:fld id="{04D7B9B6-C853-4B78-84CC-EA81008DF08B}" type="datetimeFigureOut">
               <a:rPr lang="en-GB" smtClean="0"/>
-              <a:t>09/09/2022</a:t>
+              <a:t>16/11/2022</a:t>
             </a:fld>
             <a:endParaRPr lang="en-GB" dirty="0"/>
           </a:p>
@@ -2688,7 +2688,7 @@
           <a:p>
             <a:fld id="{04D7B9B6-C853-4B78-84CC-EA81008DF08B}" type="datetimeFigureOut">
               <a:rPr lang="en-GB" smtClean="0"/>
-              <a:t>09/09/2022</a:t>
+              <a:t>16/11/2022</a:t>
             </a:fld>
             <a:endParaRPr lang="en-GB" dirty="0"/>
           </a:p>
@@ -2931,7 +2931,7 @@
           <a:p>
             <a:fld id="{04D7B9B6-C853-4B78-84CC-EA81008DF08B}" type="datetimeFigureOut">
               <a:rPr lang="en-GB" smtClean="0"/>
-              <a:t>09/09/2022</a:t>
+              <a:t>16/11/2022</a:t>
             </a:fld>
             <a:endParaRPr lang="en-GB" dirty="0"/>
           </a:p>
@@ -6117,7 +6117,7 @@
         </p:nvCxnSpPr>
         <p:spPr>
           <a:xfrm rot="10800000">
-            <a:off x="6046962" y="3623437"/>
+            <a:off x="6031812" y="3645188"/>
             <a:ext cx="5164251" cy="712777"/>
           </a:xfrm>
           <a:prstGeom prst="bentConnector3">
@@ -6161,7 +6161,7 @@
         </p:nvSpPr>
         <p:spPr>
           <a:xfrm>
-            <a:off x="11211212" y="3571453"/>
+            <a:off x="11196062" y="3593204"/>
             <a:ext cx="1102425" cy="1529520"/>
           </a:xfrm>
           <a:prstGeom prst="rect">
@@ -7559,7 +7559,7 @@
         </p:nvSpPr>
         <p:spPr>
           <a:xfrm>
-            <a:off x="3175163" y="5158412"/>
+            <a:off x="3716568" y="5236589"/>
             <a:ext cx="1158334" cy="634886"/>
           </a:xfrm>
           <a:prstGeom prst="rect">
@@ -7615,9 +7615,8 @@
             <a:pPr algn="ctr"/>
             <a:r>
               <a:rPr lang="en-US" sz="1200" dirty="0"/>
-              <a:t>DNA adducts </a:t>
-            </a:r>
-            <a:endParaRPr lang="nl-NL" sz="1200" dirty="0"/>
+              <a:t>Protein adducts</a:t>
+            </a:r>
           </a:p>
         </p:txBody>
       </p:sp>
@@ -8053,7 +8052,7 @@
         <p:spPr>
           <a:xfrm>
             <a:off x="3240314" y="4709186"/>
-            <a:ext cx="514016" cy="449226"/>
+            <a:ext cx="1055421" cy="527403"/>
           </a:xfrm>
           <a:prstGeom prst="straightConnector1">
             <a:avLst/>
@@ -8064,13 +8063,13 @@
         </p:spPr>
         <p:style>
           <a:lnRef idx="3">
-            <a:schemeClr val="dk1"/>
+            <a:schemeClr val="accent2"/>
           </a:lnRef>
           <a:fillRef idx="0">
-            <a:schemeClr val="dk1"/>
+            <a:schemeClr val="accent2"/>
           </a:fillRef>
           <a:effectRef idx="2">
-            <a:schemeClr val="dk1"/>
+            <a:schemeClr val="accent2"/>
           </a:effectRef>
           <a:fontRef idx="minor">
             <a:schemeClr val="tx1"/>
@@ -9533,6 +9532,49 @@
           </a:prstGeom>
           <a:ln>
             <a:headEnd type="triangle"/>
+            <a:tailEnd type="triangle"/>
+          </a:ln>
+        </p:spPr>
+        <p:style>
+          <a:lnRef idx="3">
+            <a:schemeClr val="accent2"/>
+          </a:lnRef>
+          <a:fillRef idx="0">
+            <a:schemeClr val="accent2"/>
+          </a:fillRef>
+          <a:effectRef idx="2">
+            <a:schemeClr val="accent2"/>
+          </a:effectRef>
+          <a:fontRef idx="minor">
+            <a:schemeClr val="tx1"/>
+          </a:fontRef>
+        </p:style>
+      </p:cxnSp>
+      <p:cxnSp>
+        <p:nvCxnSpPr>
+          <p:cNvPr id="3" name="Rechte verbindingslijn met pijl 2">
+            <a:extLst>
+              <a:ext uri="{FF2B5EF4-FFF2-40B4-BE49-F238E27FC236}">
+                <a16:creationId xmlns:a16="http://schemas.microsoft.com/office/drawing/2014/main" id="{4042F5A6-8162-7F87-55F4-C4381EAAA867}"/>
+              </a:ext>
+            </a:extLst>
+          </p:cNvPr>
+          <p:cNvCxnSpPr>
+            <a:cxnSpLocks/>
+            <a:stCxn id="5" idx="3"/>
+            <a:endCxn id="41" idx="1"/>
+          </p:cNvCxnSpPr>
+          <p:nvPr/>
+        </p:nvCxnSpPr>
+        <p:spPr>
+          <a:xfrm>
+            <a:off x="3034484" y="5479610"/>
+            <a:ext cx="682084" cy="74422"/>
+          </a:xfrm>
+          <a:prstGeom prst="straightConnector1">
+            <a:avLst/>
+          </a:prstGeom>
+          <a:ln>
             <a:tailEnd type="triangle"/>
           </a:ln>
         </p:spPr>

</xml_diff>

<commit_message>
ka humans was incorrect
</commit_message>
<xml_diff>
--- a/Model outline.pptx
+++ b/Model outline.pptx
@@ -262,7 +262,7 @@
           <a:p>
             <a:fld id="{04D7B9B6-C853-4B78-84CC-EA81008DF08B}" type="datetimeFigureOut">
               <a:rPr lang="en-GB" smtClean="0"/>
-              <a:t>12/12/2022</a:t>
+              <a:t>22/12/2022</a:t>
             </a:fld>
             <a:endParaRPr lang="en-GB" dirty="0"/>
           </a:p>
@@ -462,7 +462,7 @@
           <a:p>
             <a:fld id="{04D7B9B6-C853-4B78-84CC-EA81008DF08B}" type="datetimeFigureOut">
               <a:rPr lang="en-GB" smtClean="0"/>
-              <a:t>12/12/2022</a:t>
+              <a:t>22/12/2022</a:t>
             </a:fld>
             <a:endParaRPr lang="en-GB" dirty="0"/>
           </a:p>
@@ -672,7 +672,7 @@
           <a:p>
             <a:fld id="{04D7B9B6-C853-4B78-84CC-EA81008DF08B}" type="datetimeFigureOut">
               <a:rPr lang="en-GB" smtClean="0"/>
-              <a:t>12/12/2022</a:t>
+              <a:t>22/12/2022</a:t>
             </a:fld>
             <a:endParaRPr lang="en-GB" dirty="0"/>
           </a:p>
@@ -872,7 +872,7 @@
           <a:p>
             <a:fld id="{04D7B9B6-C853-4B78-84CC-EA81008DF08B}" type="datetimeFigureOut">
               <a:rPr lang="en-GB" smtClean="0"/>
-              <a:t>12/12/2022</a:t>
+              <a:t>22/12/2022</a:t>
             </a:fld>
             <a:endParaRPr lang="en-GB" dirty="0"/>
           </a:p>
@@ -1148,7 +1148,7 @@
           <a:p>
             <a:fld id="{04D7B9B6-C853-4B78-84CC-EA81008DF08B}" type="datetimeFigureOut">
               <a:rPr lang="en-GB" smtClean="0"/>
-              <a:t>12/12/2022</a:t>
+              <a:t>22/12/2022</a:t>
             </a:fld>
             <a:endParaRPr lang="en-GB" dirty="0"/>
           </a:p>
@@ -1416,7 +1416,7 @@
           <a:p>
             <a:fld id="{04D7B9B6-C853-4B78-84CC-EA81008DF08B}" type="datetimeFigureOut">
               <a:rPr lang="en-GB" smtClean="0"/>
-              <a:t>12/12/2022</a:t>
+              <a:t>22/12/2022</a:t>
             </a:fld>
             <a:endParaRPr lang="en-GB" dirty="0"/>
           </a:p>
@@ -1831,7 +1831,7 @@
           <a:p>
             <a:fld id="{04D7B9B6-C853-4B78-84CC-EA81008DF08B}" type="datetimeFigureOut">
               <a:rPr lang="en-GB" smtClean="0"/>
-              <a:t>12/12/2022</a:t>
+              <a:t>22/12/2022</a:t>
             </a:fld>
             <a:endParaRPr lang="en-GB" dirty="0"/>
           </a:p>
@@ -1973,7 +1973,7 @@
           <a:p>
             <a:fld id="{04D7B9B6-C853-4B78-84CC-EA81008DF08B}" type="datetimeFigureOut">
               <a:rPr lang="en-GB" smtClean="0"/>
-              <a:t>12/12/2022</a:t>
+              <a:t>22/12/2022</a:t>
             </a:fld>
             <a:endParaRPr lang="en-GB" dirty="0"/>
           </a:p>
@@ -2086,7 +2086,7 @@
           <a:p>
             <a:fld id="{04D7B9B6-C853-4B78-84CC-EA81008DF08B}" type="datetimeFigureOut">
               <a:rPr lang="en-GB" smtClean="0"/>
-              <a:t>12/12/2022</a:t>
+              <a:t>22/12/2022</a:t>
             </a:fld>
             <a:endParaRPr lang="en-GB" dirty="0"/>
           </a:p>
@@ -2399,7 +2399,7 @@
           <a:p>
             <a:fld id="{04D7B9B6-C853-4B78-84CC-EA81008DF08B}" type="datetimeFigureOut">
               <a:rPr lang="en-GB" smtClean="0"/>
-              <a:t>12/12/2022</a:t>
+              <a:t>22/12/2022</a:t>
             </a:fld>
             <a:endParaRPr lang="en-GB" dirty="0"/>
           </a:p>
@@ -2688,7 +2688,7 @@
           <a:p>
             <a:fld id="{04D7B9B6-C853-4B78-84CC-EA81008DF08B}" type="datetimeFigureOut">
               <a:rPr lang="en-GB" smtClean="0"/>
-              <a:t>12/12/2022</a:t>
+              <a:t>22/12/2022</a:t>
             </a:fld>
             <a:endParaRPr lang="en-GB" dirty="0"/>
           </a:p>
@@ -2931,7 +2931,7 @@
           <a:p>
             <a:fld id="{04D7B9B6-C853-4B78-84CC-EA81008DF08B}" type="datetimeFigureOut">
               <a:rPr lang="en-GB" smtClean="0"/>
-              <a:t>12/12/2022</a:t>
+              <a:t>22/12/2022</a:t>
             </a:fld>
             <a:endParaRPr lang="en-GB" dirty="0"/>
           </a:p>

</xml_diff>

<commit_message>
Started on the disscussion
</commit_message>
<xml_diff>
--- a/Model outline.pptx
+++ b/Model outline.pptx
@@ -7,6 +7,7 @@
   <p:sldIdLst>
     <p:sldId id="256" r:id="rId2"/>
     <p:sldId id="257" r:id="rId3"/>
+    <p:sldId id="258" r:id="rId4"/>
   </p:sldIdLst>
   <p:sldSz cx="12192000" cy="6858000"/>
   <p:notesSz cx="6858000" cy="9144000"/>
@@ -262,7 +263,7 @@
           <a:p>
             <a:fld id="{04D7B9B6-C853-4B78-84CC-EA81008DF08B}" type="datetimeFigureOut">
               <a:rPr lang="en-GB" smtClean="0"/>
-              <a:t>22/12/2022</a:t>
+              <a:t>23/12/2022</a:t>
             </a:fld>
             <a:endParaRPr lang="en-GB" dirty="0"/>
           </a:p>
@@ -462,7 +463,7 @@
           <a:p>
             <a:fld id="{04D7B9B6-C853-4B78-84CC-EA81008DF08B}" type="datetimeFigureOut">
               <a:rPr lang="en-GB" smtClean="0"/>
-              <a:t>22/12/2022</a:t>
+              <a:t>23/12/2022</a:t>
             </a:fld>
             <a:endParaRPr lang="en-GB" dirty="0"/>
           </a:p>
@@ -672,7 +673,7 @@
           <a:p>
             <a:fld id="{04D7B9B6-C853-4B78-84CC-EA81008DF08B}" type="datetimeFigureOut">
               <a:rPr lang="en-GB" smtClean="0"/>
-              <a:t>22/12/2022</a:t>
+              <a:t>23/12/2022</a:t>
             </a:fld>
             <a:endParaRPr lang="en-GB" dirty="0"/>
           </a:p>
@@ -872,7 +873,7 @@
           <a:p>
             <a:fld id="{04D7B9B6-C853-4B78-84CC-EA81008DF08B}" type="datetimeFigureOut">
               <a:rPr lang="en-GB" smtClean="0"/>
-              <a:t>22/12/2022</a:t>
+              <a:t>23/12/2022</a:t>
             </a:fld>
             <a:endParaRPr lang="en-GB" dirty="0"/>
           </a:p>
@@ -1148,7 +1149,7 @@
           <a:p>
             <a:fld id="{04D7B9B6-C853-4B78-84CC-EA81008DF08B}" type="datetimeFigureOut">
               <a:rPr lang="en-GB" smtClean="0"/>
-              <a:t>22/12/2022</a:t>
+              <a:t>23/12/2022</a:t>
             </a:fld>
             <a:endParaRPr lang="en-GB" dirty="0"/>
           </a:p>
@@ -1416,7 +1417,7 @@
           <a:p>
             <a:fld id="{04D7B9B6-C853-4B78-84CC-EA81008DF08B}" type="datetimeFigureOut">
               <a:rPr lang="en-GB" smtClean="0"/>
-              <a:t>22/12/2022</a:t>
+              <a:t>23/12/2022</a:t>
             </a:fld>
             <a:endParaRPr lang="en-GB" dirty="0"/>
           </a:p>
@@ -1831,7 +1832,7 @@
           <a:p>
             <a:fld id="{04D7B9B6-C853-4B78-84CC-EA81008DF08B}" type="datetimeFigureOut">
               <a:rPr lang="en-GB" smtClean="0"/>
-              <a:t>22/12/2022</a:t>
+              <a:t>23/12/2022</a:t>
             </a:fld>
             <a:endParaRPr lang="en-GB" dirty="0"/>
           </a:p>
@@ -1973,7 +1974,7 @@
           <a:p>
             <a:fld id="{04D7B9B6-C853-4B78-84CC-EA81008DF08B}" type="datetimeFigureOut">
               <a:rPr lang="en-GB" smtClean="0"/>
-              <a:t>22/12/2022</a:t>
+              <a:t>23/12/2022</a:t>
             </a:fld>
             <a:endParaRPr lang="en-GB" dirty="0"/>
           </a:p>
@@ -2086,7 +2087,7 @@
           <a:p>
             <a:fld id="{04D7B9B6-C853-4B78-84CC-EA81008DF08B}" type="datetimeFigureOut">
               <a:rPr lang="en-GB" smtClean="0"/>
-              <a:t>22/12/2022</a:t>
+              <a:t>23/12/2022</a:t>
             </a:fld>
             <a:endParaRPr lang="en-GB" dirty="0"/>
           </a:p>
@@ -2399,7 +2400,7 @@
           <a:p>
             <a:fld id="{04D7B9B6-C853-4B78-84CC-EA81008DF08B}" type="datetimeFigureOut">
               <a:rPr lang="en-GB" smtClean="0"/>
-              <a:t>22/12/2022</a:t>
+              <a:t>23/12/2022</a:t>
             </a:fld>
             <a:endParaRPr lang="en-GB" dirty="0"/>
           </a:p>
@@ -2688,7 +2689,7 @@
           <a:p>
             <a:fld id="{04D7B9B6-C853-4B78-84CC-EA81008DF08B}" type="datetimeFigureOut">
               <a:rPr lang="en-GB" smtClean="0"/>
-              <a:t>22/12/2022</a:t>
+              <a:t>23/12/2022</a:t>
             </a:fld>
             <a:endParaRPr lang="en-GB" dirty="0"/>
           </a:p>
@@ -2931,7 +2932,7 @@
           <a:p>
             <a:fld id="{04D7B9B6-C853-4B78-84CC-EA81008DF08B}" type="datetimeFigureOut">
               <a:rPr lang="en-GB" smtClean="0"/>
-              <a:t>22/12/2022</a:t>
+              <a:t>23/12/2022</a:t>
             </a:fld>
             <a:endParaRPr lang="en-GB" dirty="0"/>
           </a:p>
@@ -7559,7 +7560,7 @@
         </p:nvSpPr>
         <p:spPr>
           <a:xfrm>
-            <a:off x="3164651" y="5150187"/>
+            <a:off x="3181968" y="5248786"/>
             <a:ext cx="1158334" cy="634886"/>
           </a:xfrm>
           <a:prstGeom prst="rect">
@@ -8045,7 +8046,7 @@
         <p:spPr>
           <a:xfrm>
             <a:off x="3240314" y="4709186"/>
-            <a:ext cx="503504" cy="441001"/>
+            <a:ext cx="520821" cy="539600"/>
           </a:xfrm>
           <a:prstGeom prst="straightConnector1">
             <a:avLst/>
@@ -9271,48 +9272,6 @@
       </p:sp>
       <p:sp>
         <p:nvSpPr>
-          <p:cNvPr id="154" name="Tekstvak 153">
-            <a:extLst>
-              <a:ext uri="{FF2B5EF4-FFF2-40B4-BE49-F238E27FC236}">
-                <a16:creationId xmlns:a16="http://schemas.microsoft.com/office/drawing/2014/main" id="{C8718792-0A31-270A-C500-3FAEBB191252}"/>
-              </a:ext>
-            </a:extLst>
-          </p:cNvPr>
-          <p:cNvSpPr txBox="1"/>
-          <p:nvPr/>
-        </p:nvSpPr>
-        <p:spPr>
-          <a:xfrm>
-            <a:off x="7496434" y="300638"/>
-            <a:ext cx="3618626" cy="369332"/>
-          </a:xfrm>
-          <a:prstGeom prst="rect">
-            <a:avLst/>
-          </a:prstGeom>
-          <a:noFill/>
-          <a:ln>
-            <a:solidFill>
-              <a:schemeClr val="tx1"/>
-            </a:solidFill>
-          </a:ln>
-        </p:spPr>
-        <p:txBody>
-          <a:bodyPr wrap="square" rtlCol="0">
-            <a:spAutoFit/>
-          </a:bodyPr>
-          <a:lstStyle/>
-          <a:p>
-            <a:pPr algn="ctr"/>
-            <a:r>
-              <a:rPr lang="nl-NL" dirty="0"/>
-              <a:t>Cinnamyl Alcohol </a:t>
-            </a:r>
-            <a:endParaRPr lang="en-GB" dirty="0"/>
-          </a:p>
-        </p:txBody>
-      </p:sp>
-      <p:sp>
-        <p:nvSpPr>
           <p:cNvPr id="158" name="Tekstvak 157">
             <a:extLst>
               <a:ext uri="{FF2B5EF4-FFF2-40B4-BE49-F238E27FC236}">
@@ -9549,6 +9508,3067 @@
           </a:fontRef>
         </p:style>
       </p:cxnSp>
+      <p:sp>
+        <p:nvSpPr>
+          <p:cNvPr id="12" name="Rechthoek 11">
+            <a:extLst>
+              <a:ext uri="{FF2B5EF4-FFF2-40B4-BE49-F238E27FC236}">
+                <a16:creationId xmlns:a16="http://schemas.microsoft.com/office/drawing/2014/main" id="{BF8D0DAB-0BB5-2001-6B87-654E59A19B42}"/>
+              </a:ext>
+            </a:extLst>
+          </p:cNvPr>
+          <p:cNvSpPr/>
+          <p:nvPr/>
+        </p:nvSpPr>
+        <p:spPr>
+          <a:xfrm>
+            <a:off x="4483075" y="5238491"/>
+            <a:ext cx="1158334" cy="634886"/>
+          </a:xfrm>
+          <a:prstGeom prst="rect">
+            <a:avLst/>
+          </a:prstGeom>
+          <a:solidFill>
+            <a:schemeClr val="accent2"/>
+          </a:solidFill>
+          <a:ln>
+            <a:solidFill>
+              <a:schemeClr val="tx1"/>
+            </a:solidFill>
+          </a:ln>
+        </p:spPr>
+        <p:style>
+          <a:lnRef idx="2">
+            <a:schemeClr val="accent5">
+              <a:shade val="50000"/>
+            </a:schemeClr>
+          </a:lnRef>
+          <a:fillRef idx="1">
+            <a:schemeClr val="accent5"/>
+          </a:fillRef>
+          <a:effectRef idx="0">
+            <a:schemeClr val="accent5"/>
+          </a:effectRef>
+          <a:fontRef idx="minor">
+            <a:schemeClr val="lt1"/>
+          </a:fontRef>
+        </p:style>
+        <p:txBody>
+          <a:bodyPr rtlCol="0" anchor="ctr"/>
+          <a:lstStyle/>
+          <a:p>
+            <a:pPr algn="ctr"/>
+            <a:r>
+              <a:rPr lang="en-US" sz="1200" dirty="0"/>
+              <a:t>Carboxylic acid</a:t>
+            </a:r>
+          </a:p>
+        </p:txBody>
+      </p:sp>
+      <p:cxnSp>
+        <p:nvCxnSpPr>
+          <p:cNvPr id="14" name="Rechte verbindingslijn met pijl 13">
+            <a:extLst>
+              <a:ext uri="{FF2B5EF4-FFF2-40B4-BE49-F238E27FC236}">
+                <a16:creationId xmlns:a16="http://schemas.microsoft.com/office/drawing/2014/main" id="{4865166E-6054-7FE3-DE45-28104E4FD03A}"/>
+              </a:ext>
+            </a:extLst>
+          </p:cNvPr>
+          <p:cNvCxnSpPr>
+            <a:cxnSpLocks/>
+            <a:stCxn id="4" idx="2"/>
+            <a:endCxn id="12" idx="0"/>
+          </p:cNvCxnSpPr>
+          <p:nvPr/>
+        </p:nvCxnSpPr>
+        <p:spPr>
+          <a:xfrm>
+            <a:off x="3240314" y="4709186"/>
+            <a:ext cx="1821928" cy="529305"/>
+          </a:xfrm>
+          <a:prstGeom prst="straightConnector1">
+            <a:avLst/>
+          </a:prstGeom>
+          <a:ln>
+            <a:tailEnd type="triangle"/>
+          </a:ln>
+        </p:spPr>
+        <p:style>
+          <a:lnRef idx="3">
+            <a:schemeClr val="accent2"/>
+          </a:lnRef>
+          <a:fillRef idx="0">
+            <a:schemeClr val="accent2"/>
+          </a:fillRef>
+          <a:effectRef idx="2">
+            <a:schemeClr val="accent2"/>
+          </a:effectRef>
+          <a:fontRef idx="minor">
+            <a:schemeClr val="tx1"/>
+          </a:fontRef>
+        </p:style>
+      </p:cxnSp>
+      <p:sp>
+        <p:nvSpPr>
+          <p:cNvPr id="2" name="Tekstvak 1">
+            <a:extLst>
+              <a:ext uri="{FF2B5EF4-FFF2-40B4-BE49-F238E27FC236}">
+                <a16:creationId xmlns:a16="http://schemas.microsoft.com/office/drawing/2014/main" id="{BAB72BB9-82AF-707E-281E-D65022A4376D}"/>
+              </a:ext>
+            </a:extLst>
+          </p:cNvPr>
+          <p:cNvSpPr txBox="1"/>
+          <p:nvPr/>
+        </p:nvSpPr>
+        <p:spPr>
+          <a:xfrm>
+            <a:off x="5310588" y="267119"/>
+            <a:ext cx="1771556" cy="369332"/>
+          </a:xfrm>
+          <a:prstGeom prst="rect">
+            <a:avLst/>
+          </a:prstGeom>
+          <a:noFill/>
+          <a:ln>
+            <a:solidFill>
+              <a:schemeClr val="tx1"/>
+            </a:solidFill>
+          </a:ln>
+        </p:spPr>
+        <p:txBody>
+          <a:bodyPr wrap="square" rtlCol="0">
+            <a:spAutoFit/>
+          </a:bodyPr>
+          <a:lstStyle/>
+          <a:p>
+            <a:pPr algn="ctr"/>
+            <a:r>
+              <a:rPr lang="nl-NL" dirty="0"/>
+              <a:t>Human </a:t>
+            </a:r>
+            <a:endParaRPr lang="en-GB" dirty="0"/>
+          </a:p>
+        </p:txBody>
+      </p:sp>
+      <p:sp>
+        <p:nvSpPr>
+          <p:cNvPr id="15" name="Tekstvak 14">
+            <a:extLst>
+              <a:ext uri="{FF2B5EF4-FFF2-40B4-BE49-F238E27FC236}">
+                <a16:creationId xmlns:a16="http://schemas.microsoft.com/office/drawing/2014/main" id="{3F2041C3-2F34-6454-0643-8A18009F9179}"/>
+              </a:ext>
+            </a:extLst>
+          </p:cNvPr>
+          <p:cNvSpPr txBox="1"/>
+          <p:nvPr/>
+        </p:nvSpPr>
+        <p:spPr>
+          <a:xfrm>
+            <a:off x="7448852" y="267119"/>
+            <a:ext cx="3618626" cy="369332"/>
+          </a:xfrm>
+          <a:prstGeom prst="rect">
+            <a:avLst/>
+          </a:prstGeom>
+          <a:noFill/>
+          <a:ln>
+            <a:solidFill>
+              <a:schemeClr val="tx1"/>
+            </a:solidFill>
+          </a:ln>
+        </p:spPr>
+        <p:txBody>
+          <a:bodyPr wrap="square" rtlCol="0">
+            <a:spAutoFit/>
+          </a:bodyPr>
+          <a:lstStyle/>
+          <a:p>
+            <a:pPr algn="ctr"/>
+            <a:r>
+              <a:rPr lang="nl-NL" dirty="0"/>
+              <a:t>Cinnamyl Alcohol </a:t>
+            </a:r>
+            <a:endParaRPr lang="en-GB" dirty="0"/>
+          </a:p>
+        </p:txBody>
+      </p:sp>
+    </p:spTree>
+    <p:extLst>
+      <p:ext uri="{BB962C8B-B14F-4D97-AF65-F5344CB8AC3E}">
+        <p14:creationId xmlns:p14="http://schemas.microsoft.com/office/powerpoint/2010/main" val="253295831"/>
+      </p:ext>
+    </p:extLst>
+  </p:cSld>
+  <p:clrMapOvr>
+    <a:masterClrMapping/>
+  </p:clrMapOvr>
+</p:sld>
+</file>
+
+<file path=ppt/slides/slide3.xml><?xml version="1.0" encoding="utf-8"?>
+<p:sld xmlns:a="http://schemas.openxmlformats.org/drawingml/2006/main" xmlns:r="http://schemas.openxmlformats.org/officeDocument/2006/relationships" xmlns:p="http://schemas.openxmlformats.org/presentationml/2006/main">
+  <p:cSld>
+    <p:spTree>
+      <p:nvGrpSpPr>
+        <p:cNvPr id="1" name=""/>
+        <p:cNvGrpSpPr/>
+        <p:nvPr/>
+      </p:nvGrpSpPr>
+      <p:grpSpPr>
+        <a:xfrm>
+          <a:off x="0" y="0"/>
+          <a:ext cx="0" cy="0"/>
+          <a:chOff x="0" y="0"/>
+          <a:chExt cx="0" cy="0"/>
+        </a:xfrm>
+      </p:grpSpPr>
+      <p:sp>
+        <p:nvSpPr>
+          <p:cNvPr id="4" name="Rechthoek 3">
+            <a:extLst>
+              <a:ext uri="{FF2B5EF4-FFF2-40B4-BE49-F238E27FC236}">
+                <a16:creationId xmlns:a16="http://schemas.microsoft.com/office/drawing/2014/main" id="{FBFE7980-1EF8-A557-C4DB-7D800C992858}"/>
+              </a:ext>
+            </a:extLst>
+          </p:cNvPr>
+          <p:cNvSpPr/>
+          <p:nvPr/>
+        </p:nvSpPr>
+        <p:spPr>
+          <a:xfrm>
+            <a:off x="2004008" y="4143984"/>
+            <a:ext cx="2472612" cy="565202"/>
+          </a:xfrm>
+          <a:prstGeom prst="rect">
+            <a:avLst/>
+          </a:prstGeom>
+          <a:ln>
+            <a:solidFill>
+              <a:schemeClr val="tx1"/>
+            </a:solidFill>
+          </a:ln>
+        </p:spPr>
+        <p:style>
+          <a:lnRef idx="2">
+            <a:schemeClr val="accent5">
+              <a:shade val="50000"/>
+            </a:schemeClr>
+          </a:lnRef>
+          <a:fillRef idx="1">
+            <a:schemeClr val="accent5"/>
+          </a:fillRef>
+          <a:effectRef idx="0">
+            <a:schemeClr val="accent5"/>
+          </a:effectRef>
+          <a:fontRef idx="minor">
+            <a:schemeClr val="lt1"/>
+          </a:fontRef>
+        </p:style>
+        <p:txBody>
+          <a:bodyPr rtlCol="0" anchor="ctr"/>
+          <a:lstStyle/>
+          <a:p>
+            <a:pPr algn="ctr"/>
+            <a:r>
+              <a:rPr lang="nl-NL" dirty="0"/>
+              <a:t>Liver</a:t>
+            </a:r>
+            <a:endParaRPr lang="en-GB" sz="500" dirty="0"/>
+          </a:p>
+        </p:txBody>
+      </p:sp>
+      <p:sp>
+        <p:nvSpPr>
+          <p:cNvPr id="5" name="Rechthoek 4">
+            <a:extLst>
+              <a:ext uri="{FF2B5EF4-FFF2-40B4-BE49-F238E27FC236}">
+                <a16:creationId xmlns:a16="http://schemas.microsoft.com/office/drawing/2014/main" id="{2F174B11-DA82-F68F-3278-C4523C301BC6}"/>
+              </a:ext>
+            </a:extLst>
+          </p:cNvPr>
+          <p:cNvSpPr/>
+          <p:nvPr/>
+        </p:nvSpPr>
+        <p:spPr>
+          <a:xfrm>
+            <a:off x="1437663" y="5150187"/>
+            <a:ext cx="1596821" cy="658845"/>
+          </a:xfrm>
+          <a:prstGeom prst="rect">
+            <a:avLst/>
+          </a:prstGeom>
+          <a:ln>
+            <a:solidFill>
+              <a:schemeClr val="tx1"/>
+            </a:solidFill>
+          </a:ln>
+        </p:spPr>
+        <p:style>
+          <a:lnRef idx="2">
+            <a:schemeClr val="accent5">
+              <a:shade val="50000"/>
+            </a:schemeClr>
+          </a:lnRef>
+          <a:fillRef idx="1">
+            <a:schemeClr val="accent5"/>
+          </a:fillRef>
+          <a:effectRef idx="0">
+            <a:schemeClr val="accent5"/>
+          </a:effectRef>
+          <a:fontRef idx="minor">
+            <a:schemeClr val="lt1"/>
+          </a:fontRef>
+        </p:style>
+        <p:txBody>
+          <a:bodyPr rtlCol="0" anchor="ctr"/>
+          <a:lstStyle/>
+          <a:p>
+            <a:pPr algn="ctr"/>
+            <a:r>
+              <a:rPr lang="nl-NL" dirty="0"/>
+              <a:t>Small intestine</a:t>
+            </a:r>
+            <a:endParaRPr lang="en-GB" dirty="0"/>
+          </a:p>
+        </p:txBody>
+      </p:sp>
+      <p:sp>
+        <p:nvSpPr>
+          <p:cNvPr id="6" name="Rechthoek 5">
+            <a:extLst>
+              <a:ext uri="{FF2B5EF4-FFF2-40B4-BE49-F238E27FC236}">
+                <a16:creationId xmlns:a16="http://schemas.microsoft.com/office/drawing/2014/main" id="{8343CA6F-D6F2-3A3E-68E8-B0BE5E0CC181}"/>
+              </a:ext>
+            </a:extLst>
+          </p:cNvPr>
+          <p:cNvSpPr/>
+          <p:nvPr/>
+        </p:nvSpPr>
+        <p:spPr>
+          <a:xfrm>
+            <a:off x="2016578" y="2937249"/>
+            <a:ext cx="2472612" cy="354563"/>
+          </a:xfrm>
+          <a:prstGeom prst="rect">
+            <a:avLst/>
+          </a:prstGeom>
+          <a:ln>
+            <a:solidFill>
+              <a:schemeClr val="tx1"/>
+            </a:solidFill>
+          </a:ln>
+        </p:spPr>
+        <p:style>
+          <a:lnRef idx="2">
+            <a:schemeClr val="accent5">
+              <a:shade val="50000"/>
+            </a:schemeClr>
+          </a:lnRef>
+          <a:fillRef idx="1">
+            <a:schemeClr val="accent5"/>
+          </a:fillRef>
+          <a:effectRef idx="0">
+            <a:schemeClr val="accent5"/>
+          </a:effectRef>
+          <a:fontRef idx="minor">
+            <a:schemeClr val="lt1"/>
+          </a:fontRef>
+        </p:style>
+        <p:txBody>
+          <a:bodyPr rtlCol="0" anchor="ctr"/>
+          <a:lstStyle/>
+          <a:p>
+            <a:pPr algn="ctr"/>
+            <a:r>
+              <a:rPr lang="nl-NL" dirty="0"/>
+              <a:t>Slowly perfused tissue</a:t>
+            </a:r>
+            <a:endParaRPr lang="en-GB" dirty="0"/>
+          </a:p>
+        </p:txBody>
+      </p:sp>
+      <p:sp>
+        <p:nvSpPr>
+          <p:cNvPr id="7" name="Rechthoek 6">
+            <a:extLst>
+              <a:ext uri="{FF2B5EF4-FFF2-40B4-BE49-F238E27FC236}">
+                <a16:creationId xmlns:a16="http://schemas.microsoft.com/office/drawing/2014/main" id="{58F86158-20C6-190D-EB9C-69B1B3AD2A32}"/>
+              </a:ext>
+            </a:extLst>
+          </p:cNvPr>
+          <p:cNvSpPr/>
+          <p:nvPr/>
+        </p:nvSpPr>
+        <p:spPr>
+          <a:xfrm>
+            <a:off x="2004008" y="3512038"/>
+            <a:ext cx="2472612" cy="354563"/>
+          </a:xfrm>
+          <a:prstGeom prst="rect">
+            <a:avLst/>
+          </a:prstGeom>
+          <a:ln>
+            <a:solidFill>
+              <a:schemeClr val="tx1"/>
+            </a:solidFill>
+          </a:ln>
+        </p:spPr>
+        <p:style>
+          <a:lnRef idx="2">
+            <a:schemeClr val="accent5">
+              <a:shade val="50000"/>
+            </a:schemeClr>
+          </a:lnRef>
+          <a:fillRef idx="1">
+            <a:schemeClr val="accent5"/>
+          </a:fillRef>
+          <a:effectRef idx="0">
+            <a:schemeClr val="accent5"/>
+          </a:effectRef>
+          <a:fontRef idx="minor">
+            <a:schemeClr val="lt1"/>
+          </a:fontRef>
+        </p:style>
+        <p:txBody>
+          <a:bodyPr rtlCol="0" anchor="ctr"/>
+          <a:lstStyle/>
+          <a:p>
+            <a:pPr algn="ctr"/>
+            <a:r>
+              <a:rPr lang="nl-NL" dirty="0"/>
+              <a:t>Richly perfused tissue</a:t>
+            </a:r>
+            <a:endParaRPr lang="en-GB" dirty="0"/>
+          </a:p>
+        </p:txBody>
+      </p:sp>
+      <p:sp>
+        <p:nvSpPr>
+          <p:cNvPr id="8" name="Rechthoek 7">
+            <a:extLst>
+              <a:ext uri="{FF2B5EF4-FFF2-40B4-BE49-F238E27FC236}">
+                <a16:creationId xmlns:a16="http://schemas.microsoft.com/office/drawing/2014/main" id="{A969843B-C6C6-ED00-AD24-425C612D2A76}"/>
+              </a:ext>
+            </a:extLst>
+          </p:cNvPr>
+          <p:cNvSpPr/>
+          <p:nvPr/>
+        </p:nvSpPr>
+        <p:spPr>
+          <a:xfrm>
+            <a:off x="2004008" y="2357908"/>
+            <a:ext cx="2472612" cy="354563"/>
+          </a:xfrm>
+          <a:prstGeom prst="rect">
+            <a:avLst/>
+          </a:prstGeom>
+          <a:ln>
+            <a:solidFill>
+              <a:schemeClr val="tx1"/>
+            </a:solidFill>
+          </a:ln>
+        </p:spPr>
+        <p:style>
+          <a:lnRef idx="2">
+            <a:schemeClr val="accent5">
+              <a:shade val="50000"/>
+            </a:schemeClr>
+          </a:lnRef>
+          <a:fillRef idx="1">
+            <a:schemeClr val="accent5"/>
+          </a:fillRef>
+          <a:effectRef idx="0">
+            <a:schemeClr val="accent5"/>
+          </a:effectRef>
+          <a:fontRef idx="minor">
+            <a:schemeClr val="lt1"/>
+          </a:fontRef>
+        </p:style>
+        <p:txBody>
+          <a:bodyPr rtlCol="0" anchor="ctr"/>
+          <a:lstStyle/>
+          <a:p>
+            <a:pPr algn="ctr"/>
+            <a:r>
+              <a:rPr lang="nl-NL" dirty="0"/>
+              <a:t>Fat</a:t>
+            </a:r>
+            <a:endParaRPr lang="en-GB" sz="1000" dirty="0"/>
+          </a:p>
+        </p:txBody>
+      </p:sp>
+      <p:sp>
+        <p:nvSpPr>
+          <p:cNvPr id="9" name="Rechthoek 8">
+            <a:extLst>
+              <a:ext uri="{FF2B5EF4-FFF2-40B4-BE49-F238E27FC236}">
+                <a16:creationId xmlns:a16="http://schemas.microsoft.com/office/drawing/2014/main" id="{76817DE5-8F82-EAB6-297B-7D0B1D0413B5}"/>
+              </a:ext>
+            </a:extLst>
+          </p:cNvPr>
+          <p:cNvSpPr/>
+          <p:nvPr/>
+        </p:nvSpPr>
+        <p:spPr>
+          <a:xfrm rot="5400000">
+            <a:off x="4191639" y="3037518"/>
+            <a:ext cx="2420682" cy="861296"/>
+          </a:xfrm>
+          <a:prstGeom prst="rect">
+            <a:avLst/>
+          </a:prstGeom>
+          <a:ln>
+            <a:solidFill>
+              <a:schemeClr val="tx1"/>
+            </a:solidFill>
+          </a:ln>
+        </p:spPr>
+        <p:style>
+          <a:lnRef idx="2">
+            <a:schemeClr val="accent5">
+              <a:shade val="50000"/>
+            </a:schemeClr>
+          </a:lnRef>
+          <a:fillRef idx="1">
+            <a:schemeClr val="accent5"/>
+          </a:fillRef>
+          <a:effectRef idx="0">
+            <a:schemeClr val="accent5"/>
+          </a:effectRef>
+          <a:fontRef idx="minor">
+            <a:schemeClr val="lt1"/>
+          </a:fontRef>
+        </p:style>
+        <p:txBody>
+          <a:bodyPr rtlCol="0" anchor="ctr"/>
+          <a:lstStyle/>
+          <a:p>
+            <a:pPr algn="ctr"/>
+            <a:r>
+              <a:rPr lang="nl-NL" dirty="0"/>
+              <a:t>Venous blood</a:t>
+            </a:r>
+            <a:endParaRPr lang="en-GB" dirty="0"/>
+          </a:p>
+        </p:txBody>
+      </p:sp>
+      <p:sp>
+        <p:nvSpPr>
+          <p:cNvPr id="10" name="Rechthoek 9">
+            <a:extLst>
+              <a:ext uri="{FF2B5EF4-FFF2-40B4-BE49-F238E27FC236}">
+                <a16:creationId xmlns:a16="http://schemas.microsoft.com/office/drawing/2014/main" id="{3AB82D61-2591-B062-00E9-A6848719EABD}"/>
+              </a:ext>
+            </a:extLst>
+          </p:cNvPr>
+          <p:cNvSpPr/>
+          <p:nvPr/>
+        </p:nvSpPr>
+        <p:spPr>
+          <a:xfrm rot="16200000">
+            <a:off x="2505" y="2981307"/>
+            <a:ext cx="2420680" cy="861296"/>
+          </a:xfrm>
+          <a:prstGeom prst="rect">
+            <a:avLst/>
+          </a:prstGeom>
+          <a:ln>
+            <a:solidFill>
+              <a:schemeClr val="tx1"/>
+            </a:solidFill>
+            <a:prstDash val="solid"/>
+          </a:ln>
+        </p:spPr>
+        <p:style>
+          <a:lnRef idx="2">
+            <a:schemeClr val="accent5">
+              <a:shade val="50000"/>
+            </a:schemeClr>
+          </a:lnRef>
+          <a:fillRef idx="1">
+            <a:schemeClr val="accent5"/>
+          </a:fillRef>
+          <a:effectRef idx="0">
+            <a:schemeClr val="accent5"/>
+          </a:effectRef>
+          <a:fontRef idx="minor">
+            <a:schemeClr val="lt1"/>
+          </a:fontRef>
+        </p:style>
+        <p:txBody>
+          <a:bodyPr rtlCol="0" anchor="ctr"/>
+          <a:lstStyle/>
+          <a:p>
+            <a:pPr algn="ctr"/>
+            <a:r>
+              <a:rPr lang="nl-NL" dirty="0"/>
+              <a:t>Arterial blood</a:t>
+            </a:r>
+            <a:endParaRPr lang="en-GB" dirty="0"/>
+          </a:p>
+        </p:txBody>
+      </p:sp>
+      <p:cxnSp>
+        <p:nvCxnSpPr>
+          <p:cNvPr id="17" name="Verbindingslijn: gebogen 16">
+            <a:extLst>
+              <a:ext uri="{FF2B5EF4-FFF2-40B4-BE49-F238E27FC236}">
+                <a16:creationId xmlns:a16="http://schemas.microsoft.com/office/drawing/2014/main" id="{DB221298-433D-AAD8-779F-30D58F1A9128}"/>
+              </a:ext>
+            </a:extLst>
+          </p:cNvPr>
+          <p:cNvCxnSpPr>
+            <a:cxnSpLocks/>
+            <a:stCxn id="10" idx="1"/>
+            <a:endCxn id="5" idx="1"/>
+          </p:cNvCxnSpPr>
+          <p:nvPr/>
+        </p:nvCxnSpPr>
+        <p:spPr>
+          <a:xfrm rot="16200000" flipH="1">
+            <a:off x="896597" y="4938543"/>
+            <a:ext cx="857315" cy="224818"/>
+          </a:xfrm>
+          <a:prstGeom prst="bentConnector2">
+            <a:avLst/>
+          </a:prstGeom>
+          <a:ln>
+            <a:tailEnd type="triangle"/>
+          </a:ln>
+        </p:spPr>
+        <p:style>
+          <a:lnRef idx="3">
+            <a:schemeClr val="dk1"/>
+          </a:lnRef>
+          <a:fillRef idx="0">
+            <a:schemeClr val="dk1"/>
+          </a:fillRef>
+          <a:effectRef idx="2">
+            <a:schemeClr val="dk1"/>
+          </a:effectRef>
+          <a:fontRef idx="minor">
+            <a:schemeClr val="tx1"/>
+          </a:fontRef>
+        </p:style>
+      </p:cxnSp>
+      <p:cxnSp>
+        <p:nvCxnSpPr>
+          <p:cNvPr id="18" name="Rechte verbindingslijn met pijl 17">
+            <a:extLst>
+              <a:ext uri="{FF2B5EF4-FFF2-40B4-BE49-F238E27FC236}">
+                <a16:creationId xmlns:a16="http://schemas.microsoft.com/office/drawing/2014/main" id="{43CCCA62-E183-D13C-9298-68717468DCD0}"/>
+              </a:ext>
+            </a:extLst>
+          </p:cNvPr>
+          <p:cNvCxnSpPr>
+            <a:cxnSpLocks/>
+            <a:stCxn id="5" idx="0"/>
+          </p:cNvCxnSpPr>
+          <p:nvPr/>
+        </p:nvCxnSpPr>
+        <p:spPr>
+          <a:xfrm flipV="1">
+            <a:off x="2236074" y="4707329"/>
+            <a:ext cx="0" cy="442858"/>
+          </a:xfrm>
+          <a:prstGeom prst="straightConnector1">
+            <a:avLst/>
+          </a:prstGeom>
+          <a:ln>
+            <a:tailEnd type="triangle"/>
+          </a:ln>
+        </p:spPr>
+        <p:style>
+          <a:lnRef idx="3">
+            <a:schemeClr val="dk1"/>
+          </a:lnRef>
+          <a:fillRef idx="0">
+            <a:schemeClr val="dk1"/>
+          </a:fillRef>
+          <a:effectRef idx="2">
+            <a:schemeClr val="dk1"/>
+          </a:effectRef>
+          <a:fontRef idx="minor">
+            <a:schemeClr val="tx1"/>
+          </a:fontRef>
+        </p:style>
+      </p:cxnSp>
+      <p:cxnSp>
+        <p:nvCxnSpPr>
+          <p:cNvPr id="19" name="Rechte verbindingslijn met pijl 18">
+            <a:extLst>
+              <a:ext uri="{FF2B5EF4-FFF2-40B4-BE49-F238E27FC236}">
+                <a16:creationId xmlns:a16="http://schemas.microsoft.com/office/drawing/2014/main" id="{3E8E8143-0FE0-B051-239E-A37F6D7F3DD4}"/>
+              </a:ext>
+            </a:extLst>
+          </p:cNvPr>
+          <p:cNvCxnSpPr>
+            <a:cxnSpLocks/>
+            <a:stCxn id="4" idx="3"/>
+          </p:cNvCxnSpPr>
+          <p:nvPr/>
+        </p:nvCxnSpPr>
+        <p:spPr>
+          <a:xfrm>
+            <a:off x="4476620" y="4426585"/>
+            <a:ext cx="487833" cy="0"/>
+          </a:xfrm>
+          <a:prstGeom prst="straightConnector1">
+            <a:avLst/>
+          </a:prstGeom>
+          <a:ln>
+            <a:tailEnd type="triangle"/>
+          </a:ln>
+        </p:spPr>
+        <p:style>
+          <a:lnRef idx="3">
+            <a:schemeClr val="dk1"/>
+          </a:lnRef>
+          <a:fillRef idx="0">
+            <a:schemeClr val="dk1"/>
+          </a:fillRef>
+          <a:effectRef idx="2">
+            <a:schemeClr val="dk1"/>
+          </a:effectRef>
+          <a:fontRef idx="minor">
+            <a:schemeClr val="tx1"/>
+          </a:fontRef>
+        </p:style>
+      </p:cxnSp>
+      <p:cxnSp>
+        <p:nvCxnSpPr>
+          <p:cNvPr id="20" name="Rechte verbindingslijn met pijl 19">
+            <a:extLst>
+              <a:ext uri="{FF2B5EF4-FFF2-40B4-BE49-F238E27FC236}">
+                <a16:creationId xmlns:a16="http://schemas.microsoft.com/office/drawing/2014/main" id="{8F1C093A-5CCD-5D77-3EBB-917F6C726AD1}"/>
+              </a:ext>
+            </a:extLst>
+          </p:cNvPr>
+          <p:cNvCxnSpPr>
+            <a:cxnSpLocks/>
+            <a:endCxn id="4" idx="1"/>
+          </p:cNvCxnSpPr>
+          <p:nvPr/>
+        </p:nvCxnSpPr>
+        <p:spPr>
+          <a:xfrm>
+            <a:off x="1643493" y="4426585"/>
+            <a:ext cx="360515" cy="0"/>
+          </a:xfrm>
+          <a:prstGeom prst="straightConnector1">
+            <a:avLst/>
+          </a:prstGeom>
+          <a:ln>
+            <a:tailEnd type="triangle"/>
+          </a:ln>
+        </p:spPr>
+        <p:style>
+          <a:lnRef idx="3">
+            <a:schemeClr val="dk1"/>
+          </a:lnRef>
+          <a:fillRef idx="0">
+            <a:schemeClr val="dk1"/>
+          </a:fillRef>
+          <a:effectRef idx="2">
+            <a:schemeClr val="dk1"/>
+          </a:effectRef>
+          <a:fontRef idx="minor">
+            <a:schemeClr val="tx1"/>
+          </a:fontRef>
+        </p:style>
+      </p:cxnSp>
+      <p:cxnSp>
+        <p:nvCxnSpPr>
+          <p:cNvPr id="21" name="Rechte verbindingslijn met pijl 20">
+            <a:extLst>
+              <a:ext uri="{FF2B5EF4-FFF2-40B4-BE49-F238E27FC236}">
+                <a16:creationId xmlns:a16="http://schemas.microsoft.com/office/drawing/2014/main" id="{F0793454-C559-A94F-8C0E-A75CCCB267B3}"/>
+              </a:ext>
+            </a:extLst>
+          </p:cNvPr>
+          <p:cNvCxnSpPr>
+            <a:cxnSpLocks/>
+          </p:cNvCxnSpPr>
+          <p:nvPr/>
+        </p:nvCxnSpPr>
+        <p:spPr>
+          <a:xfrm>
+            <a:off x="1643493" y="3699608"/>
+            <a:ext cx="373085" cy="0"/>
+          </a:xfrm>
+          <a:prstGeom prst="straightConnector1">
+            <a:avLst/>
+          </a:prstGeom>
+          <a:ln>
+            <a:tailEnd type="triangle"/>
+          </a:ln>
+        </p:spPr>
+        <p:style>
+          <a:lnRef idx="3">
+            <a:schemeClr val="dk1"/>
+          </a:lnRef>
+          <a:fillRef idx="0">
+            <a:schemeClr val="dk1"/>
+          </a:fillRef>
+          <a:effectRef idx="2">
+            <a:schemeClr val="dk1"/>
+          </a:effectRef>
+          <a:fontRef idx="minor">
+            <a:schemeClr val="tx1"/>
+          </a:fontRef>
+        </p:style>
+      </p:cxnSp>
+      <p:cxnSp>
+        <p:nvCxnSpPr>
+          <p:cNvPr id="22" name="Rechte verbindingslijn met pijl 21">
+            <a:extLst>
+              <a:ext uri="{FF2B5EF4-FFF2-40B4-BE49-F238E27FC236}">
+                <a16:creationId xmlns:a16="http://schemas.microsoft.com/office/drawing/2014/main" id="{E54CFBAA-9F79-958D-4D43-A8A574837B7F}"/>
+              </a:ext>
+            </a:extLst>
+          </p:cNvPr>
+          <p:cNvCxnSpPr>
+            <a:cxnSpLocks/>
+          </p:cNvCxnSpPr>
+          <p:nvPr/>
+        </p:nvCxnSpPr>
+        <p:spPr>
+          <a:xfrm>
+            <a:off x="1643493" y="3122166"/>
+            <a:ext cx="373085" cy="0"/>
+          </a:xfrm>
+          <a:prstGeom prst="straightConnector1">
+            <a:avLst/>
+          </a:prstGeom>
+          <a:ln>
+            <a:tailEnd type="triangle"/>
+          </a:ln>
+        </p:spPr>
+        <p:style>
+          <a:lnRef idx="3">
+            <a:schemeClr val="dk1"/>
+          </a:lnRef>
+          <a:fillRef idx="0">
+            <a:schemeClr val="dk1"/>
+          </a:fillRef>
+          <a:effectRef idx="2">
+            <a:schemeClr val="dk1"/>
+          </a:effectRef>
+          <a:fontRef idx="minor">
+            <a:schemeClr val="tx1"/>
+          </a:fontRef>
+        </p:style>
+      </p:cxnSp>
+      <p:cxnSp>
+        <p:nvCxnSpPr>
+          <p:cNvPr id="23" name="Rechte verbindingslijn met pijl 22">
+            <a:extLst>
+              <a:ext uri="{FF2B5EF4-FFF2-40B4-BE49-F238E27FC236}">
+                <a16:creationId xmlns:a16="http://schemas.microsoft.com/office/drawing/2014/main" id="{386287C0-699C-E26B-69DF-6E4A37F9A6E4}"/>
+              </a:ext>
+            </a:extLst>
+          </p:cNvPr>
+          <p:cNvCxnSpPr>
+            <a:cxnSpLocks/>
+          </p:cNvCxnSpPr>
+          <p:nvPr/>
+        </p:nvCxnSpPr>
+        <p:spPr>
+          <a:xfrm>
+            <a:off x="1643493" y="2543325"/>
+            <a:ext cx="373085" cy="0"/>
+          </a:xfrm>
+          <a:prstGeom prst="straightConnector1">
+            <a:avLst/>
+          </a:prstGeom>
+          <a:ln>
+            <a:tailEnd type="triangle"/>
+          </a:ln>
+        </p:spPr>
+        <p:style>
+          <a:lnRef idx="3">
+            <a:schemeClr val="dk1"/>
+          </a:lnRef>
+          <a:fillRef idx="0">
+            <a:schemeClr val="dk1"/>
+          </a:fillRef>
+          <a:effectRef idx="2">
+            <a:schemeClr val="dk1"/>
+          </a:effectRef>
+          <a:fontRef idx="minor">
+            <a:schemeClr val="tx1"/>
+          </a:fontRef>
+        </p:style>
+      </p:cxnSp>
+      <p:cxnSp>
+        <p:nvCxnSpPr>
+          <p:cNvPr id="24" name="Rechte verbindingslijn met pijl 23">
+            <a:extLst>
+              <a:ext uri="{FF2B5EF4-FFF2-40B4-BE49-F238E27FC236}">
+                <a16:creationId xmlns:a16="http://schemas.microsoft.com/office/drawing/2014/main" id="{12576A79-0D4D-2725-EBAC-D6FCF2E70345}"/>
+              </a:ext>
+            </a:extLst>
+          </p:cNvPr>
+          <p:cNvCxnSpPr>
+            <a:cxnSpLocks/>
+          </p:cNvCxnSpPr>
+          <p:nvPr/>
+        </p:nvCxnSpPr>
+        <p:spPr>
+          <a:xfrm>
+            <a:off x="4476620" y="2528148"/>
+            <a:ext cx="494712" cy="0"/>
+          </a:xfrm>
+          <a:prstGeom prst="straightConnector1">
+            <a:avLst/>
+          </a:prstGeom>
+          <a:ln>
+            <a:tailEnd type="triangle"/>
+          </a:ln>
+        </p:spPr>
+        <p:style>
+          <a:lnRef idx="3">
+            <a:schemeClr val="dk1"/>
+          </a:lnRef>
+          <a:fillRef idx="0">
+            <a:schemeClr val="dk1"/>
+          </a:fillRef>
+          <a:effectRef idx="2">
+            <a:schemeClr val="dk1"/>
+          </a:effectRef>
+          <a:fontRef idx="minor">
+            <a:schemeClr val="tx1"/>
+          </a:fontRef>
+        </p:style>
+      </p:cxnSp>
+      <p:cxnSp>
+        <p:nvCxnSpPr>
+          <p:cNvPr id="25" name="Rechte verbindingslijn met pijl 24">
+            <a:extLst>
+              <a:ext uri="{FF2B5EF4-FFF2-40B4-BE49-F238E27FC236}">
+                <a16:creationId xmlns:a16="http://schemas.microsoft.com/office/drawing/2014/main" id="{128344CC-A2CB-8186-B224-C1D60CA08778}"/>
+              </a:ext>
+            </a:extLst>
+          </p:cNvPr>
+          <p:cNvCxnSpPr>
+            <a:cxnSpLocks/>
+            <a:stCxn id="6" idx="3"/>
+          </p:cNvCxnSpPr>
+          <p:nvPr/>
+        </p:nvCxnSpPr>
+        <p:spPr>
+          <a:xfrm flipV="1">
+            <a:off x="4489190" y="3114530"/>
+            <a:ext cx="475263" cy="1"/>
+          </a:xfrm>
+          <a:prstGeom prst="straightConnector1">
+            <a:avLst/>
+          </a:prstGeom>
+          <a:ln>
+            <a:tailEnd type="triangle"/>
+          </a:ln>
+        </p:spPr>
+        <p:style>
+          <a:lnRef idx="3">
+            <a:schemeClr val="dk1"/>
+          </a:lnRef>
+          <a:fillRef idx="0">
+            <a:schemeClr val="dk1"/>
+          </a:fillRef>
+          <a:effectRef idx="2">
+            <a:schemeClr val="dk1"/>
+          </a:effectRef>
+          <a:fontRef idx="minor">
+            <a:schemeClr val="tx1"/>
+          </a:fontRef>
+        </p:style>
+      </p:cxnSp>
+      <p:cxnSp>
+        <p:nvCxnSpPr>
+          <p:cNvPr id="26" name="Rechte verbindingslijn met pijl 25">
+            <a:extLst>
+              <a:ext uri="{FF2B5EF4-FFF2-40B4-BE49-F238E27FC236}">
+                <a16:creationId xmlns:a16="http://schemas.microsoft.com/office/drawing/2014/main" id="{09953E3C-B99A-2496-66F7-253F8BB5AD98}"/>
+              </a:ext>
+            </a:extLst>
+          </p:cNvPr>
+          <p:cNvCxnSpPr>
+            <a:cxnSpLocks/>
+          </p:cNvCxnSpPr>
+          <p:nvPr/>
+        </p:nvCxnSpPr>
+        <p:spPr>
+          <a:xfrm>
+            <a:off x="4476620" y="3709598"/>
+            <a:ext cx="494712" cy="0"/>
+          </a:xfrm>
+          <a:prstGeom prst="straightConnector1">
+            <a:avLst/>
+          </a:prstGeom>
+          <a:ln>
+            <a:tailEnd type="triangle"/>
+          </a:ln>
+        </p:spPr>
+        <p:style>
+          <a:lnRef idx="3">
+            <a:schemeClr val="dk1"/>
+          </a:lnRef>
+          <a:fillRef idx="0">
+            <a:schemeClr val="dk1"/>
+          </a:fillRef>
+          <a:effectRef idx="2">
+            <a:schemeClr val="dk1"/>
+          </a:effectRef>
+          <a:fontRef idx="minor">
+            <a:schemeClr val="tx1"/>
+          </a:fontRef>
+        </p:style>
+      </p:cxnSp>
+      <p:cxnSp>
+        <p:nvCxnSpPr>
+          <p:cNvPr id="39" name="Verbindingslijn: gebogen 38">
+            <a:extLst>
+              <a:ext uri="{FF2B5EF4-FFF2-40B4-BE49-F238E27FC236}">
+                <a16:creationId xmlns:a16="http://schemas.microsoft.com/office/drawing/2014/main" id="{000A8081-5A43-4473-939C-4ABD66910A14}"/>
+              </a:ext>
+            </a:extLst>
+          </p:cNvPr>
+          <p:cNvCxnSpPr>
+            <a:cxnSpLocks/>
+          </p:cNvCxnSpPr>
+          <p:nvPr/>
+        </p:nvCxnSpPr>
+        <p:spPr>
+          <a:xfrm flipV="1">
+            <a:off x="831980" y="5809032"/>
+            <a:ext cx="1211365" cy="244438"/>
+          </a:xfrm>
+          <a:prstGeom prst="bentConnector2">
+            <a:avLst/>
+          </a:prstGeom>
+          <a:ln>
+            <a:tailEnd type="triangle"/>
+          </a:ln>
+        </p:spPr>
+        <p:style>
+          <a:lnRef idx="3">
+            <a:schemeClr val="accent6"/>
+          </a:lnRef>
+          <a:fillRef idx="0">
+            <a:schemeClr val="accent6"/>
+          </a:fillRef>
+          <a:effectRef idx="2">
+            <a:schemeClr val="accent6"/>
+          </a:effectRef>
+          <a:fontRef idx="minor">
+            <a:schemeClr val="tx1"/>
+          </a:fontRef>
+        </p:style>
+      </p:cxnSp>
+      <p:sp>
+        <p:nvSpPr>
+          <p:cNvPr id="41" name="Rechthoek 40">
+            <a:extLst>
+              <a:ext uri="{FF2B5EF4-FFF2-40B4-BE49-F238E27FC236}">
+                <a16:creationId xmlns:a16="http://schemas.microsoft.com/office/drawing/2014/main" id="{5D944DA9-1767-9422-B960-781643B88F41}"/>
+              </a:ext>
+            </a:extLst>
+          </p:cNvPr>
+          <p:cNvSpPr/>
+          <p:nvPr/>
+        </p:nvSpPr>
+        <p:spPr>
+          <a:xfrm>
+            <a:off x="3266329" y="5193563"/>
+            <a:ext cx="1158334" cy="634886"/>
+          </a:xfrm>
+          <a:prstGeom prst="rect">
+            <a:avLst/>
+          </a:prstGeom>
+          <a:solidFill>
+            <a:schemeClr val="accent2"/>
+          </a:solidFill>
+          <a:ln>
+            <a:solidFill>
+              <a:schemeClr val="tx1"/>
+            </a:solidFill>
+          </a:ln>
+        </p:spPr>
+        <p:style>
+          <a:lnRef idx="2">
+            <a:schemeClr val="accent5">
+              <a:shade val="50000"/>
+            </a:schemeClr>
+          </a:lnRef>
+          <a:fillRef idx="1">
+            <a:schemeClr val="accent5"/>
+          </a:fillRef>
+          <a:effectRef idx="0">
+            <a:schemeClr val="accent5"/>
+          </a:effectRef>
+          <a:fontRef idx="minor">
+            <a:schemeClr val="lt1"/>
+          </a:fontRef>
+        </p:style>
+        <p:txBody>
+          <a:bodyPr rtlCol="0" anchor="ctr"/>
+          <a:lstStyle/>
+          <a:p>
+            <a:pPr algn="ctr"/>
+            <a:r>
+              <a:rPr lang="en-US" sz="1200" dirty="0" err="1"/>
+              <a:t>GSH</a:t>
+            </a:r>
+            <a:r>
+              <a:rPr lang="en-US" sz="1200" dirty="0"/>
+              <a:t> conjugates</a:t>
+            </a:r>
+          </a:p>
+          <a:p>
+            <a:pPr algn="ctr"/>
+            <a:r>
+              <a:rPr lang="en-US" sz="1200" dirty="0"/>
+              <a:t>Protein adducts</a:t>
+            </a:r>
+          </a:p>
+        </p:txBody>
+      </p:sp>
+      <p:sp>
+        <p:nvSpPr>
+          <p:cNvPr id="44" name="Rechthoek 43">
+            <a:extLst>
+              <a:ext uri="{FF2B5EF4-FFF2-40B4-BE49-F238E27FC236}">
+                <a16:creationId xmlns:a16="http://schemas.microsoft.com/office/drawing/2014/main" id="{20DB3A2D-3AA6-47C8-44FA-1E88BAC09845}"/>
+              </a:ext>
+            </a:extLst>
+          </p:cNvPr>
+          <p:cNvSpPr/>
+          <p:nvPr/>
+        </p:nvSpPr>
+        <p:spPr>
+          <a:xfrm>
+            <a:off x="2177892" y="5165889"/>
+            <a:ext cx="827770" cy="237130"/>
+          </a:xfrm>
+          <a:prstGeom prst="rect">
+            <a:avLst/>
+          </a:prstGeom>
+        </p:spPr>
+        <p:style>
+          <a:lnRef idx="2">
+            <a:schemeClr val="accent1">
+              <a:shade val="50000"/>
+            </a:schemeClr>
+          </a:lnRef>
+          <a:fillRef idx="1">
+            <a:schemeClr val="accent1"/>
+          </a:fillRef>
+          <a:effectRef idx="0">
+            <a:schemeClr val="accent1"/>
+          </a:effectRef>
+          <a:fontRef idx="minor">
+            <a:schemeClr val="lt1"/>
+          </a:fontRef>
+        </p:style>
+        <p:txBody>
+          <a:bodyPr rtlCol="0" anchor="ctr"/>
+          <a:lstStyle/>
+          <a:p>
+            <a:pPr algn="ctr"/>
+            <a:r>
+              <a:rPr lang="nl-NL" sz="900" dirty="0"/>
+              <a:t> Cytosolic GSH</a:t>
+            </a:r>
+            <a:endParaRPr lang="en-GB" sz="900" dirty="0"/>
+          </a:p>
+        </p:txBody>
+      </p:sp>
+      <p:sp>
+        <p:nvSpPr>
+          <p:cNvPr id="45" name="Rechthoek 44">
+            <a:extLst>
+              <a:ext uri="{FF2B5EF4-FFF2-40B4-BE49-F238E27FC236}">
+                <a16:creationId xmlns:a16="http://schemas.microsoft.com/office/drawing/2014/main" id="{C12F5C9A-4F3C-C127-879C-78366153F9E0}"/>
+              </a:ext>
+            </a:extLst>
+          </p:cNvPr>
+          <p:cNvSpPr/>
+          <p:nvPr/>
+        </p:nvSpPr>
+        <p:spPr>
+          <a:xfrm>
+            <a:off x="3485451" y="4184844"/>
+            <a:ext cx="827770" cy="246448"/>
+          </a:xfrm>
+          <a:prstGeom prst="rect">
+            <a:avLst/>
+          </a:prstGeom>
+        </p:spPr>
+        <p:style>
+          <a:lnRef idx="2">
+            <a:schemeClr val="accent1">
+              <a:shade val="50000"/>
+            </a:schemeClr>
+          </a:lnRef>
+          <a:fillRef idx="1">
+            <a:schemeClr val="accent1"/>
+          </a:fillRef>
+          <a:effectRef idx="0">
+            <a:schemeClr val="accent1"/>
+          </a:effectRef>
+          <a:fontRef idx="minor">
+            <a:schemeClr val="lt1"/>
+          </a:fontRef>
+        </p:style>
+        <p:txBody>
+          <a:bodyPr rtlCol="0" anchor="ctr"/>
+          <a:lstStyle/>
+          <a:p>
+            <a:pPr algn="ctr"/>
+            <a:r>
+              <a:rPr lang="nl-NL" sz="900" dirty="0"/>
+              <a:t> Cytosolic GSH</a:t>
+            </a:r>
+            <a:endParaRPr lang="en-GB" sz="900" dirty="0"/>
+          </a:p>
+        </p:txBody>
+      </p:sp>
+      <p:cxnSp>
+        <p:nvCxnSpPr>
+          <p:cNvPr id="46" name="Rechte verbindingslijn met pijl 45">
+            <a:extLst>
+              <a:ext uri="{FF2B5EF4-FFF2-40B4-BE49-F238E27FC236}">
+                <a16:creationId xmlns:a16="http://schemas.microsoft.com/office/drawing/2014/main" id="{01CFDA9B-3A11-D996-36F2-12EECEC5CAD0}"/>
+              </a:ext>
+            </a:extLst>
+          </p:cNvPr>
+          <p:cNvCxnSpPr>
+            <a:cxnSpLocks/>
+          </p:cNvCxnSpPr>
+          <p:nvPr/>
+        </p:nvCxnSpPr>
+        <p:spPr>
+          <a:xfrm flipV="1">
+            <a:off x="2945321" y="4928758"/>
+            <a:ext cx="0" cy="237131"/>
+          </a:xfrm>
+          <a:prstGeom prst="straightConnector1">
+            <a:avLst/>
+          </a:prstGeom>
+          <a:ln>
+            <a:prstDash val="dash"/>
+            <a:tailEnd type="triangle"/>
+          </a:ln>
+        </p:spPr>
+        <p:style>
+          <a:lnRef idx="3">
+            <a:schemeClr val="dk1"/>
+          </a:lnRef>
+          <a:fillRef idx="0">
+            <a:schemeClr val="dk1"/>
+          </a:fillRef>
+          <a:effectRef idx="2">
+            <a:schemeClr val="dk1"/>
+          </a:effectRef>
+          <a:fontRef idx="minor">
+            <a:schemeClr val="tx1"/>
+          </a:fontRef>
+        </p:style>
+      </p:cxnSp>
+      <p:cxnSp>
+        <p:nvCxnSpPr>
+          <p:cNvPr id="47" name="Rechte verbindingslijn met pijl 46">
+            <a:extLst>
+              <a:ext uri="{FF2B5EF4-FFF2-40B4-BE49-F238E27FC236}">
+                <a16:creationId xmlns:a16="http://schemas.microsoft.com/office/drawing/2014/main" id="{FF327ACF-8F04-4232-FCA8-DC5DB3A31993}"/>
+              </a:ext>
+            </a:extLst>
+          </p:cNvPr>
+          <p:cNvCxnSpPr>
+            <a:cxnSpLocks/>
+            <a:endCxn id="44" idx="0"/>
+          </p:cNvCxnSpPr>
+          <p:nvPr/>
+        </p:nvCxnSpPr>
+        <p:spPr>
+          <a:xfrm>
+            <a:off x="2591777" y="4915460"/>
+            <a:ext cx="0" cy="250429"/>
+          </a:xfrm>
+          <a:prstGeom prst="straightConnector1">
+            <a:avLst/>
+          </a:prstGeom>
+          <a:ln>
+            <a:prstDash val="dash"/>
+            <a:tailEnd type="triangle"/>
+          </a:ln>
+        </p:spPr>
+        <p:style>
+          <a:lnRef idx="3">
+            <a:schemeClr val="dk1"/>
+          </a:lnRef>
+          <a:fillRef idx="0">
+            <a:schemeClr val="dk1"/>
+          </a:fillRef>
+          <a:effectRef idx="2">
+            <a:schemeClr val="dk1"/>
+          </a:effectRef>
+          <a:fontRef idx="minor">
+            <a:schemeClr val="tx1"/>
+          </a:fontRef>
+        </p:style>
+      </p:cxnSp>
+      <p:cxnSp>
+        <p:nvCxnSpPr>
+          <p:cNvPr id="48" name="Rechte verbindingslijn met pijl 47">
+            <a:extLst>
+              <a:ext uri="{FF2B5EF4-FFF2-40B4-BE49-F238E27FC236}">
+                <a16:creationId xmlns:a16="http://schemas.microsoft.com/office/drawing/2014/main" id="{B28E13A3-FD73-AD9B-207F-9170C6808515}"/>
+              </a:ext>
+            </a:extLst>
+          </p:cNvPr>
+          <p:cNvCxnSpPr>
+            <a:cxnSpLocks/>
+          </p:cNvCxnSpPr>
+          <p:nvPr/>
+        </p:nvCxnSpPr>
+        <p:spPr>
+          <a:xfrm flipV="1">
+            <a:off x="4224782" y="3962400"/>
+            <a:ext cx="0" cy="231400"/>
+          </a:xfrm>
+          <a:prstGeom prst="straightConnector1">
+            <a:avLst/>
+          </a:prstGeom>
+          <a:ln>
+            <a:prstDash val="dash"/>
+            <a:tailEnd type="triangle"/>
+          </a:ln>
+        </p:spPr>
+        <p:style>
+          <a:lnRef idx="3">
+            <a:schemeClr val="dk1"/>
+          </a:lnRef>
+          <a:fillRef idx="0">
+            <a:schemeClr val="dk1"/>
+          </a:fillRef>
+          <a:effectRef idx="2">
+            <a:schemeClr val="dk1"/>
+          </a:effectRef>
+          <a:fontRef idx="minor">
+            <a:schemeClr val="tx1"/>
+          </a:fontRef>
+        </p:style>
+      </p:cxnSp>
+      <p:cxnSp>
+        <p:nvCxnSpPr>
+          <p:cNvPr id="49" name="Rechte verbindingslijn met pijl 48">
+            <a:extLst>
+              <a:ext uri="{FF2B5EF4-FFF2-40B4-BE49-F238E27FC236}">
+                <a16:creationId xmlns:a16="http://schemas.microsoft.com/office/drawing/2014/main" id="{9A64AE99-2EA4-D6B6-38EB-BBC56A2CE68C}"/>
+              </a:ext>
+            </a:extLst>
+          </p:cNvPr>
+          <p:cNvCxnSpPr>
+            <a:cxnSpLocks/>
+            <a:endCxn id="45" idx="0"/>
+          </p:cNvCxnSpPr>
+          <p:nvPr/>
+        </p:nvCxnSpPr>
+        <p:spPr>
+          <a:xfrm>
+            <a:off x="3899336" y="4019663"/>
+            <a:ext cx="0" cy="165181"/>
+          </a:xfrm>
+          <a:prstGeom prst="straightConnector1">
+            <a:avLst/>
+          </a:prstGeom>
+          <a:ln>
+            <a:prstDash val="dash"/>
+            <a:tailEnd type="triangle"/>
+          </a:ln>
+        </p:spPr>
+        <p:style>
+          <a:lnRef idx="3">
+            <a:schemeClr val="dk1"/>
+          </a:lnRef>
+          <a:fillRef idx="0">
+            <a:schemeClr val="dk1"/>
+          </a:fillRef>
+          <a:effectRef idx="2">
+            <a:schemeClr val="dk1"/>
+          </a:effectRef>
+          <a:fontRef idx="minor">
+            <a:schemeClr val="tx1"/>
+          </a:fontRef>
+        </p:style>
+      </p:cxnSp>
+      <p:cxnSp>
+        <p:nvCxnSpPr>
+          <p:cNvPr id="56" name="Verbindingslijn: gebogen 55">
+            <a:extLst>
+              <a:ext uri="{FF2B5EF4-FFF2-40B4-BE49-F238E27FC236}">
+                <a16:creationId xmlns:a16="http://schemas.microsoft.com/office/drawing/2014/main" id="{6DAEFE4D-49AD-EC4F-AB1F-A256E554100F}"/>
+              </a:ext>
+            </a:extLst>
+          </p:cNvPr>
+          <p:cNvCxnSpPr>
+            <a:cxnSpLocks/>
+            <a:stCxn id="9" idx="1"/>
+            <a:endCxn id="59" idx="3"/>
+          </p:cNvCxnSpPr>
+          <p:nvPr/>
+        </p:nvCxnSpPr>
+        <p:spPr>
+          <a:xfrm rot="16200000" flipV="1">
+            <a:off x="4464903" y="1320748"/>
+            <a:ext cx="459310" cy="1414844"/>
+          </a:xfrm>
+          <a:prstGeom prst="bentConnector2">
+            <a:avLst/>
+          </a:prstGeom>
+          <a:ln>
+            <a:prstDash val="dash"/>
+            <a:tailEnd type="triangle"/>
+          </a:ln>
+        </p:spPr>
+        <p:style>
+          <a:lnRef idx="3">
+            <a:schemeClr val="dk1"/>
+          </a:lnRef>
+          <a:fillRef idx="0">
+            <a:schemeClr val="dk1"/>
+          </a:fillRef>
+          <a:effectRef idx="2">
+            <a:schemeClr val="dk1"/>
+          </a:effectRef>
+          <a:fontRef idx="minor">
+            <a:schemeClr val="tx1"/>
+          </a:fontRef>
+        </p:style>
+      </p:cxnSp>
+      <p:sp>
+        <p:nvSpPr>
+          <p:cNvPr id="59" name="Rechthoek 58">
+            <a:extLst>
+              <a:ext uri="{FF2B5EF4-FFF2-40B4-BE49-F238E27FC236}">
+                <a16:creationId xmlns:a16="http://schemas.microsoft.com/office/drawing/2014/main" id="{510327F0-09C6-715C-9C86-CB793F4D137A}"/>
+              </a:ext>
+            </a:extLst>
+          </p:cNvPr>
+          <p:cNvSpPr/>
+          <p:nvPr/>
+        </p:nvSpPr>
+        <p:spPr>
+          <a:xfrm>
+            <a:off x="2215582" y="1536648"/>
+            <a:ext cx="1771554" cy="523734"/>
+          </a:xfrm>
+          <a:prstGeom prst="rect">
+            <a:avLst/>
+          </a:prstGeom>
+          <a:ln>
+            <a:solidFill>
+              <a:schemeClr val="tx1"/>
+            </a:solidFill>
+            <a:prstDash val="dash"/>
+          </a:ln>
+        </p:spPr>
+        <p:style>
+          <a:lnRef idx="2">
+            <a:schemeClr val="accent5">
+              <a:shade val="50000"/>
+            </a:schemeClr>
+          </a:lnRef>
+          <a:fillRef idx="1">
+            <a:schemeClr val="accent5"/>
+          </a:fillRef>
+          <a:effectRef idx="0">
+            <a:schemeClr val="accent5"/>
+          </a:effectRef>
+          <a:fontRef idx="minor">
+            <a:schemeClr val="lt1"/>
+          </a:fontRef>
+        </p:style>
+        <p:txBody>
+          <a:bodyPr rtlCol="0" anchor="ctr"/>
+          <a:lstStyle/>
+          <a:p>
+            <a:pPr algn="ctr"/>
+            <a:r>
+              <a:rPr lang="en-US" dirty="0"/>
+              <a:t>Lung</a:t>
+            </a:r>
+          </a:p>
+        </p:txBody>
+      </p:sp>
+      <p:cxnSp>
+        <p:nvCxnSpPr>
+          <p:cNvPr id="60" name="Verbindingslijn: gebogen 59">
+            <a:extLst>
+              <a:ext uri="{FF2B5EF4-FFF2-40B4-BE49-F238E27FC236}">
+                <a16:creationId xmlns:a16="http://schemas.microsoft.com/office/drawing/2014/main" id="{ACCA8DB0-2E63-4B78-09C8-678AF12B89F9}"/>
+              </a:ext>
+            </a:extLst>
+          </p:cNvPr>
+          <p:cNvCxnSpPr>
+            <a:cxnSpLocks/>
+            <a:stCxn id="59" idx="1"/>
+            <a:endCxn id="10" idx="3"/>
+          </p:cNvCxnSpPr>
+          <p:nvPr/>
+        </p:nvCxnSpPr>
+        <p:spPr>
+          <a:xfrm rot="10800000" flipV="1">
+            <a:off x="1212846" y="1798515"/>
+            <a:ext cx="1002737" cy="403100"/>
+          </a:xfrm>
+          <a:prstGeom prst="bentConnector2">
+            <a:avLst/>
+          </a:prstGeom>
+          <a:ln>
+            <a:prstDash val="dash"/>
+            <a:tailEnd type="triangle"/>
+          </a:ln>
+        </p:spPr>
+        <p:style>
+          <a:lnRef idx="3">
+            <a:schemeClr val="dk1"/>
+          </a:lnRef>
+          <a:fillRef idx="0">
+            <a:schemeClr val="dk1"/>
+          </a:fillRef>
+          <a:effectRef idx="2">
+            <a:schemeClr val="dk1"/>
+          </a:effectRef>
+          <a:fontRef idx="minor">
+            <a:schemeClr val="tx1"/>
+          </a:fontRef>
+        </p:style>
+      </p:cxnSp>
+      <p:cxnSp>
+        <p:nvCxnSpPr>
+          <p:cNvPr id="67" name="Rechte verbindingslijn met pijl 66">
+            <a:extLst>
+              <a:ext uri="{FF2B5EF4-FFF2-40B4-BE49-F238E27FC236}">
+                <a16:creationId xmlns:a16="http://schemas.microsoft.com/office/drawing/2014/main" id="{AFA23721-7A38-47DB-3CB3-DC49BF4871AD}"/>
+              </a:ext>
+            </a:extLst>
+          </p:cNvPr>
+          <p:cNvCxnSpPr>
+            <a:cxnSpLocks/>
+            <a:stCxn id="4" idx="2"/>
+            <a:endCxn id="41" idx="0"/>
+          </p:cNvCxnSpPr>
+          <p:nvPr/>
+        </p:nvCxnSpPr>
+        <p:spPr>
+          <a:xfrm>
+            <a:off x="3240314" y="4709186"/>
+            <a:ext cx="605182" cy="484377"/>
+          </a:xfrm>
+          <a:prstGeom prst="straightConnector1">
+            <a:avLst/>
+          </a:prstGeom>
+          <a:ln>
+            <a:tailEnd type="triangle"/>
+          </a:ln>
+        </p:spPr>
+        <p:style>
+          <a:lnRef idx="3">
+            <a:schemeClr val="accent2"/>
+          </a:lnRef>
+          <a:fillRef idx="0">
+            <a:schemeClr val="accent2"/>
+          </a:fillRef>
+          <a:effectRef idx="2">
+            <a:schemeClr val="accent2"/>
+          </a:effectRef>
+          <a:fontRef idx="minor">
+            <a:schemeClr val="tx1"/>
+          </a:fontRef>
+        </p:style>
+      </p:cxnSp>
+      <p:sp>
+        <p:nvSpPr>
+          <p:cNvPr id="69" name="Rechthoek 68">
+            <a:extLst>
+              <a:ext uri="{FF2B5EF4-FFF2-40B4-BE49-F238E27FC236}">
+                <a16:creationId xmlns:a16="http://schemas.microsoft.com/office/drawing/2014/main" id="{A3C8443D-BEFA-2B7C-518F-0E9A4946A7BA}"/>
+              </a:ext>
+            </a:extLst>
+          </p:cNvPr>
+          <p:cNvSpPr/>
+          <p:nvPr/>
+        </p:nvSpPr>
+        <p:spPr>
+          <a:xfrm>
+            <a:off x="2215580" y="1146154"/>
+            <a:ext cx="1771555" cy="403872"/>
+          </a:xfrm>
+          <a:prstGeom prst="rect">
+            <a:avLst/>
+          </a:prstGeom>
+          <a:ln>
+            <a:solidFill>
+              <a:schemeClr val="tx1"/>
+            </a:solidFill>
+            <a:prstDash val="dash"/>
+          </a:ln>
+        </p:spPr>
+        <p:style>
+          <a:lnRef idx="2">
+            <a:schemeClr val="accent5">
+              <a:shade val="50000"/>
+            </a:schemeClr>
+          </a:lnRef>
+          <a:fillRef idx="1">
+            <a:schemeClr val="accent5"/>
+          </a:fillRef>
+          <a:effectRef idx="0">
+            <a:schemeClr val="accent5"/>
+          </a:effectRef>
+          <a:fontRef idx="minor">
+            <a:schemeClr val="lt1"/>
+          </a:fontRef>
+        </p:style>
+        <p:txBody>
+          <a:bodyPr rtlCol="0" anchor="ctr"/>
+          <a:lstStyle/>
+          <a:p>
+            <a:pPr algn="ctr"/>
+            <a:r>
+              <a:rPr lang="en-US" dirty="0"/>
+              <a:t>Alveolar air</a:t>
+            </a:r>
+          </a:p>
+        </p:txBody>
+      </p:sp>
+      <p:cxnSp>
+        <p:nvCxnSpPr>
+          <p:cNvPr id="70" name="Rechte verbindingslijn met pijl 69">
+            <a:extLst>
+              <a:ext uri="{FF2B5EF4-FFF2-40B4-BE49-F238E27FC236}">
+                <a16:creationId xmlns:a16="http://schemas.microsoft.com/office/drawing/2014/main" id="{714AAF61-0471-7A36-B17E-8981BA995D28}"/>
+              </a:ext>
+            </a:extLst>
+          </p:cNvPr>
+          <p:cNvCxnSpPr>
+            <a:cxnSpLocks/>
+            <a:stCxn id="77" idx="3"/>
+            <a:endCxn id="69" idx="1"/>
+          </p:cNvCxnSpPr>
+          <p:nvPr/>
+        </p:nvCxnSpPr>
+        <p:spPr>
+          <a:xfrm>
+            <a:off x="1325254" y="1344300"/>
+            <a:ext cx="890326" cy="3790"/>
+          </a:xfrm>
+          <a:prstGeom prst="straightConnector1">
+            <a:avLst/>
+          </a:prstGeom>
+          <a:ln>
+            <a:tailEnd type="triangle"/>
+          </a:ln>
+        </p:spPr>
+        <p:style>
+          <a:lnRef idx="3">
+            <a:schemeClr val="accent6"/>
+          </a:lnRef>
+          <a:fillRef idx="0">
+            <a:schemeClr val="accent6"/>
+          </a:fillRef>
+          <a:effectRef idx="2">
+            <a:schemeClr val="accent6"/>
+          </a:effectRef>
+          <a:fontRef idx="minor">
+            <a:schemeClr val="tx1"/>
+          </a:fontRef>
+        </p:style>
+      </p:cxnSp>
+      <p:sp>
+        <p:nvSpPr>
+          <p:cNvPr id="73" name="Rechthoek 72">
+            <a:extLst>
+              <a:ext uri="{FF2B5EF4-FFF2-40B4-BE49-F238E27FC236}">
+                <a16:creationId xmlns:a16="http://schemas.microsoft.com/office/drawing/2014/main" id="{6576AAD3-3666-0C5D-500B-E3504B90427E}"/>
+              </a:ext>
+            </a:extLst>
+          </p:cNvPr>
+          <p:cNvSpPr/>
+          <p:nvPr/>
+        </p:nvSpPr>
+        <p:spPr>
+          <a:xfrm>
+            <a:off x="163411" y="5661055"/>
+            <a:ext cx="861298" cy="784829"/>
+          </a:xfrm>
+          <a:prstGeom prst="rect">
+            <a:avLst/>
+          </a:prstGeom>
+          <a:solidFill>
+            <a:srgbClr val="00B050"/>
+          </a:solidFill>
+          <a:ln>
+            <a:solidFill>
+              <a:schemeClr val="tx1"/>
+            </a:solidFill>
+          </a:ln>
+        </p:spPr>
+        <p:style>
+          <a:lnRef idx="2">
+            <a:schemeClr val="accent5">
+              <a:shade val="50000"/>
+            </a:schemeClr>
+          </a:lnRef>
+          <a:fillRef idx="1">
+            <a:schemeClr val="accent5"/>
+          </a:fillRef>
+          <a:effectRef idx="0">
+            <a:schemeClr val="accent5"/>
+          </a:effectRef>
+          <a:fontRef idx="minor">
+            <a:schemeClr val="lt1"/>
+          </a:fontRef>
+        </p:style>
+        <p:txBody>
+          <a:bodyPr rtlCol="0" anchor="ctr"/>
+          <a:lstStyle/>
+          <a:p>
+            <a:pPr algn="ctr"/>
+            <a:r>
+              <a:rPr lang="nl-NL" sz="1200" dirty="0"/>
+              <a:t>Oral exposure</a:t>
+            </a:r>
+            <a:endParaRPr lang="en-GB" sz="1200" dirty="0"/>
+          </a:p>
+        </p:txBody>
+      </p:sp>
+      <p:sp>
+        <p:nvSpPr>
+          <p:cNvPr id="77" name="Rechthoek 76">
+            <a:extLst>
+              <a:ext uri="{FF2B5EF4-FFF2-40B4-BE49-F238E27FC236}">
+                <a16:creationId xmlns:a16="http://schemas.microsoft.com/office/drawing/2014/main" id="{0D42A1AA-5290-C765-9524-3F9E9EBBAEEF}"/>
+              </a:ext>
+            </a:extLst>
+          </p:cNvPr>
+          <p:cNvSpPr/>
+          <p:nvPr/>
+        </p:nvSpPr>
+        <p:spPr>
+          <a:xfrm>
+            <a:off x="463956" y="1076629"/>
+            <a:ext cx="861298" cy="535342"/>
+          </a:xfrm>
+          <a:prstGeom prst="rect">
+            <a:avLst/>
+          </a:prstGeom>
+          <a:solidFill>
+            <a:srgbClr val="00B050"/>
+          </a:solidFill>
+          <a:ln>
+            <a:solidFill>
+              <a:schemeClr val="tx1"/>
+            </a:solidFill>
+            <a:prstDash val="dash"/>
+          </a:ln>
+        </p:spPr>
+        <p:style>
+          <a:lnRef idx="2">
+            <a:schemeClr val="accent5">
+              <a:shade val="50000"/>
+            </a:schemeClr>
+          </a:lnRef>
+          <a:fillRef idx="1">
+            <a:schemeClr val="accent5"/>
+          </a:fillRef>
+          <a:effectRef idx="0">
+            <a:schemeClr val="accent5"/>
+          </a:effectRef>
+          <a:fontRef idx="minor">
+            <a:schemeClr val="lt1"/>
+          </a:fontRef>
+        </p:style>
+        <p:txBody>
+          <a:bodyPr rtlCol="0" anchor="ctr"/>
+          <a:lstStyle/>
+          <a:p>
+            <a:pPr algn="ctr"/>
+            <a:r>
+              <a:rPr lang="en-US" sz="1200" dirty="0"/>
+              <a:t>Inhalation</a:t>
+            </a:r>
+          </a:p>
+        </p:txBody>
+      </p:sp>
+      <p:sp>
+        <p:nvSpPr>
+          <p:cNvPr id="83" name="Rechthoek 82">
+            <a:extLst>
+              <a:ext uri="{FF2B5EF4-FFF2-40B4-BE49-F238E27FC236}">
+                <a16:creationId xmlns:a16="http://schemas.microsoft.com/office/drawing/2014/main" id="{B78EFE11-1B44-E782-48B0-240AA5A11081}"/>
+              </a:ext>
+            </a:extLst>
+          </p:cNvPr>
+          <p:cNvSpPr/>
+          <p:nvPr/>
+        </p:nvSpPr>
+        <p:spPr>
+          <a:xfrm>
+            <a:off x="8275271" y="4043901"/>
+            <a:ext cx="2472612" cy="565202"/>
+          </a:xfrm>
+          <a:prstGeom prst="rect">
+            <a:avLst/>
+          </a:prstGeom>
+          <a:ln>
+            <a:solidFill>
+              <a:schemeClr val="tx1"/>
+            </a:solidFill>
+          </a:ln>
+        </p:spPr>
+        <p:style>
+          <a:lnRef idx="2">
+            <a:schemeClr val="accent5">
+              <a:shade val="50000"/>
+            </a:schemeClr>
+          </a:lnRef>
+          <a:fillRef idx="1">
+            <a:schemeClr val="accent5"/>
+          </a:fillRef>
+          <a:effectRef idx="0">
+            <a:schemeClr val="accent5"/>
+          </a:effectRef>
+          <a:fontRef idx="minor">
+            <a:schemeClr val="lt1"/>
+          </a:fontRef>
+        </p:style>
+        <p:txBody>
+          <a:bodyPr rtlCol="0" anchor="ctr"/>
+          <a:lstStyle/>
+          <a:p>
+            <a:pPr algn="ctr"/>
+            <a:r>
+              <a:rPr lang="nl-NL" dirty="0"/>
+              <a:t>Liver</a:t>
+            </a:r>
+            <a:endParaRPr lang="en-GB" sz="500" dirty="0"/>
+          </a:p>
+        </p:txBody>
+      </p:sp>
+      <p:sp>
+        <p:nvSpPr>
+          <p:cNvPr id="84" name="Rechthoek 83">
+            <a:extLst>
+              <a:ext uri="{FF2B5EF4-FFF2-40B4-BE49-F238E27FC236}">
+                <a16:creationId xmlns:a16="http://schemas.microsoft.com/office/drawing/2014/main" id="{6DB123AE-EE90-B7CA-5B1E-3D5D67AB75B8}"/>
+              </a:ext>
+            </a:extLst>
+          </p:cNvPr>
+          <p:cNvSpPr/>
+          <p:nvPr/>
+        </p:nvSpPr>
+        <p:spPr>
+          <a:xfrm>
+            <a:off x="7708926" y="5050104"/>
+            <a:ext cx="1596821" cy="658845"/>
+          </a:xfrm>
+          <a:prstGeom prst="rect">
+            <a:avLst/>
+          </a:prstGeom>
+          <a:ln>
+            <a:solidFill>
+              <a:schemeClr val="tx1"/>
+            </a:solidFill>
+          </a:ln>
+        </p:spPr>
+        <p:style>
+          <a:lnRef idx="2">
+            <a:schemeClr val="accent5">
+              <a:shade val="50000"/>
+            </a:schemeClr>
+          </a:lnRef>
+          <a:fillRef idx="1">
+            <a:schemeClr val="accent5"/>
+          </a:fillRef>
+          <a:effectRef idx="0">
+            <a:schemeClr val="accent5"/>
+          </a:effectRef>
+          <a:fontRef idx="minor">
+            <a:schemeClr val="lt1"/>
+          </a:fontRef>
+        </p:style>
+        <p:txBody>
+          <a:bodyPr rtlCol="0" anchor="ctr"/>
+          <a:lstStyle/>
+          <a:p>
+            <a:pPr algn="ctr"/>
+            <a:r>
+              <a:rPr lang="nl-NL" dirty="0"/>
+              <a:t>Small intestine</a:t>
+            </a:r>
+            <a:endParaRPr lang="en-GB" dirty="0"/>
+          </a:p>
+        </p:txBody>
+      </p:sp>
+      <p:sp>
+        <p:nvSpPr>
+          <p:cNvPr id="85" name="Rechthoek 84">
+            <a:extLst>
+              <a:ext uri="{FF2B5EF4-FFF2-40B4-BE49-F238E27FC236}">
+                <a16:creationId xmlns:a16="http://schemas.microsoft.com/office/drawing/2014/main" id="{F728872E-E442-C695-692B-0AAE387C7F65}"/>
+              </a:ext>
+            </a:extLst>
+          </p:cNvPr>
+          <p:cNvSpPr/>
+          <p:nvPr/>
+        </p:nvSpPr>
+        <p:spPr>
+          <a:xfrm>
+            <a:off x="8287841" y="2837166"/>
+            <a:ext cx="2472612" cy="354563"/>
+          </a:xfrm>
+          <a:prstGeom prst="rect">
+            <a:avLst/>
+          </a:prstGeom>
+          <a:ln>
+            <a:solidFill>
+              <a:schemeClr val="tx1"/>
+            </a:solidFill>
+          </a:ln>
+        </p:spPr>
+        <p:style>
+          <a:lnRef idx="2">
+            <a:schemeClr val="accent5">
+              <a:shade val="50000"/>
+            </a:schemeClr>
+          </a:lnRef>
+          <a:fillRef idx="1">
+            <a:schemeClr val="accent5"/>
+          </a:fillRef>
+          <a:effectRef idx="0">
+            <a:schemeClr val="accent5"/>
+          </a:effectRef>
+          <a:fontRef idx="minor">
+            <a:schemeClr val="lt1"/>
+          </a:fontRef>
+        </p:style>
+        <p:txBody>
+          <a:bodyPr rtlCol="0" anchor="ctr"/>
+          <a:lstStyle/>
+          <a:p>
+            <a:pPr algn="ctr"/>
+            <a:r>
+              <a:rPr lang="nl-NL" dirty="0"/>
+              <a:t>Slowly perfused tissue</a:t>
+            </a:r>
+            <a:endParaRPr lang="en-GB" dirty="0"/>
+          </a:p>
+        </p:txBody>
+      </p:sp>
+      <p:sp>
+        <p:nvSpPr>
+          <p:cNvPr id="86" name="Rechthoek 85">
+            <a:extLst>
+              <a:ext uri="{FF2B5EF4-FFF2-40B4-BE49-F238E27FC236}">
+                <a16:creationId xmlns:a16="http://schemas.microsoft.com/office/drawing/2014/main" id="{F888A603-A3BC-F1D2-1F69-267AF6233D91}"/>
+              </a:ext>
+            </a:extLst>
+          </p:cNvPr>
+          <p:cNvSpPr/>
+          <p:nvPr/>
+        </p:nvSpPr>
+        <p:spPr>
+          <a:xfrm>
+            <a:off x="8275271" y="3411955"/>
+            <a:ext cx="2472612" cy="354563"/>
+          </a:xfrm>
+          <a:prstGeom prst="rect">
+            <a:avLst/>
+          </a:prstGeom>
+          <a:ln>
+            <a:solidFill>
+              <a:schemeClr val="tx1"/>
+            </a:solidFill>
+          </a:ln>
+        </p:spPr>
+        <p:style>
+          <a:lnRef idx="2">
+            <a:schemeClr val="accent5">
+              <a:shade val="50000"/>
+            </a:schemeClr>
+          </a:lnRef>
+          <a:fillRef idx="1">
+            <a:schemeClr val="accent5"/>
+          </a:fillRef>
+          <a:effectRef idx="0">
+            <a:schemeClr val="accent5"/>
+          </a:effectRef>
+          <a:fontRef idx="minor">
+            <a:schemeClr val="lt1"/>
+          </a:fontRef>
+        </p:style>
+        <p:txBody>
+          <a:bodyPr rtlCol="0" anchor="ctr"/>
+          <a:lstStyle/>
+          <a:p>
+            <a:pPr algn="ctr"/>
+            <a:r>
+              <a:rPr lang="nl-NL" dirty="0"/>
+              <a:t>Richly perfused tissue</a:t>
+            </a:r>
+            <a:endParaRPr lang="en-GB" dirty="0"/>
+          </a:p>
+        </p:txBody>
+      </p:sp>
+      <p:sp>
+        <p:nvSpPr>
+          <p:cNvPr id="87" name="Rechthoek 86">
+            <a:extLst>
+              <a:ext uri="{FF2B5EF4-FFF2-40B4-BE49-F238E27FC236}">
+                <a16:creationId xmlns:a16="http://schemas.microsoft.com/office/drawing/2014/main" id="{0B307C00-E38B-1808-DEA2-0D4C8888D4E7}"/>
+              </a:ext>
+            </a:extLst>
+          </p:cNvPr>
+          <p:cNvSpPr/>
+          <p:nvPr/>
+        </p:nvSpPr>
+        <p:spPr>
+          <a:xfrm>
+            <a:off x="8275271" y="2257825"/>
+            <a:ext cx="2472612" cy="354563"/>
+          </a:xfrm>
+          <a:prstGeom prst="rect">
+            <a:avLst/>
+          </a:prstGeom>
+          <a:ln>
+            <a:solidFill>
+              <a:schemeClr val="tx1"/>
+            </a:solidFill>
+          </a:ln>
+        </p:spPr>
+        <p:style>
+          <a:lnRef idx="2">
+            <a:schemeClr val="accent5">
+              <a:shade val="50000"/>
+            </a:schemeClr>
+          </a:lnRef>
+          <a:fillRef idx="1">
+            <a:schemeClr val="accent5"/>
+          </a:fillRef>
+          <a:effectRef idx="0">
+            <a:schemeClr val="accent5"/>
+          </a:effectRef>
+          <a:fontRef idx="minor">
+            <a:schemeClr val="lt1"/>
+          </a:fontRef>
+        </p:style>
+        <p:txBody>
+          <a:bodyPr rtlCol="0" anchor="ctr"/>
+          <a:lstStyle/>
+          <a:p>
+            <a:pPr algn="ctr"/>
+            <a:r>
+              <a:rPr lang="nl-NL" dirty="0"/>
+              <a:t>Fat</a:t>
+            </a:r>
+            <a:endParaRPr lang="en-GB" sz="1000" dirty="0"/>
+          </a:p>
+        </p:txBody>
+      </p:sp>
+      <p:sp>
+        <p:nvSpPr>
+          <p:cNvPr id="88" name="Rechthoek 87">
+            <a:extLst>
+              <a:ext uri="{FF2B5EF4-FFF2-40B4-BE49-F238E27FC236}">
+                <a16:creationId xmlns:a16="http://schemas.microsoft.com/office/drawing/2014/main" id="{972398AF-0939-B9F6-C35A-8F1BCF52DB51}"/>
+              </a:ext>
+            </a:extLst>
+          </p:cNvPr>
+          <p:cNvSpPr/>
+          <p:nvPr/>
+        </p:nvSpPr>
+        <p:spPr>
+          <a:xfrm rot="5400000">
+            <a:off x="10449048" y="2936565"/>
+            <a:ext cx="2420682" cy="861296"/>
+          </a:xfrm>
+          <a:prstGeom prst="rect">
+            <a:avLst/>
+          </a:prstGeom>
+          <a:ln>
+            <a:solidFill>
+              <a:schemeClr val="tx1"/>
+            </a:solidFill>
+          </a:ln>
+        </p:spPr>
+        <p:style>
+          <a:lnRef idx="2">
+            <a:schemeClr val="accent5">
+              <a:shade val="50000"/>
+            </a:schemeClr>
+          </a:lnRef>
+          <a:fillRef idx="1">
+            <a:schemeClr val="accent5"/>
+          </a:fillRef>
+          <a:effectRef idx="0">
+            <a:schemeClr val="accent5"/>
+          </a:effectRef>
+          <a:fontRef idx="minor">
+            <a:schemeClr val="lt1"/>
+          </a:fontRef>
+        </p:style>
+        <p:txBody>
+          <a:bodyPr rtlCol="0" anchor="ctr"/>
+          <a:lstStyle/>
+          <a:p>
+            <a:pPr algn="ctr"/>
+            <a:r>
+              <a:rPr lang="nl-NL" dirty="0"/>
+              <a:t>Venous blood</a:t>
+            </a:r>
+            <a:endParaRPr lang="en-GB" dirty="0"/>
+          </a:p>
+        </p:txBody>
+      </p:sp>
+      <p:sp>
+        <p:nvSpPr>
+          <p:cNvPr id="89" name="Rechthoek 88">
+            <a:extLst>
+              <a:ext uri="{FF2B5EF4-FFF2-40B4-BE49-F238E27FC236}">
+                <a16:creationId xmlns:a16="http://schemas.microsoft.com/office/drawing/2014/main" id="{BC67523A-C506-900E-8A63-3D26A48C82CB}"/>
+              </a:ext>
+            </a:extLst>
+          </p:cNvPr>
+          <p:cNvSpPr/>
+          <p:nvPr/>
+        </p:nvSpPr>
+        <p:spPr>
+          <a:xfrm rot="16200000">
+            <a:off x="6162115" y="2882770"/>
+            <a:ext cx="2420680" cy="861296"/>
+          </a:xfrm>
+          <a:prstGeom prst="rect">
+            <a:avLst/>
+          </a:prstGeom>
+          <a:ln>
+            <a:solidFill>
+              <a:schemeClr val="tx1"/>
+            </a:solidFill>
+            <a:prstDash val="solid"/>
+          </a:ln>
+        </p:spPr>
+        <p:style>
+          <a:lnRef idx="2">
+            <a:schemeClr val="accent5">
+              <a:shade val="50000"/>
+            </a:schemeClr>
+          </a:lnRef>
+          <a:fillRef idx="1">
+            <a:schemeClr val="accent5"/>
+          </a:fillRef>
+          <a:effectRef idx="0">
+            <a:schemeClr val="accent5"/>
+          </a:effectRef>
+          <a:fontRef idx="minor">
+            <a:schemeClr val="lt1"/>
+          </a:fontRef>
+        </p:style>
+        <p:txBody>
+          <a:bodyPr rtlCol="0" anchor="ctr"/>
+          <a:lstStyle/>
+          <a:p>
+            <a:pPr algn="ctr"/>
+            <a:r>
+              <a:rPr lang="nl-NL" dirty="0"/>
+              <a:t>Arterial blood</a:t>
+            </a:r>
+            <a:endParaRPr lang="en-GB" dirty="0"/>
+          </a:p>
+        </p:txBody>
+      </p:sp>
+      <p:cxnSp>
+        <p:nvCxnSpPr>
+          <p:cNvPr id="90" name="Verbindingslijn: gebogen 89">
+            <a:extLst>
+              <a:ext uri="{FF2B5EF4-FFF2-40B4-BE49-F238E27FC236}">
+                <a16:creationId xmlns:a16="http://schemas.microsoft.com/office/drawing/2014/main" id="{6E2939F7-AED7-1216-7B97-DD11597D979A}"/>
+              </a:ext>
+            </a:extLst>
+          </p:cNvPr>
+          <p:cNvCxnSpPr>
+            <a:cxnSpLocks/>
+            <a:stCxn id="89" idx="1"/>
+            <a:endCxn id="84" idx="1"/>
+          </p:cNvCxnSpPr>
+          <p:nvPr/>
+        </p:nvCxnSpPr>
+        <p:spPr>
+          <a:xfrm rot="16200000" flipH="1">
+            <a:off x="7112806" y="4783406"/>
+            <a:ext cx="855769" cy="336471"/>
+          </a:xfrm>
+          <a:prstGeom prst="bentConnector2">
+            <a:avLst/>
+          </a:prstGeom>
+          <a:ln>
+            <a:tailEnd type="triangle"/>
+          </a:ln>
+        </p:spPr>
+        <p:style>
+          <a:lnRef idx="3">
+            <a:schemeClr val="dk1"/>
+          </a:lnRef>
+          <a:fillRef idx="0">
+            <a:schemeClr val="dk1"/>
+          </a:fillRef>
+          <a:effectRef idx="2">
+            <a:schemeClr val="dk1"/>
+          </a:effectRef>
+          <a:fontRef idx="minor">
+            <a:schemeClr val="tx1"/>
+          </a:fontRef>
+        </p:style>
+      </p:cxnSp>
+      <p:cxnSp>
+        <p:nvCxnSpPr>
+          <p:cNvPr id="91" name="Rechte verbindingslijn met pijl 90">
+            <a:extLst>
+              <a:ext uri="{FF2B5EF4-FFF2-40B4-BE49-F238E27FC236}">
+                <a16:creationId xmlns:a16="http://schemas.microsoft.com/office/drawing/2014/main" id="{DEB36DED-83E3-FED0-0C9D-531CEF9892A0}"/>
+              </a:ext>
+            </a:extLst>
+          </p:cNvPr>
+          <p:cNvCxnSpPr>
+            <a:cxnSpLocks/>
+            <a:stCxn id="84" idx="0"/>
+          </p:cNvCxnSpPr>
+          <p:nvPr/>
+        </p:nvCxnSpPr>
+        <p:spPr>
+          <a:xfrm flipV="1">
+            <a:off x="8507337" y="4607246"/>
+            <a:ext cx="0" cy="442858"/>
+          </a:xfrm>
+          <a:prstGeom prst="straightConnector1">
+            <a:avLst/>
+          </a:prstGeom>
+          <a:ln>
+            <a:tailEnd type="triangle"/>
+          </a:ln>
+        </p:spPr>
+        <p:style>
+          <a:lnRef idx="3">
+            <a:schemeClr val="dk1"/>
+          </a:lnRef>
+          <a:fillRef idx="0">
+            <a:schemeClr val="dk1"/>
+          </a:fillRef>
+          <a:effectRef idx="2">
+            <a:schemeClr val="dk1"/>
+          </a:effectRef>
+          <a:fontRef idx="minor">
+            <a:schemeClr val="tx1"/>
+          </a:fontRef>
+        </p:style>
+      </p:cxnSp>
+      <p:cxnSp>
+        <p:nvCxnSpPr>
+          <p:cNvPr id="92" name="Rechte verbindingslijn met pijl 91">
+            <a:extLst>
+              <a:ext uri="{FF2B5EF4-FFF2-40B4-BE49-F238E27FC236}">
+                <a16:creationId xmlns:a16="http://schemas.microsoft.com/office/drawing/2014/main" id="{E002A867-B348-D543-2054-50DC18165167}"/>
+              </a:ext>
+            </a:extLst>
+          </p:cNvPr>
+          <p:cNvCxnSpPr>
+            <a:cxnSpLocks/>
+            <a:stCxn id="83" idx="3"/>
+          </p:cNvCxnSpPr>
+          <p:nvPr/>
+        </p:nvCxnSpPr>
+        <p:spPr>
+          <a:xfrm>
+            <a:off x="10747883" y="4326502"/>
+            <a:ext cx="480858" cy="0"/>
+          </a:xfrm>
+          <a:prstGeom prst="straightConnector1">
+            <a:avLst/>
+          </a:prstGeom>
+          <a:ln>
+            <a:tailEnd type="triangle"/>
+          </a:ln>
+        </p:spPr>
+        <p:style>
+          <a:lnRef idx="3">
+            <a:schemeClr val="dk1"/>
+          </a:lnRef>
+          <a:fillRef idx="0">
+            <a:schemeClr val="dk1"/>
+          </a:fillRef>
+          <a:effectRef idx="2">
+            <a:schemeClr val="dk1"/>
+          </a:effectRef>
+          <a:fontRef idx="minor">
+            <a:schemeClr val="tx1"/>
+          </a:fontRef>
+        </p:style>
+      </p:cxnSp>
+      <p:cxnSp>
+        <p:nvCxnSpPr>
+          <p:cNvPr id="93" name="Rechte verbindingslijn met pijl 92">
+            <a:extLst>
+              <a:ext uri="{FF2B5EF4-FFF2-40B4-BE49-F238E27FC236}">
+                <a16:creationId xmlns:a16="http://schemas.microsoft.com/office/drawing/2014/main" id="{C2E904AC-1CB1-4F73-E869-DA6C2BAC995C}"/>
+              </a:ext>
+            </a:extLst>
+          </p:cNvPr>
+          <p:cNvCxnSpPr>
+            <a:cxnSpLocks/>
+            <a:endCxn id="83" idx="1"/>
+          </p:cNvCxnSpPr>
+          <p:nvPr/>
+        </p:nvCxnSpPr>
+        <p:spPr>
+          <a:xfrm>
+            <a:off x="7803103" y="4317079"/>
+            <a:ext cx="472168" cy="9423"/>
+          </a:xfrm>
+          <a:prstGeom prst="straightConnector1">
+            <a:avLst/>
+          </a:prstGeom>
+          <a:ln>
+            <a:tailEnd type="triangle"/>
+          </a:ln>
+        </p:spPr>
+        <p:style>
+          <a:lnRef idx="3">
+            <a:schemeClr val="dk1"/>
+          </a:lnRef>
+          <a:fillRef idx="0">
+            <a:schemeClr val="dk1"/>
+          </a:fillRef>
+          <a:effectRef idx="2">
+            <a:schemeClr val="dk1"/>
+          </a:effectRef>
+          <a:fontRef idx="minor">
+            <a:schemeClr val="tx1"/>
+          </a:fontRef>
+        </p:style>
+      </p:cxnSp>
+      <p:cxnSp>
+        <p:nvCxnSpPr>
+          <p:cNvPr id="94" name="Rechte verbindingslijn met pijl 93">
+            <a:extLst>
+              <a:ext uri="{FF2B5EF4-FFF2-40B4-BE49-F238E27FC236}">
+                <a16:creationId xmlns:a16="http://schemas.microsoft.com/office/drawing/2014/main" id="{53675EAB-C730-7002-B9A4-F9D564C1B212}"/>
+              </a:ext>
+            </a:extLst>
+          </p:cNvPr>
+          <p:cNvCxnSpPr>
+            <a:cxnSpLocks/>
+          </p:cNvCxnSpPr>
+          <p:nvPr/>
+        </p:nvCxnSpPr>
+        <p:spPr>
+          <a:xfrm>
+            <a:off x="7803103" y="3599525"/>
+            <a:ext cx="484738" cy="0"/>
+          </a:xfrm>
+          <a:prstGeom prst="straightConnector1">
+            <a:avLst/>
+          </a:prstGeom>
+          <a:ln>
+            <a:tailEnd type="triangle"/>
+          </a:ln>
+        </p:spPr>
+        <p:style>
+          <a:lnRef idx="3">
+            <a:schemeClr val="dk1"/>
+          </a:lnRef>
+          <a:fillRef idx="0">
+            <a:schemeClr val="dk1"/>
+          </a:fillRef>
+          <a:effectRef idx="2">
+            <a:schemeClr val="dk1"/>
+          </a:effectRef>
+          <a:fontRef idx="minor">
+            <a:schemeClr val="tx1"/>
+          </a:fontRef>
+        </p:style>
+      </p:cxnSp>
+      <p:cxnSp>
+        <p:nvCxnSpPr>
+          <p:cNvPr id="95" name="Rechte verbindingslijn met pijl 94">
+            <a:extLst>
+              <a:ext uri="{FF2B5EF4-FFF2-40B4-BE49-F238E27FC236}">
+                <a16:creationId xmlns:a16="http://schemas.microsoft.com/office/drawing/2014/main" id="{BB3BCF2C-5A51-5E3A-40D3-B6DD8C6E3670}"/>
+              </a:ext>
+            </a:extLst>
+          </p:cNvPr>
+          <p:cNvCxnSpPr>
+            <a:cxnSpLocks/>
+          </p:cNvCxnSpPr>
+          <p:nvPr/>
+        </p:nvCxnSpPr>
+        <p:spPr>
+          <a:xfrm>
+            <a:off x="7803103" y="3022083"/>
+            <a:ext cx="484738" cy="0"/>
+          </a:xfrm>
+          <a:prstGeom prst="straightConnector1">
+            <a:avLst/>
+          </a:prstGeom>
+          <a:ln>
+            <a:tailEnd type="triangle"/>
+          </a:ln>
+        </p:spPr>
+        <p:style>
+          <a:lnRef idx="3">
+            <a:schemeClr val="dk1"/>
+          </a:lnRef>
+          <a:fillRef idx="0">
+            <a:schemeClr val="dk1"/>
+          </a:fillRef>
+          <a:effectRef idx="2">
+            <a:schemeClr val="dk1"/>
+          </a:effectRef>
+          <a:fontRef idx="minor">
+            <a:schemeClr val="tx1"/>
+          </a:fontRef>
+        </p:style>
+      </p:cxnSp>
+      <p:cxnSp>
+        <p:nvCxnSpPr>
+          <p:cNvPr id="96" name="Rechte verbindingslijn met pijl 95">
+            <a:extLst>
+              <a:ext uri="{FF2B5EF4-FFF2-40B4-BE49-F238E27FC236}">
+                <a16:creationId xmlns:a16="http://schemas.microsoft.com/office/drawing/2014/main" id="{20876972-5883-2013-CCA7-9A30F525834B}"/>
+              </a:ext>
+            </a:extLst>
+          </p:cNvPr>
+          <p:cNvCxnSpPr>
+            <a:cxnSpLocks/>
+          </p:cNvCxnSpPr>
+          <p:nvPr/>
+        </p:nvCxnSpPr>
+        <p:spPr>
+          <a:xfrm>
+            <a:off x="7803103" y="2443242"/>
+            <a:ext cx="484738" cy="0"/>
+          </a:xfrm>
+          <a:prstGeom prst="straightConnector1">
+            <a:avLst/>
+          </a:prstGeom>
+          <a:ln>
+            <a:tailEnd type="triangle"/>
+          </a:ln>
+        </p:spPr>
+        <p:style>
+          <a:lnRef idx="3">
+            <a:schemeClr val="dk1"/>
+          </a:lnRef>
+          <a:fillRef idx="0">
+            <a:schemeClr val="dk1"/>
+          </a:fillRef>
+          <a:effectRef idx="2">
+            <a:schemeClr val="dk1"/>
+          </a:effectRef>
+          <a:fontRef idx="minor">
+            <a:schemeClr val="tx1"/>
+          </a:fontRef>
+        </p:style>
+      </p:cxnSp>
+      <p:cxnSp>
+        <p:nvCxnSpPr>
+          <p:cNvPr id="97" name="Rechte verbindingslijn met pijl 96">
+            <a:extLst>
+              <a:ext uri="{FF2B5EF4-FFF2-40B4-BE49-F238E27FC236}">
+                <a16:creationId xmlns:a16="http://schemas.microsoft.com/office/drawing/2014/main" id="{3DCC97E6-A46D-5E47-922B-31EB835403B7}"/>
+              </a:ext>
+            </a:extLst>
+          </p:cNvPr>
+          <p:cNvCxnSpPr>
+            <a:cxnSpLocks/>
+          </p:cNvCxnSpPr>
+          <p:nvPr/>
+        </p:nvCxnSpPr>
+        <p:spPr>
+          <a:xfrm>
+            <a:off x="10747883" y="2428065"/>
+            <a:ext cx="480858" cy="0"/>
+          </a:xfrm>
+          <a:prstGeom prst="straightConnector1">
+            <a:avLst/>
+          </a:prstGeom>
+          <a:ln>
+            <a:tailEnd type="triangle"/>
+          </a:ln>
+        </p:spPr>
+        <p:style>
+          <a:lnRef idx="3">
+            <a:schemeClr val="dk1"/>
+          </a:lnRef>
+          <a:fillRef idx="0">
+            <a:schemeClr val="dk1"/>
+          </a:fillRef>
+          <a:effectRef idx="2">
+            <a:schemeClr val="dk1"/>
+          </a:effectRef>
+          <a:fontRef idx="minor">
+            <a:schemeClr val="tx1"/>
+          </a:fontRef>
+        </p:style>
+      </p:cxnSp>
+      <p:cxnSp>
+        <p:nvCxnSpPr>
+          <p:cNvPr id="98" name="Rechte verbindingslijn met pijl 97">
+            <a:extLst>
+              <a:ext uri="{FF2B5EF4-FFF2-40B4-BE49-F238E27FC236}">
+                <a16:creationId xmlns:a16="http://schemas.microsoft.com/office/drawing/2014/main" id="{58BF6C9A-8781-B6B4-5713-F418877F23EC}"/>
+              </a:ext>
+            </a:extLst>
+          </p:cNvPr>
+          <p:cNvCxnSpPr>
+            <a:cxnSpLocks/>
+          </p:cNvCxnSpPr>
+          <p:nvPr/>
+        </p:nvCxnSpPr>
+        <p:spPr>
+          <a:xfrm flipV="1">
+            <a:off x="10747883" y="3014447"/>
+            <a:ext cx="480858" cy="7636"/>
+          </a:xfrm>
+          <a:prstGeom prst="straightConnector1">
+            <a:avLst/>
+          </a:prstGeom>
+          <a:ln>
+            <a:tailEnd type="triangle"/>
+          </a:ln>
+        </p:spPr>
+        <p:style>
+          <a:lnRef idx="3">
+            <a:schemeClr val="dk1"/>
+          </a:lnRef>
+          <a:fillRef idx="0">
+            <a:schemeClr val="dk1"/>
+          </a:fillRef>
+          <a:effectRef idx="2">
+            <a:schemeClr val="dk1"/>
+          </a:effectRef>
+          <a:fontRef idx="minor">
+            <a:schemeClr val="tx1"/>
+          </a:fontRef>
+        </p:style>
+      </p:cxnSp>
+      <p:cxnSp>
+        <p:nvCxnSpPr>
+          <p:cNvPr id="99" name="Rechte verbindingslijn met pijl 98">
+            <a:extLst>
+              <a:ext uri="{FF2B5EF4-FFF2-40B4-BE49-F238E27FC236}">
+                <a16:creationId xmlns:a16="http://schemas.microsoft.com/office/drawing/2014/main" id="{4995DEAD-F74F-BEFF-D4AA-83F0F0B4BCBA}"/>
+              </a:ext>
+            </a:extLst>
+          </p:cNvPr>
+          <p:cNvCxnSpPr>
+            <a:cxnSpLocks/>
+          </p:cNvCxnSpPr>
+          <p:nvPr/>
+        </p:nvCxnSpPr>
+        <p:spPr>
+          <a:xfrm>
+            <a:off x="10747883" y="3609515"/>
+            <a:ext cx="480858" cy="0"/>
+          </a:xfrm>
+          <a:prstGeom prst="straightConnector1">
+            <a:avLst/>
+          </a:prstGeom>
+          <a:ln>
+            <a:tailEnd type="triangle"/>
+          </a:ln>
+        </p:spPr>
+        <p:style>
+          <a:lnRef idx="3">
+            <a:schemeClr val="dk1"/>
+          </a:lnRef>
+          <a:fillRef idx="0">
+            <a:schemeClr val="dk1"/>
+          </a:fillRef>
+          <a:effectRef idx="2">
+            <a:schemeClr val="dk1"/>
+          </a:effectRef>
+          <a:fontRef idx="minor">
+            <a:schemeClr val="tx1"/>
+          </a:fontRef>
+        </p:style>
+      </p:cxnSp>
+      <p:cxnSp>
+        <p:nvCxnSpPr>
+          <p:cNvPr id="107" name="Verbindingslijn: gebogen 106">
+            <a:extLst>
+              <a:ext uri="{FF2B5EF4-FFF2-40B4-BE49-F238E27FC236}">
+                <a16:creationId xmlns:a16="http://schemas.microsoft.com/office/drawing/2014/main" id="{809134CE-2076-ABCB-8C6F-34E18D963896}"/>
+              </a:ext>
+            </a:extLst>
+          </p:cNvPr>
+          <p:cNvCxnSpPr>
+            <a:cxnSpLocks/>
+            <a:stCxn id="88" idx="1"/>
+            <a:endCxn id="108" idx="3"/>
+          </p:cNvCxnSpPr>
+          <p:nvPr/>
+        </p:nvCxnSpPr>
+        <p:spPr>
+          <a:xfrm rot="16200000" flipV="1">
+            <a:off x="10729674" y="1227157"/>
+            <a:ext cx="458440" cy="1400990"/>
+          </a:xfrm>
+          <a:prstGeom prst="bentConnector2">
+            <a:avLst/>
+          </a:prstGeom>
+          <a:ln>
+            <a:prstDash val="dash"/>
+            <a:tailEnd type="triangle"/>
+          </a:ln>
+        </p:spPr>
+        <p:style>
+          <a:lnRef idx="3">
+            <a:schemeClr val="dk1"/>
+          </a:lnRef>
+          <a:fillRef idx="0">
+            <a:schemeClr val="dk1"/>
+          </a:fillRef>
+          <a:effectRef idx="2">
+            <a:schemeClr val="dk1"/>
+          </a:effectRef>
+          <a:fontRef idx="minor">
+            <a:schemeClr val="tx1"/>
+          </a:fontRef>
+        </p:style>
+      </p:cxnSp>
+      <p:sp>
+        <p:nvSpPr>
+          <p:cNvPr id="108" name="Rechthoek 107">
+            <a:extLst>
+              <a:ext uri="{FF2B5EF4-FFF2-40B4-BE49-F238E27FC236}">
+                <a16:creationId xmlns:a16="http://schemas.microsoft.com/office/drawing/2014/main" id="{B3829003-F04A-DC86-2524-790E21533352}"/>
+              </a:ext>
+            </a:extLst>
+          </p:cNvPr>
+          <p:cNvSpPr/>
+          <p:nvPr/>
+        </p:nvSpPr>
+        <p:spPr>
+          <a:xfrm>
+            <a:off x="8486845" y="1436565"/>
+            <a:ext cx="1771554" cy="523734"/>
+          </a:xfrm>
+          <a:prstGeom prst="rect">
+            <a:avLst/>
+          </a:prstGeom>
+          <a:ln>
+            <a:solidFill>
+              <a:schemeClr val="tx1"/>
+            </a:solidFill>
+            <a:prstDash val="dash"/>
+          </a:ln>
+        </p:spPr>
+        <p:style>
+          <a:lnRef idx="2">
+            <a:schemeClr val="accent5">
+              <a:shade val="50000"/>
+            </a:schemeClr>
+          </a:lnRef>
+          <a:fillRef idx="1">
+            <a:schemeClr val="accent5"/>
+          </a:fillRef>
+          <a:effectRef idx="0">
+            <a:schemeClr val="accent5"/>
+          </a:effectRef>
+          <a:fontRef idx="minor">
+            <a:schemeClr val="lt1"/>
+          </a:fontRef>
+        </p:style>
+        <p:txBody>
+          <a:bodyPr rtlCol="0" anchor="ctr"/>
+          <a:lstStyle/>
+          <a:p>
+            <a:pPr algn="ctr"/>
+            <a:r>
+              <a:rPr lang="en-US" dirty="0"/>
+              <a:t>Lung</a:t>
+            </a:r>
+          </a:p>
+        </p:txBody>
+      </p:sp>
+      <p:cxnSp>
+        <p:nvCxnSpPr>
+          <p:cNvPr id="109" name="Verbindingslijn: gebogen 108">
+            <a:extLst>
+              <a:ext uri="{FF2B5EF4-FFF2-40B4-BE49-F238E27FC236}">
+                <a16:creationId xmlns:a16="http://schemas.microsoft.com/office/drawing/2014/main" id="{F973194D-CD04-1F1B-0002-DCE6B56D5447}"/>
+              </a:ext>
+            </a:extLst>
+          </p:cNvPr>
+          <p:cNvCxnSpPr>
+            <a:cxnSpLocks/>
+            <a:stCxn id="108" idx="1"/>
+            <a:endCxn id="89" idx="3"/>
+          </p:cNvCxnSpPr>
+          <p:nvPr/>
+        </p:nvCxnSpPr>
+        <p:spPr>
+          <a:xfrm rot="10800000" flipV="1">
+            <a:off x="7372455" y="1698432"/>
+            <a:ext cx="1114390" cy="404646"/>
+          </a:xfrm>
+          <a:prstGeom prst="bentConnector2">
+            <a:avLst/>
+          </a:prstGeom>
+          <a:ln>
+            <a:prstDash val="dash"/>
+            <a:tailEnd type="triangle"/>
+          </a:ln>
+        </p:spPr>
+        <p:style>
+          <a:lnRef idx="3">
+            <a:schemeClr val="dk1"/>
+          </a:lnRef>
+          <a:fillRef idx="0">
+            <a:schemeClr val="dk1"/>
+          </a:fillRef>
+          <a:effectRef idx="2">
+            <a:schemeClr val="dk1"/>
+          </a:effectRef>
+          <a:fontRef idx="minor">
+            <a:schemeClr val="tx1"/>
+          </a:fontRef>
+        </p:style>
+      </p:cxnSp>
+      <p:sp>
+        <p:nvSpPr>
+          <p:cNvPr id="153" name="Tekstvak 152">
+            <a:extLst>
+              <a:ext uri="{FF2B5EF4-FFF2-40B4-BE49-F238E27FC236}">
+                <a16:creationId xmlns:a16="http://schemas.microsoft.com/office/drawing/2014/main" id="{71BA18AC-2188-A26B-B5AE-C7F90140F76D}"/>
+              </a:ext>
+            </a:extLst>
+          </p:cNvPr>
+          <p:cNvSpPr txBox="1"/>
+          <p:nvPr/>
+        </p:nvSpPr>
+        <p:spPr>
+          <a:xfrm>
+            <a:off x="1325254" y="261257"/>
+            <a:ext cx="3618626" cy="369332"/>
+          </a:xfrm>
+          <a:prstGeom prst="rect">
+            <a:avLst/>
+          </a:prstGeom>
+          <a:noFill/>
+          <a:ln>
+            <a:solidFill>
+              <a:schemeClr val="tx1"/>
+            </a:solidFill>
+          </a:ln>
+        </p:spPr>
+        <p:txBody>
+          <a:bodyPr wrap="square" rtlCol="0">
+            <a:spAutoFit/>
+          </a:bodyPr>
+          <a:lstStyle/>
+          <a:p>
+            <a:pPr algn="ctr"/>
+            <a:r>
+              <a:rPr lang="nl-NL" dirty="0"/>
+              <a:t>Cinnamaldehyde </a:t>
+            </a:r>
+            <a:endParaRPr lang="en-GB" dirty="0"/>
+          </a:p>
+        </p:txBody>
+      </p:sp>
+      <p:sp>
+        <p:nvSpPr>
+          <p:cNvPr id="154" name="Tekstvak 153">
+            <a:extLst>
+              <a:ext uri="{FF2B5EF4-FFF2-40B4-BE49-F238E27FC236}">
+                <a16:creationId xmlns:a16="http://schemas.microsoft.com/office/drawing/2014/main" id="{C8718792-0A31-270A-C500-3FAEBB191252}"/>
+              </a:ext>
+            </a:extLst>
+          </p:cNvPr>
+          <p:cNvSpPr txBox="1"/>
+          <p:nvPr/>
+        </p:nvSpPr>
+        <p:spPr>
+          <a:xfrm>
+            <a:off x="7540690" y="258740"/>
+            <a:ext cx="3618626" cy="369332"/>
+          </a:xfrm>
+          <a:prstGeom prst="rect">
+            <a:avLst/>
+          </a:prstGeom>
+          <a:noFill/>
+          <a:ln>
+            <a:solidFill>
+              <a:schemeClr val="tx1"/>
+            </a:solidFill>
+          </a:ln>
+        </p:spPr>
+        <p:txBody>
+          <a:bodyPr wrap="square" rtlCol="0">
+            <a:spAutoFit/>
+          </a:bodyPr>
+          <a:lstStyle/>
+          <a:p>
+            <a:pPr algn="ctr"/>
+            <a:r>
+              <a:rPr lang="nl-NL" dirty="0"/>
+              <a:t>Cinnamyl Alcohol </a:t>
+            </a:r>
+            <a:endParaRPr lang="en-GB" dirty="0"/>
+          </a:p>
+        </p:txBody>
+      </p:sp>
+      <p:sp>
+        <p:nvSpPr>
+          <p:cNvPr id="158" name="Tekstvak 157">
+            <a:extLst>
+              <a:ext uri="{FF2B5EF4-FFF2-40B4-BE49-F238E27FC236}">
+                <a16:creationId xmlns:a16="http://schemas.microsoft.com/office/drawing/2014/main" id="{843B195E-3AA0-A1F9-79BE-23ABBF4471E8}"/>
+              </a:ext>
+            </a:extLst>
+          </p:cNvPr>
+          <p:cNvSpPr txBox="1"/>
+          <p:nvPr/>
+        </p:nvSpPr>
+        <p:spPr>
+          <a:xfrm>
+            <a:off x="4110241" y="6138091"/>
+            <a:ext cx="1667278" cy="338554"/>
+          </a:xfrm>
+          <a:prstGeom prst="rect">
+            <a:avLst/>
+          </a:prstGeom>
+          <a:noFill/>
+        </p:spPr>
+        <p:txBody>
+          <a:bodyPr wrap="square">
+            <a:spAutoFit/>
+          </a:bodyPr>
+          <a:lstStyle/>
+          <a:p>
+            <a:pPr algn="ctr"/>
+            <a:r>
+              <a:rPr lang="en-GB" sz="800" dirty="0"/>
+              <a:t>Cinnamaldehyde reduced to cinnamyl alcohol</a:t>
+            </a:r>
+          </a:p>
+        </p:txBody>
+      </p:sp>
+      <p:sp>
+        <p:nvSpPr>
+          <p:cNvPr id="159" name="Tekstvak 158">
+            <a:extLst>
+              <a:ext uri="{FF2B5EF4-FFF2-40B4-BE49-F238E27FC236}">
+                <a16:creationId xmlns:a16="http://schemas.microsoft.com/office/drawing/2014/main" id="{8653A535-5B6A-0054-AFD1-A31A35E74B19}"/>
+              </a:ext>
+            </a:extLst>
+          </p:cNvPr>
+          <p:cNvSpPr txBox="1"/>
+          <p:nvPr/>
+        </p:nvSpPr>
+        <p:spPr>
+          <a:xfrm>
+            <a:off x="5575496" y="4921737"/>
+            <a:ext cx="1717581" cy="338554"/>
+          </a:xfrm>
+          <a:prstGeom prst="rect">
+            <a:avLst/>
+          </a:prstGeom>
+          <a:noFill/>
+        </p:spPr>
+        <p:txBody>
+          <a:bodyPr wrap="square">
+            <a:spAutoFit/>
+          </a:bodyPr>
+          <a:lstStyle/>
+          <a:p>
+            <a:pPr algn="ctr"/>
+            <a:r>
+              <a:rPr lang="en-GB" sz="800" dirty="0"/>
+              <a:t>Cinnamaldehyde reduced to cinnamyl alcohol</a:t>
+            </a:r>
+          </a:p>
+        </p:txBody>
+      </p:sp>
+      <p:sp>
+        <p:nvSpPr>
+          <p:cNvPr id="161" name="Tekstvak 160">
+            <a:extLst>
+              <a:ext uri="{FF2B5EF4-FFF2-40B4-BE49-F238E27FC236}">
+                <a16:creationId xmlns:a16="http://schemas.microsoft.com/office/drawing/2014/main" id="{0902F9EB-031D-A1CD-FE9D-31213E451473}"/>
+              </a:ext>
+            </a:extLst>
+          </p:cNvPr>
+          <p:cNvSpPr txBox="1"/>
+          <p:nvPr/>
+        </p:nvSpPr>
+        <p:spPr>
+          <a:xfrm>
+            <a:off x="9585080" y="4996612"/>
+            <a:ext cx="1629754" cy="338554"/>
+          </a:xfrm>
+          <a:prstGeom prst="rect">
+            <a:avLst/>
+          </a:prstGeom>
+          <a:noFill/>
+        </p:spPr>
+        <p:txBody>
+          <a:bodyPr wrap="square">
+            <a:spAutoFit/>
+          </a:bodyPr>
+          <a:lstStyle/>
+          <a:p>
+            <a:r>
+              <a:rPr lang="en-GB" sz="800" dirty="0"/>
+              <a:t>Cinnamyl alcohol enzymatically oxidized to Cinnamaldehyde</a:t>
+            </a:r>
+          </a:p>
+        </p:txBody>
+      </p:sp>
+      <p:sp>
+        <p:nvSpPr>
+          <p:cNvPr id="162" name="Tekstvak 161">
+            <a:extLst>
+              <a:ext uri="{FF2B5EF4-FFF2-40B4-BE49-F238E27FC236}">
+                <a16:creationId xmlns:a16="http://schemas.microsoft.com/office/drawing/2014/main" id="{A8A84AE4-5E4E-B39B-EEB4-CD4DC9B3EE85}"/>
+              </a:ext>
+            </a:extLst>
+          </p:cNvPr>
+          <p:cNvSpPr txBox="1"/>
+          <p:nvPr/>
+        </p:nvSpPr>
+        <p:spPr>
+          <a:xfrm>
+            <a:off x="7803103" y="6183682"/>
+            <a:ext cx="1629754" cy="338554"/>
+          </a:xfrm>
+          <a:prstGeom prst="rect">
+            <a:avLst/>
+          </a:prstGeom>
+          <a:noFill/>
+        </p:spPr>
+        <p:txBody>
+          <a:bodyPr wrap="square">
+            <a:spAutoFit/>
+          </a:bodyPr>
+          <a:lstStyle/>
+          <a:p>
+            <a:r>
+              <a:rPr lang="en-GB" sz="800" dirty="0"/>
+              <a:t>Cinnamyl alcohol enzymatically oxidized to Cinnamaldehyde</a:t>
+            </a:r>
+          </a:p>
+        </p:txBody>
+      </p:sp>
+      <p:cxnSp>
+        <p:nvCxnSpPr>
+          <p:cNvPr id="167" name="Verbindingslijn: gebogen 166">
+            <a:extLst>
+              <a:ext uri="{FF2B5EF4-FFF2-40B4-BE49-F238E27FC236}">
+                <a16:creationId xmlns:a16="http://schemas.microsoft.com/office/drawing/2014/main" id="{2A267020-08E1-78B5-7454-2326FAFD9B27}"/>
+              </a:ext>
+            </a:extLst>
+          </p:cNvPr>
+          <p:cNvCxnSpPr>
+            <a:cxnSpLocks/>
+          </p:cNvCxnSpPr>
+          <p:nvPr/>
+        </p:nvCxnSpPr>
+        <p:spPr>
+          <a:xfrm rot="5400000" flipH="1" flipV="1">
+            <a:off x="7398811" y="1523002"/>
+            <a:ext cx="100083" cy="6271263"/>
+          </a:xfrm>
+          <a:prstGeom prst="bentConnector3">
+            <a:avLst>
+              <a:gd name="adj1" fmla="val -228410"/>
+            </a:avLst>
+          </a:prstGeom>
+          <a:ln>
+            <a:solidFill>
+              <a:srgbClr val="FF0000"/>
+            </a:solidFill>
+            <a:headEnd type="triangle"/>
+            <a:tailEnd type="triangle"/>
+          </a:ln>
+        </p:spPr>
+        <p:style>
+          <a:lnRef idx="3">
+            <a:schemeClr val="accent2"/>
+          </a:lnRef>
+          <a:fillRef idx="0">
+            <a:schemeClr val="accent2"/>
+          </a:fillRef>
+          <a:effectRef idx="2">
+            <a:schemeClr val="accent2"/>
+          </a:effectRef>
+          <a:fontRef idx="minor">
+            <a:schemeClr val="tx1"/>
+          </a:fontRef>
+        </p:style>
+      </p:cxnSp>
+      <p:cxnSp>
+        <p:nvCxnSpPr>
+          <p:cNvPr id="171" name="Verbindingslijn: gebogen 170">
+            <a:extLst>
+              <a:ext uri="{FF2B5EF4-FFF2-40B4-BE49-F238E27FC236}">
+                <a16:creationId xmlns:a16="http://schemas.microsoft.com/office/drawing/2014/main" id="{182AD6E7-23B1-CCA4-4879-8C226F240F2D}"/>
+              </a:ext>
+            </a:extLst>
+          </p:cNvPr>
+          <p:cNvCxnSpPr>
+            <a:cxnSpLocks/>
+            <a:stCxn id="5" idx="2"/>
+            <a:endCxn id="84" idx="2"/>
+          </p:cNvCxnSpPr>
+          <p:nvPr/>
+        </p:nvCxnSpPr>
+        <p:spPr>
+          <a:xfrm rot="5400000" flipH="1" flipV="1">
+            <a:off x="5321663" y="2623359"/>
+            <a:ext cx="100083" cy="6271263"/>
+          </a:xfrm>
+          <a:prstGeom prst="bentConnector3">
+            <a:avLst>
+              <a:gd name="adj1" fmla="val -228410"/>
+            </a:avLst>
+          </a:prstGeom>
+          <a:ln>
+            <a:solidFill>
+              <a:srgbClr val="FF0000"/>
+            </a:solidFill>
+            <a:headEnd type="triangle"/>
+            <a:tailEnd type="triangle"/>
+          </a:ln>
+        </p:spPr>
+        <p:style>
+          <a:lnRef idx="3">
+            <a:schemeClr val="accent2"/>
+          </a:lnRef>
+          <a:fillRef idx="0">
+            <a:schemeClr val="accent2"/>
+          </a:fillRef>
+          <a:effectRef idx="2">
+            <a:schemeClr val="accent2"/>
+          </a:effectRef>
+          <a:fontRef idx="minor">
+            <a:schemeClr val="tx1"/>
+          </a:fontRef>
+        </p:style>
+      </p:cxnSp>
       <p:cxnSp>
         <p:nvCxnSpPr>
           <p:cNvPr id="3" name="Rechte verbindingslijn met pijl 2">
@@ -9566,9 +12586,9 @@
           <p:nvPr/>
         </p:nvCxnSpPr>
         <p:spPr>
-          <a:xfrm flipV="1">
-            <a:off x="3034484" y="5467630"/>
-            <a:ext cx="130167" cy="11980"/>
+          <a:xfrm>
+            <a:off x="3034484" y="5479610"/>
+            <a:ext cx="231845" cy="31396"/>
           </a:xfrm>
           <a:prstGeom prst="straightConnector1">
             <a:avLst/>
@@ -9606,7 +12626,7 @@
         </p:nvSpPr>
         <p:spPr>
           <a:xfrm>
-            <a:off x="4453579" y="5137818"/>
+            <a:off x="4545488" y="5193563"/>
             <a:ext cx="1158334" cy="634886"/>
           </a:xfrm>
           <a:prstGeom prst="rect">
@@ -9668,7 +12688,7 @@
         <p:spPr>
           <a:xfrm>
             <a:off x="3240314" y="4709186"/>
-            <a:ext cx="1792432" cy="428632"/>
+            <a:ext cx="1884341" cy="484377"/>
           </a:xfrm>
           <a:prstGeom prst="straightConnector1">
             <a:avLst/>
@@ -9692,10 +12712,52 @@
           </a:fontRef>
         </p:style>
       </p:cxnSp>
+      <p:sp>
+        <p:nvSpPr>
+          <p:cNvPr id="2" name="Tekstvak 1">
+            <a:extLst>
+              <a:ext uri="{FF2B5EF4-FFF2-40B4-BE49-F238E27FC236}">
+                <a16:creationId xmlns:a16="http://schemas.microsoft.com/office/drawing/2014/main" id="{2AC79D1E-A366-9C21-E922-28A77A65DCA0}"/>
+              </a:ext>
+            </a:extLst>
+          </p:cNvPr>
+          <p:cNvSpPr txBox="1"/>
+          <p:nvPr/>
+        </p:nvSpPr>
+        <p:spPr>
+          <a:xfrm>
+            <a:off x="5356507" y="261257"/>
+            <a:ext cx="1771556" cy="369332"/>
+          </a:xfrm>
+          <a:prstGeom prst="rect">
+            <a:avLst/>
+          </a:prstGeom>
+          <a:noFill/>
+          <a:ln>
+            <a:solidFill>
+              <a:schemeClr val="tx1"/>
+            </a:solidFill>
+          </a:ln>
+        </p:spPr>
+        <p:txBody>
+          <a:bodyPr wrap="square" rtlCol="0">
+            <a:spAutoFit/>
+          </a:bodyPr>
+          <a:lstStyle/>
+          <a:p>
+            <a:pPr algn="ctr"/>
+            <a:r>
+              <a:rPr lang="nl-NL" dirty="0"/>
+              <a:t>Rat </a:t>
+            </a:r>
+            <a:endParaRPr lang="en-GB" dirty="0"/>
+          </a:p>
+        </p:txBody>
+      </p:sp>
     </p:spTree>
     <p:extLst>
       <p:ext uri="{BB962C8B-B14F-4D97-AF65-F5344CB8AC3E}">
-        <p14:creationId xmlns:p14="http://schemas.microsoft.com/office/powerpoint/2010/main" val="253295831"/>
+        <p14:creationId xmlns:p14="http://schemas.microsoft.com/office/powerpoint/2010/main" val="3374693358"/>
       </p:ext>
     </p:extLst>
   </p:cSld>

</xml_diff>